<commit_message>
Added missing slides for final presentation.
</commit_message>
<xml_diff>
--- a/doc/presit.pptx
+++ b/doc/presit.pptx
@@ -10,8 +10,8 @@
     <p:sldId id="258" r:id="rId4"/>
     <p:sldId id="259" r:id="rId5"/>
     <p:sldId id="260" r:id="rId6"/>
-    <p:sldId id="261" r:id="rId7"/>
-    <p:sldId id="262" r:id="rId8"/>
+    <p:sldId id="265" r:id="rId7"/>
+    <p:sldId id="266" r:id="rId8"/>
     <p:sldId id="264" r:id="rId9"/>
   </p:sldIdLst>
   <p:sldSz cx="9144000" cy="6858000" type="screen4x3"/>
@@ -130,6 +130,3026 @@
 </p:presentation>
 </file>
 
+<file path=ppt/diagrams/colors1.xml><?xml version="1.0" encoding="utf-8"?>
+<dgm:colorsDef xmlns:dgm="http://schemas.openxmlformats.org/drawingml/2006/diagram" xmlns:a="http://schemas.openxmlformats.org/drawingml/2006/main" uniqueId="urn:microsoft.com/office/officeart/2005/8/colors/accent1_2">
+  <dgm:title val=""/>
+  <dgm:desc val=""/>
+  <dgm:catLst>
+    <dgm:cat type="accent1" pri="11200"/>
+  </dgm:catLst>
+  <dgm:styleLbl name="node0">
+    <dgm:fillClrLst meth="repeat">
+      <a:schemeClr val="accent1"/>
+    </dgm:fillClrLst>
+    <dgm:linClrLst meth="repeat">
+      <a:schemeClr val="lt1"/>
+    </dgm:linClrLst>
+    <dgm:effectClrLst/>
+    <dgm:txLinClrLst/>
+    <dgm:txFillClrLst/>
+    <dgm:txEffectClrLst/>
+  </dgm:styleLbl>
+  <dgm:styleLbl name="alignNode1">
+    <dgm:fillClrLst meth="repeat">
+      <a:schemeClr val="accent1"/>
+    </dgm:fillClrLst>
+    <dgm:linClrLst meth="repeat">
+      <a:schemeClr val="accent1"/>
+    </dgm:linClrLst>
+    <dgm:effectClrLst/>
+    <dgm:txLinClrLst/>
+    <dgm:txFillClrLst/>
+    <dgm:txEffectClrLst/>
+  </dgm:styleLbl>
+  <dgm:styleLbl name="node1">
+    <dgm:fillClrLst meth="repeat">
+      <a:schemeClr val="accent1"/>
+    </dgm:fillClrLst>
+    <dgm:linClrLst meth="repeat">
+      <a:schemeClr val="lt1"/>
+    </dgm:linClrLst>
+    <dgm:effectClrLst/>
+    <dgm:txLinClrLst/>
+    <dgm:txFillClrLst/>
+    <dgm:txEffectClrLst/>
+  </dgm:styleLbl>
+  <dgm:styleLbl name="lnNode1">
+    <dgm:fillClrLst meth="repeat">
+      <a:schemeClr val="accent1"/>
+    </dgm:fillClrLst>
+    <dgm:linClrLst meth="repeat">
+      <a:schemeClr val="lt1"/>
+    </dgm:linClrLst>
+    <dgm:effectClrLst/>
+    <dgm:txLinClrLst/>
+    <dgm:txFillClrLst/>
+    <dgm:txEffectClrLst/>
+  </dgm:styleLbl>
+  <dgm:styleLbl name="vennNode1">
+    <dgm:fillClrLst meth="repeat">
+      <a:schemeClr val="accent1">
+        <a:alpha val="50000"/>
+      </a:schemeClr>
+    </dgm:fillClrLst>
+    <dgm:linClrLst meth="repeat">
+      <a:schemeClr val="lt1"/>
+    </dgm:linClrLst>
+    <dgm:effectClrLst/>
+    <dgm:txLinClrLst/>
+    <dgm:txFillClrLst/>
+    <dgm:txEffectClrLst/>
+  </dgm:styleLbl>
+  <dgm:styleLbl name="node2">
+    <dgm:fillClrLst meth="repeat">
+      <a:schemeClr val="accent1"/>
+    </dgm:fillClrLst>
+    <dgm:linClrLst meth="repeat">
+      <a:schemeClr val="lt1"/>
+    </dgm:linClrLst>
+    <dgm:effectClrLst/>
+    <dgm:txLinClrLst/>
+    <dgm:txFillClrLst/>
+    <dgm:txEffectClrLst/>
+  </dgm:styleLbl>
+  <dgm:styleLbl name="node3">
+    <dgm:fillClrLst meth="repeat">
+      <a:schemeClr val="accent1"/>
+    </dgm:fillClrLst>
+    <dgm:linClrLst meth="repeat">
+      <a:schemeClr val="lt1"/>
+    </dgm:linClrLst>
+    <dgm:effectClrLst/>
+    <dgm:txLinClrLst/>
+    <dgm:txFillClrLst/>
+    <dgm:txEffectClrLst/>
+  </dgm:styleLbl>
+  <dgm:styleLbl name="node4">
+    <dgm:fillClrLst meth="repeat">
+      <a:schemeClr val="accent1"/>
+    </dgm:fillClrLst>
+    <dgm:linClrLst meth="repeat">
+      <a:schemeClr val="lt1"/>
+    </dgm:linClrLst>
+    <dgm:effectClrLst/>
+    <dgm:txLinClrLst/>
+    <dgm:txFillClrLst/>
+    <dgm:txEffectClrLst/>
+  </dgm:styleLbl>
+  <dgm:styleLbl name="fgImgPlace1">
+    <dgm:fillClrLst meth="repeat">
+      <a:schemeClr val="accent1">
+        <a:tint val="50000"/>
+      </a:schemeClr>
+    </dgm:fillClrLst>
+    <dgm:linClrLst meth="repeat">
+      <a:schemeClr val="lt1"/>
+    </dgm:linClrLst>
+    <dgm:effectClrLst/>
+    <dgm:txLinClrLst/>
+    <dgm:txFillClrLst meth="repeat">
+      <a:schemeClr val="lt1"/>
+    </dgm:txFillClrLst>
+    <dgm:txEffectClrLst/>
+  </dgm:styleLbl>
+  <dgm:styleLbl name="alignImgPlace1">
+    <dgm:fillClrLst meth="repeat">
+      <a:schemeClr val="accent1">
+        <a:tint val="50000"/>
+      </a:schemeClr>
+    </dgm:fillClrLst>
+    <dgm:linClrLst meth="repeat">
+      <a:schemeClr val="lt1"/>
+    </dgm:linClrLst>
+    <dgm:effectClrLst/>
+    <dgm:txLinClrLst/>
+    <dgm:txFillClrLst meth="repeat">
+      <a:schemeClr val="lt1"/>
+    </dgm:txFillClrLst>
+    <dgm:txEffectClrLst/>
+  </dgm:styleLbl>
+  <dgm:styleLbl name="bgImgPlace1">
+    <dgm:fillClrLst meth="repeat">
+      <a:schemeClr val="accent1">
+        <a:tint val="50000"/>
+      </a:schemeClr>
+    </dgm:fillClrLst>
+    <dgm:linClrLst meth="repeat">
+      <a:schemeClr val="lt1"/>
+    </dgm:linClrLst>
+    <dgm:effectClrLst/>
+    <dgm:txLinClrLst/>
+    <dgm:txFillClrLst meth="repeat">
+      <a:schemeClr val="lt1"/>
+    </dgm:txFillClrLst>
+    <dgm:txEffectClrLst/>
+  </dgm:styleLbl>
+  <dgm:styleLbl name="sibTrans2D1">
+    <dgm:fillClrLst meth="repeat">
+      <a:schemeClr val="accent1">
+        <a:tint val="60000"/>
+      </a:schemeClr>
+    </dgm:fillClrLst>
+    <dgm:linClrLst meth="repeat">
+      <a:schemeClr val="accent1">
+        <a:tint val="60000"/>
+      </a:schemeClr>
+    </dgm:linClrLst>
+    <dgm:effectClrLst/>
+    <dgm:txLinClrLst/>
+    <dgm:txFillClrLst/>
+    <dgm:txEffectClrLst/>
+  </dgm:styleLbl>
+  <dgm:styleLbl name="fgSibTrans2D1">
+    <dgm:fillClrLst meth="repeat">
+      <a:schemeClr val="accent1">
+        <a:tint val="60000"/>
+      </a:schemeClr>
+    </dgm:fillClrLst>
+    <dgm:linClrLst meth="repeat">
+      <a:schemeClr val="accent1">
+        <a:tint val="60000"/>
+      </a:schemeClr>
+    </dgm:linClrLst>
+    <dgm:effectClrLst/>
+    <dgm:txLinClrLst/>
+    <dgm:txFillClrLst/>
+    <dgm:txEffectClrLst/>
+  </dgm:styleLbl>
+  <dgm:styleLbl name="bgSibTrans2D1">
+    <dgm:fillClrLst meth="repeat">
+      <a:schemeClr val="accent1">
+        <a:tint val="60000"/>
+      </a:schemeClr>
+    </dgm:fillClrLst>
+    <dgm:linClrLst meth="repeat">
+      <a:schemeClr val="accent1">
+        <a:tint val="60000"/>
+      </a:schemeClr>
+    </dgm:linClrLst>
+    <dgm:effectClrLst/>
+    <dgm:txLinClrLst/>
+    <dgm:txFillClrLst/>
+    <dgm:txEffectClrLst/>
+  </dgm:styleLbl>
+  <dgm:styleLbl name="sibTrans1D1">
+    <dgm:fillClrLst meth="repeat">
+      <a:schemeClr val="accent1"/>
+    </dgm:fillClrLst>
+    <dgm:linClrLst meth="repeat">
+      <a:schemeClr val="accent1"/>
+    </dgm:linClrLst>
+    <dgm:effectClrLst/>
+    <dgm:txLinClrLst/>
+    <dgm:txFillClrLst meth="repeat">
+      <a:schemeClr val="tx1"/>
+    </dgm:txFillClrLst>
+    <dgm:txEffectClrLst/>
+  </dgm:styleLbl>
+  <dgm:styleLbl name="callout">
+    <dgm:fillClrLst meth="repeat">
+      <a:schemeClr val="accent1"/>
+    </dgm:fillClrLst>
+    <dgm:linClrLst meth="repeat">
+      <a:schemeClr val="accent1">
+        <a:tint val="50000"/>
+      </a:schemeClr>
+    </dgm:linClrLst>
+    <dgm:effectClrLst/>
+    <dgm:txLinClrLst/>
+    <dgm:txFillClrLst meth="repeat">
+      <a:schemeClr val="tx1"/>
+    </dgm:txFillClrLst>
+    <dgm:txEffectClrLst/>
+  </dgm:styleLbl>
+  <dgm:styleLbl name="asst0">
+    <dgm:fillClrLst meth="repeat">
+      <a:schemeClr val="accent1"/>
+    </dgm:fillClrLst>
+    <dgm:linClrLst meth="repeat">
+      <a:schemeClr val="lt1"/>
+    </dgm:linClrLst>
+    <dgm:effectClrLst/>
+    <dgm:txLinClrLst/>
+    <dgm:txFillClrLst/>
+    <dgm:txEffectClrLst/>
+  </dgm:styleLbl>
+  <dgm:styleLbl name="asst1">
+    <dgm:fillClrLst meth="repeat">
+      <a:schemeClr val="accent1"/>
+    </dgm:fillClrLst>
+    <dgm:linClrLst meth="repeat">
+      <a:schemeClr val="lt1"/>
+    </dgm:linClrLst>
+    <dgm:effectClrLst/>
+    <dgm:txLinClrLst/>
+    <dgm:txFillClrLst/>
+    <dgm:txEffectClrLst/>
+  </dgm:styleLbl>
+  <dgm:styleLbl name="asst2">
+    <dgm:fillClrLst meth="repeat">
+      <a:schemeClr val="accent1"/>
+    </dgm:fillClrLst>
+    <dgm:linClrLst meth="repeat">
+      <a:schemeClr val="lt1"/>
+    </dgm:linClrLst>
+    <dgm:effectClrLst/>
+    <dgm:txLinClrLst/>
+    <dgm:txFillClrLst/>
+    <dgm:txEffectClrLst/>
+  </dgm:styleLbl>
+  <dgm:styleLbl name="asst3">
+    <dgm:fillClrLst meth="repeat">
+      <a:schemeClr val="accent1"/>
+    </dgm:fillClrLst>
+    <dgm:linClrLst meth="repeat">
+      <a:schemeClr val="lt1"/>
+    </dgm:linClrLst>
+    <dgm:effectClrLst/>
+    <dgm:txLinClrLst/>
+    <dgm:txFillClrLst/>
+    <dgm:txEffectClrLst/>
+  </dgm:styleLbl>
+  <dgm:styleLbl name="asst4">
+    <dgm:fillClrLst meth="repeat">
+      <a:schemeClr val="accent1"/>
+    </dgm:fillClrLst>
+    <dgm:linClrLst meth="repeat">
+      <a:schemeClr val="lt1"/>
+    </dgm:linClrLst>
+    <dgm:effectClrLst/>
+    <dgm:txLinClrLst/>
+    <dgm:txFillClrLst/>
+    <dgm:txEffectClrLst/>
+  </dgm:styleLbl>
+  <dgm:styleLbl name="parChTrans2D1">
+    <dgm:fillClrLst meth="repeat">
+      <a:schemeClr val="accent1">
+        <a:tint val="60000"/>
+      </a:schemeClr>
+    </dgm:fillClrLst>
+    <dgm:linClrLst meth="repeat">
+      <a:schemeClr val="accent1">
+        <a:tint val="60000"/>
+      </a:schemeClr>
+    </dgm:linClrLst>
+    <dgm:effectClrLst/>
+    <dgm:txLinClrLst/>
+    <dgm:txFillClrLst meth="repeat">
+      <a:schemeClr val="lt1"/>
+    </dgm:txFillClrLst>
+    <dgm:txEffectClrLst/>
+  </dgm:styleLbl>
+  <dgm:styleLbl name="parChTrans2D2">
+    <dgm:fillClrLst meth="repeat">
+      <a:schemeClr val="accent1"/>
+    </dgm:fillClrLst>
+    <dgm:linClrLst meth="repeat">
+      <a:schemeClr val="accent1"/>
+    </dgm:linClrLst>
+    <dgm:effectClrLst/>
+    <dgm:txLinClrLst/>
+    <dgm:txFillClrLst meth="repeat">
+      <a:schemeClr val="lt1"/>
+    </dgm:txFillClrLst>
+    <dgm:txEffectClrLst/>
+  </dgm:styleLbl>
+  <dgm:styleLbl name="parChTrans2D3">
+    <dgm:fillClrLst meth="repeat">
+      <a:schemeClr val="accent1"/>
+    </dgm:fillClrLst>
+    <dgm:linClrLst meth="repeat">
+      <a:schemeClr val="accent1"/>
+    </dgm:linClrLst>
+    <dgm:effectClrLst/>
+    <dgm:txLinClrLst/>
+    <dgm:txFillClrLst meth="repeat">
+      <a:schemeClr val="lt1"/>
+    </dgm:txFillClrLst>
+    <dgm:txEffectClrLst/>
+  </dgm:styleLbl>
+  <dgm:styleLbl name="parChTrans2D4">
+    <dgm:fillClrLst meth="repeat">
+      <a:schemeClr val="accent1"/>
+    </dgm:fillClrLst>
+    <dgm:linClrLst meth="repeat">
+      <a:schemeClr val="accent1"/>
+    </dgm:linClrLst>
+    <dgm:effectClrLst/>
+    <dgm:txLinClrLst/>
+    <dgm:txFillClrLst meth="repeat">
+      <a:schemeClr val="lt1"/>
+    </dgm:txFillClrLst>
+    <dgm:txEffectClrLst/>
+  </dgm:styleLbl>
+  <dgm:styleLbl name="parChTrans1D1">
+    <dgm:fillClrLst meth="repeat">
+      <a:schemeClr val="accent1"/>
+    </dgm:fillClrLst>
+    <dgm:linClrLst meth="repeat">
+      <a:schemeClr val="accent1">
+        <a:shade val="60000"/>
+      </a:schemeClr>
+    </dgm:linClrLst>
+    <dgm:effectClrLst/>
+    <dgm:txLinClrLst/>
+    <dgm:txFillClrLst meth="repeat">
+      <a:schemeClr val="tx1"/>
+    </dgm:txFillClrLst>
+    <dgm:txEffectClrLst/>
+  </dgm:styleLbl>
+  <dgm:styleLbl name="parChTrans1D2">
+    <dgm:fillClrLst meth="repeat">
+      <a:schemeClr val="accent1"/>
+    </dgm:fillClrLst>
+    <dgm:linClrLst meth="repeat">
+      <a:schemeClr val="accent1">
+        <a:shade val="60000"/>
+      </a:schemeClr>
+    </dgm:linClrLst>
+    <dgm:effectClrLst/>
+    <dgm:txLinClrLst/>
+    <dgm:txFillClrLst meth="repeat">
+      <a:schemeClr val="tx1"/>
+    </dgm:txFillClrLst>
+    <dgm:txEffectClrLst/>
+  </dgm:styleLbl>
+  <dgm:styleLbl name="parChTrans1D3">
+    <dgm:fillClrLst meth="repeat">
+      <a:schemeClr val="accent1"/>
+    </dgm:fillClrLst>
+    <dgm:linClrLst meth="repeat">
+      <a:schemeClr val="accent1">
+        <a:shade val="80000"/>
+      </a:schemeClr>
+    </dgm:linClrLst>
+    <dgm:effectClrLst/>
+    <dgm:txLinClrLst/>
+    <dgm:txFillClrLst meth="repeat">
+      <a:schemeClr val="tx1"/>
+    </dgm:txFillClrLst>
+    <dgm:txEffectClrLst/>
+  </dgm:styleLbl>
+  <dgm:styleLbl name="parChTrans1D4">
+    <dgm:fillClrLst meth="repeat">
+      <a:schemeClr val="accent1"/>
+    </dgm:fillClrLst>
+    <dgm:linClrLst meth="repeat">
+      <a:schemeClr val="accent1">
+        <a:shade val="80000"/>
+      </a:schemeClr>
+    </dgm:linClrLst>
+    <dgm:effectClrLst/>
+    <dgm:txLinClrLst/>
+    <dgm:txFillClrLst meth="repeat">
+      <a:schemeClr val="tx1"/>
+    </dgm:txFillClrLst>
+    <dgm:txEffectClrLst/>
+  </dgm:styleLbl>
+  <dgm:styleLbl name="fgAcc1">
+    <dgm:fillClrLst meth="repeat">
+      <a:schemeClr val="lt1">
+        <a:alpha val="90000"/>
+      </a:schemeClr>
+    </dgm:fillClrLst>
+    <dgm:linClrLst meth="repeat">
+      <a:schemeClr val="accent1"/>
+    </dgm:linClrLst>
+    <dgm:effectClrLst/>
+    <dgm:txLinClrLst/>
+    <dgm:txFillClrLst meth="repeat">
+      <a:schemeClr val="dk1"/>
+    </dgm:txFillClrLst>
+    <dgm:txEffectClrLst/>
+  </dgm:styleLbl>
+  <dgm:styleLbl name="conFgAcc1">
+    <dgm:fillClrLst meth="repeat">
+      <a:schemeClr val="lt1">
+        <a:alpha val="90000"/>
+      </a:schemeClr>
+    </dgm:fillClrLst>
+    <dgm:linClrLst meth="repeat">
+      <a:schemeClr val="accent1"/>
+    </dgm:linClrLst>
+    <dgm:effectClrLst/>
+    <dgm:txLinClrLst/>
+    <dgm:txFillClrLst meth="repeat">
+      <a:schemeClr val="dk1"/>
+    </dgm:txFillClrLst>
+    <dgm:txEffectClrLst/>
+  </dgm:styleLbl>
+  <dgm:styleLbl name="alignAcc1">
+    <dgm:fillClrLst meth="repeat">
+      <a:schemeClr val="lt1">
+        <a:alpha val="90000"/>
+      </a:schemeClr>
+    </dgm:fillClrLst>
+    <dgm:linClrLst meth="repeat">
+      <a:schemeClr val="accent1"/>
+    </dgm:linClrLst>
+    <dgm:effectClrLst/>
+    <dgm:txLinClrLst/>
+    <dgm:txFillClrLst meth="repeat">
+      <a:schemeClr val="dk1"/>
+    </dgm:txFillClrLst>
+    <dgm:txEffectClrLst/>
+  </dgm:styleLbl>
+  <dgm:styleLbl name="trAlignAcc1">
+    <dgm:fillClrLst meth="repeat">
+      <a:schemeClr val="lt1">
+        <a:alpha val="40000"/>
+      </a:schemeClr>
+    </dgm:fillClrLst>
+    <dgm:linClrLst meth="repeat">
+      <a:schemeClr val="accent1"/>
+    </dgm:linClrLst>
+    <dgm:effectClrLst/>
+    <dgm:txLinClrLst/>
+    <dgm:txFillClrLst meth="repeat">
+      <a:schemeClr val="dk1"/>
+    </dgm:txFillClrLst>
+    <dgm:txEffectClrLst/>
+  </dgm:styleLbl>
+  <dgm:styleLbl name="bgAcc1">
+    <dgm:fillClrLst meth="repeat">
+      <a:schemeClr val="lt1">
+        <a:alpha val="90000"/>
+      </a:schemeClr>
+    </dgm:fillClrLst>
+    <dgm:linClrLst meth="repeat">
+      <a:schemeClr val="accent1"/>
+    </dgm:linClrLst>
+    <dgm:effectClrLst/>
+    <dgm:txLinClrLst/>
+    <dgm:txFillClrLst meth="repeat">
+      <a:schemeClr val="dk1"/>
+    </dgm:txFillClrLst>
+    <dgm:txEffectClrLst/>
+  </dgm:styleLbl>
+  <dgm:styleLbl name="solidFgAcc1">
+    <dgm:fillClrLst meth="repeat">
+      <a:schemeClr val="lt1"/>
+    </dgm:fillClrLst>
+    <dgm:linClrLst meth="repeat">
+      <a:schemeClr val="accent1"/>
+    </dgm:linClrLst>
+    <dgm:effectClrLst/>
+    <dgm:txLinClrLst/>
+    <dgm:txFillClrLst meth="repeat">
+      <a:schemeClr val="dk1"/>
+    </dgm:txFillClrLst>
+    <dgm:txEffectClrLst/>
+  </dgm:styleLbl>
+  <dgm:styleLbl name="solidAlignAcc1">
+    <dgm:fillClrLst meth="repeat">
+      <a:schemeClr val="lt1"/>
+    </dgm:fillClrLst>
+    <dgm:linClrLst meth="repeat">
+      <a:schemeClr val="accent1"/>
+    </dgm:linClrLst>
+    <dgm:effectClrLst/>
+    <dgm:txLinClrLst/>
+    <dgm:txFillClrLst meth="repeat">
+      <a:schemeClr val="dk1"/>
+    </dgm:txFillClrLst>
+    <dgm:txEffectClrLst/>
+  </dgm:styleLbl>
+  <dgm:styleLbl name="solidBgAcc1">
+    <dgm:fillClrLst meth="repeat">
+      <a:schemeClr val="lt1"/>
+    </dgm:fillClrLst>
+    <dgm:linClrLst meth="repeat">
+      <a:schemeClr val="accent1"/>
+    </dgm:linClrLst>
+    <dgm:effectClrLst/>
+    <dgm:txLinClrLst/>
+    <dgm:txFillClrLst meth="repeat">
+      <a:schemeClr val="dk1"/>
+    </dgm:txFillClrLst>
+    <dgm:txEffectClrLst/>
+  </dgm:styleLbl>
+  <dgm:styleLbl name="fgAccFollowNode1">
+    <dgm:fillClrLst meth="repeat">
+      <a:schemeClr val="accent1">
+        <a:alpha val="90000"/>
+        <a:tint val="40000"/>
+      </a:schemeClr>
+    </dgm:fillClrLst>
+    <dgm:linClrLst meth="repeat">
+      <a:schemeClr val="accent1">
+        <a:alpha val="90000"/>
+        <a:tint val="40000"/>
+      </a:schemeClr>
+    </dgm:linClrLst>
+    <dgm:effectClrLst/>
+    <dgm:txLinClrLst/>
+    <dgm:txFillClrLst meth="repeat">
+      <a:schemeClr val="dk1"/>
+    </dgm:txFillClrLst>
+    <dgm:txEffectClrLst/>
+  </dgm:styleLbl>
+  <dgm:styleLbl name="alignAccFollowNode1">
+    <dgm:fillClrLst meth="repeat">
+      <a:schemeClr val="accent1">
+        <a:alpha val="90000"/>
+        <a:tint val="40000"/>
+      </a:schemeClr>
+    </dgm:fillClrLst>
+    <dgm:linClrLst meth="repeat">
+      <a:schemeClr val="accent1">
+        <a:alpha val="90000"/>
+        <a:tint val="40000"/>
+      </a:schemeClr>
+    </dgm:linClrLst>
+    <dgm:effectClrLst/>
+    <dgm:txLinClrLst/>
+    <dgm:txFillClrLst meth="repeat">
+      <a:schemeClr val="dk1"/>
+    </dgm:txFillClrLst>
+    <dgm:txEffectClrLst/>
+  </dgm:styleLbl>
+  <dgm:styleLbl name="bgAccFollowNode1">
+    <dgm:fillClrLst meth="repeat">
+      <a:schemeClr val="accent1">
+        <a:alpha val="90000"/>
+        <a:tint val="40000"/>
+      </a:schemeClr>
+    </dgm:fillClrLst>
+    <dgm:linClrLst meth="repeat">
+      <a:schemeClr val="accent1">
+        <a:alpha val="90000"/>
+        <a:tint val="40000"/>
+      </a:schemeClr>
+    </dgm:linClrLst>
+    <dgm:effectClrLst/>
+    <dgm:txLinClrLst/>
+    <dgm:txFillClrLst meth="repeat">
+      <a:schemeClr val="dk1"/>
+    </dgm:txFillClrLst>
+    <dgm:txEffectClrLst/>
+  </dgm:styleLbl>
+  <dgm:styleLbl name="fgAcc0">
+    <dgm:fillClrLst meth="repeat">
+      <a:schemeClr val="lt1">
+        <a:alpha val="90000"/>
+      </a:schemeClr>
+    </dgm:fillClrLst>
+    <dgm:linClrLst meth="repeat">
+      <a:schemeClr val="accent1"/>
+    </dgm:linClrLst>
+    <dgm:effectClrLst/>
+    <dgm:txLinClrLst/>
+    <dgm:txFillClrLst meth="repeat">
+      <a:schemeClr val="dk1"/>
+    </dgm:txFillClrLst>
+    <dgm:txEffectClrLst/>
+  </dgm:styleLbl>
+  <dgm:styleLbl name="fgAcc2">
+    <dgm:fillClrLst meth="repeat">
+      <a:schemeClr val="lt1">
+        <a:alpha val="90000"/>
+      </a:schemeClr>
+    </dgm:fillClrLst>
+    <dgm:linClrLst meth="repeat">
+      <a:schemeClr val="accent1"/>
+    </dgm:linClrLst>
+    <dgm:effectClrLst/>
+    <dgm:txLinClrLst/>
+    <dgm:txFillClrLst meth="repeat">
+      <a:schemeClr val="dk1"/>
+    </dgm:txFillClrLst>
+    <dgm:txEffectClrLst/>
+  </dgm:styleLbl>
+  <dgm:styleLbl name="fgAcc3">
+    <dgm:fillClrLst meth="repeat">
+      <a:schemeClr val="lt1">
+        <a:alpha val="90000"/>
+      </a:schemeClr>
+    </dgm:fillClrLst>
+    <dgm:linClrLst meth="repeat">
+      <a:schemeClr val="accent1"/>
+    </dgm:linClrLst>
+    <dgm:effectClrLst/>
+    <dgm:txLinClrLst/>
+    <dgm:txFillClrLst meth="repeat">
+      <a:schemeClr val="dk1"/>
+    </dgm:txFillClrLst>
+    <dgm:txEffectClrLst/>
+  </dgm:styleLbl>
+  <dgm:styleLbl name="fgAcc4">
+    <dgm:fillClrLst meth="repeat">
+      <a:schemeClr val="lt1">
+        <a:alpha val="90000"/>
+      </a:schemeClr>
+    </dgm:fillClrLst>
+    <dgm:linClrLst meth="repeat">
+      <a:schemeClr val="accent1"/>
+    </dgm:linClrLst>
+    <dgm:effectClrLst/>
+    <dgm:txLinClrLst/>
+    <dgm:txFillClrLst meth="repeat">
+      <a:schemeClr val="dk1"/>
+    </dgm:txFillClrLst>
+    <dgm:txEffectClrLst/>
+  </dgm:styleLbl>
+  <dgm:styleLbl name="bgShp">
+    <dgm:fillClrLst meth="repeat">
+      <a:schemeClr val="accent1">
+        <a:tint val="40000"/>
+      </a:schemeClr>
+    </dgm:fillClrLst>
+    <dgm:linClrLst meth="repeat">
+      <a:schemeClr val="accent1"/>
+    </dgm:linClrLst>
+    <dgm:effectClrLst/>
+    <dgm:txLinClrLst/>
+    <dgm:txFillClrLst meth="repeat">
+      <a:schemeClr val="dk1"/>
+    </dgm:txFillClrLst>
+    <dgm:txEffectClrLst/>
+  </dgm:styleLbl>
+  <dgm:styleLbl name="dkBgShp">
+    <dgm:fillClrLst meth="repeat">
+      <a:schemeClr val="accent1">
+        <a:shade val="80000"/>
+      </a:schemeClr>
+    </dgm:fillClrLst>
+    <dgm:linClrLst meth="repeat">
+      <a:schemeClr val="accent1"/>
+    </dgm:linClrLst>
+    <dgm:effectClrLst/>
+    <dgm:txLinClrLst/>
+    <dgm:txFillClrLst meth="repeat">
+      <a:schemeClr val="lt1"/>
+    </dgm:txFillClrLst>
+    <dgm:txEffectClrLst/>
+  </dgm:styleLbl>
+  <dgm:styleLbl name="trBgShp">
+    <dgm:fillClrLst meth="repeat">
+      <a:schemeClr val="accent1">
+        <a:tint val="50000"/>
+        <a:alpha val="40000"/>
+      </a:schemeClr>
+    </dgm:fillClrLst>
+    <dgm:linClrLst meth="repeat">
+      <a:schemeClr val="accent1"/>
+    </dgm:linClrLst>
+    <dgm:effectClrLst/>
+    <dgm:txLinClrLst/>
+    <dgm:txFillClrLst meth="repeat">
+      <a:schemeClr val="lt1"/>
+    </dgm:txFillClrLst>
+    <dgm:txEffectClrLst/>
+  </dgm:styleLbl>
+  <dgm:styleLbl name="fgShp">
+    <dgm:fillClrLst meth="repeat">
+      <a:schemeClr val="accent1">
+        <a:tint val="60000"/>
+      </a:schemeClr>
+    </dgm:fillClrLst>
+    <dgm:linClrLst meth="repeat">
+      <a:schemeClr val="lt1"/>
+    </dgm:linClrLst>
+    <dgm:effectClrLst/>
+    <dgm:txLinClrLst/>
+    <dgm:txFillClrLst meth="repeat">
+      <a:schemeClr val="dk1"/>
+    </dgm:txFillClrLst>
+    <dgm:txEffectClrLst/>
+  </dgm:styleLbl>
+  <dgm:styleLbl name="revTx">
+    <dgm:fillClrLst meth="repeat">
+      <a:schemeClr val="lt1">
+        <a:alpha val="0"/>
+      </a:schemeClr>
+    </dgm:fillClrLst>
+    <dgm:linClrLst meth="repeat">
+      <a:schemeClr val="dk1">
+        <a:alpha val="0"/>
+      </a:schemeClr>
+    </dgm:linClrLst>
+    <dgm:effectClrLst/>
+    <dgm:txLinClrLst/>
+    <dgm:txFillClrLst meth="repeat">
+      <a:schemeClr val="tx1"/>
+    </dgm:txFillClrLst>
+    <dgm:txEffectClrLst/>
+  </dgm:styleLbl>
+</dgm:colorsDef>
+</file>
+
+<file path=ppt/diagrams/data1.xml><?xml version="1.0" encoding="utf-8"?>
+<dgm:dataModel xmlns:dgm="http://schemas.openxmlformats.org/drawingml/2006/diagram" xmlns:a="http://schemas.openxmlformats.org/drawingml/2006/main">
+  <dgm:ptLst>
+    <dgm:pt modelId="{2A5C7923-740D-404C-98AE-40297C122D20}" type="doc">
+      <dgm:prSet loTypeId="urn:microsoft.com/office/officeart/2005/8/layout/gear1" loCatId="process" qsTypeId="urn:microsoft.com/office/officeart/2005/8/quickstyle/simple1" qsCatId="simple" csTypeId="urn:microsoft.com/office/officeart/2005/8/colors/accent1_2" csCatId="accent1" phldr="1"/>
+      <dgm:spPr/>
+    </dgm:pt>
+    <dgm:pt modelId="{1C158780-45DF-4EFA-869B-556D30D7B78F}">
+      <dgm:prSet phldrT="[Text]" custT="1"/>
+      <dgm:spPr/>
+      <dgm:t>
+        <a:bodyPr/>
+        <a:lstStyle/>
+        <a:p>
+          <a:r>
+            <a:rPr lang="de-AT" sz="2800" dirty="0" err="1" smtClean="0"/>
+            <a:t>Gesture</a:t>
+          </a:r>
+          <a:endParaRPr lang="de-AT" sz="1400" dirty="0"/>
+        </a:p>
+      </dgm:t>
+    </dgm:pt>
+    <dgm:pt modelId="{B4D1511F-673C-4E0C-A5B3-53DE69D8C693}" type="parTrans" cxnId="{AE087BF0-3E92-48AC-9D11-0072E3F2193C}">
+      <dgm:prSet/>
+      <dgm:spPr/>
+      <dgm:t>
+        <a:bodyPr/>
+        <a:lstStyle/>
+        <a:p>
+          <a:endParaRPr lang="de-AT"/>
+        </a:p>
+      </dgm:t>
+    </dgm:pt>
+    <dgm:pt modelId="{B1ED64E7-35A9-4525-8B21-9750FF31A1D0}" type="sibTrans" cxnId="{AE087BF0-3E92-48AC-9D11-0072E3F2193C}">
+      <dgm:prSet/>
+      <dgm:spPr/>
+      <dgm:t>
+        <a:bodyPr/>
+        <a:lstStyle/>
+        <a:p>
+          <a:endParaRPr lang="de-AT"/>
+        </a:p>
+      </dgm:t>
+    </dgm:pt>
+    <dgm:pt modelId="{2CB740AC-3471-458D-8745-B8D39A38E6D9}">
+      <dgm:prSet phldrT="[Text]"/>
+      <dgm:spPr/>
+      <dgm:t>
+        <a:bodyPr/>
+        <a:lstStyle/>
+        <a:p>
+          <a:r>
+            <a:rPr lang="de-AT" dirty="0" smtClean="0"/>
+            <a:t>Transport</a:t>
+          </a:r>
+          <a:br>
+            <a:rPr lang="de-AT" dirty="0" smtClean="0"/>
+          </a:br>
+          <a:r>
+            <a:rPr lang="de-AT" dirty="0" smtClean="0"/>
+            <a:t>Bluetooth</a:t>
+          </a:r>
+          <a:endParaRPr lang="de-AT" dirty="0"/>
+        </a:p>
+      </dgm:t>
+    </dgm:pt>
+    <dgm:pt modelId="{07D0CD8A-9A70-47E6-A896-A4AF4C480800}" type="parTrans" cxnId="{B0C51879-082B-457C-BD80-EC3019F8FDD5}">
+      <dgm:prSet/>
+      <dgm:spPr/>
+      <dgm:t>
+        <a:bodyPr/>
+        <a:lstStyle/>
+        <a:p>
+          <a:endParaRPr lang="de-AT"/>
+        </a:p>
+      </dgm:t>
+    </dgm:pt>
+    <dgm:pt modelId="{9B4C8E5D-16BA-4987-867F-77E4241AF479}" type="sibTrans" cxnId="{B0C51879-082B-457C-BD80-EC3019F8FDD5}">
+      <dgm:prSet/>
+      <dgm:spPr/>
+      <dgm:t>
+        <a:bodyPr/>
+        <a:lstStyle/>
+        <a:p>
+          <a:endParaRPr lang="de-AT"/>
+        </a:p>
+      </dgm:t>
+    </dgm:pt>
+    <dgm:pt modelId="{32E901F3-1BEB-456C-B8C4-487C18D976CB}">
+      <dgm:prSet phldrT="[Text]" custT="1"/>
+      <dgm:spPr/>
+      <dgm:t>
+        <a:bodyPr/>
+        <a:lstStyle/>
+        <a:p>
+          <a:r>
+            <a:rPr lang="de-AT" sz="1400" dirty="0" err="1" smtClean="0"/>
+            <a:t>Gesture</a:t>
+          </a:r>
+          <a:r>
+            <a:rPr lang="de-AT" sz="1400" dirty="0" smtClean="0"/>
+            <a:t/>
+          </a:r>
+          <a:br>
+            <a:rPr lang="de-AT" sz="1400" dirty="0" smtClean="0"/>
+          </a:br>
+          <a:r>
+            <a:rPr lang="de-AT" sz="1300" dirty="0" smtClean="0"/>
+            <a:t>Recognition</a:t>
+          </a:r>
+          <a:br>
+            <a:rPr lang="de-AT" sz="1300" dirty="0" smtClean="0"/>
+          </a:br>
+          <a:r>
+            <a:rPr lang="de-AT" sz="1300" dirty="0" smtClean="0"/>
+            <a:t>(Android)</a:t>
+          </a:r>
+          <a:endParaRPr lang="de-AT" sz="1300" dirty="0"/>
+        </a:p>
+      </dgm:t>
+    </dgm:pt>
+    <dgm:pt modelId="{08B186AB-A178-4427-84DE-147413E19705}" type="parTrans" cxnId="{78FE2167-FFE0-4E49-A030-6B3175FF7EC3}">
+      <dgm:prSet/>
+      <dgm:spPr/>
+      <dgm:t>
+        <a:bodyPr/>
+        <a:lstStyle/>
+        <a:p>
+          <a:endParaRPr lang="de-AT"/>
+        </a:p>
+      </dgm:t>
+    </dgm:pt>
+    <dgm:pt modelId="{5E8DE093-D093-4EDA-82E0-61D9391586B9}" type="sibTrans" cxnId="{78FE2167-FFE0-4E49-A030-6B3175FF7EC3}">
+      <dgm:prSet/>
+      <dgm:spPr/>
+      <dgm:t>
+        <a:bodyPr/>
+        <a:lstStyle/>
+        <a:p>
+          <a:endParaRPr lang="de-AT"/>
+        </a:p>
+      </dgm:t>
+    </dgm:pt>
+    <dgm:pt modelId="{CBDB21D1-4746-4ACC-A578-AAC599235C91}" type="pres">
+      <dgm:prSet presAssocID="{2A5C7923-740D-404C-98AE-40297C122D20}" presName="composite" presStyleCnt="0">
+        <dgm:presLayoutVars>
+          <dgm:chMax val="3"/>
+          <dgm:animLvl val="lvl"/>
+          <dgm:resizeHandles val="exact"/>
+        </dgm:presLayoutVars>
+      </dgm:prSet>
+      <dgm:spPr/>
+    </dgm:pt>
+    <dgm:pt modelId="{EDD19003-18E7-4062-B97F-1C1C99568224}" type="pres">
+      <dgm:prSet presAssocID="{1C158780-45DF-4EFA-869B-556D30D7B78F}" presName="gear1" presStyleLbl="node1" presStyleIdx="0" presStyleCnt="3">
+        <dgm:presLayoutVars>
+          <dgm:chMax val="1"/>
+          <dgm:bulletEnabled val="1"/>
+        </dgm:presLayoutVars>
+      </dgm:prSet>
+      <dgm:spPr/>
+      <dgm:t>
+        <a:bodyPr/>
+        <a:lstStyle/>
+        <a:p>
+          <a:endParaRPr lang="de-AT"/>
+        </a:p>
+      </dgm:t>
+    </dgm:pt>
+    <dgm:pt modelId="{EC9F37FD-1CA6-4CA4-BDE1-79D0DB3C4C83}" type="pres">
+      <dgm:prSet presAssocID="{1C158780-45DF-4EFA-869B-556D30D7B78F}" presName="gear1srcNode" presStyleLbl="node1" presStyleIdx="0" presStyleCnt="3"/>
+      <dgm:spPr/>
+      <dgm:t>
+        <a:bodyPr/>
+        <a:lstStyle/>
+        <a:p>
+          <a:endParaRPr lang="de-AT"/>
+        </a:p>
+      </dgm:t>
+    </dgm:pt>
+    <dgm:pt modelId="{B2A2B16E-D8EC-4B10-A4FF-5AED34496589}" type="pres">
+      <dgm:prSet presAssocID="{1C158780-45DF-4EFA-869B-556D30D7B78F}" presName="gear1dstNode" presStyleLbl="node1" presStyleIdx="0" presStyleCnt="3"/>
+      <dgm:spPr/>
+      <dgm:t>
+        <a:bodyPr/>
+        <a:lstStyle/>
+        <a:p>
+          <a:endParaRPr lang="de-AT"/>
+        </a:p>
+      </dgm:t>
+    </dgm:pt>
+    <dgm:pt modelId="{D896CE8F-CD8B-4AD1-8675-089D3CC9416C}" type="pres">
+      <dgm:prSet presAssocID="{2CB740AC-3471-458D-8745-B8D39A38E6D9}" presName="gear2" presStyleLbl="node1" presStyleIdx="1" presStyleCnt="3">
+        <dgm:presLayoutVars>
+          <dgm:chMax val="1"/>
+          <dgm:bulletEnabled val="1"/>
+        </dgm:presLayoutVars>
+      </dgm:prSet>
+      <dgm:spPr/>
+      <dgm:t>
+        <a:bodyPr/>
+        <a:lstStyle/>
+        <a:p>
+          <a:endParaRPr lang="de-AT"/>
+        </a:p>
+      </dgm:t>
+    </dgm:pt>
+    <dgm:pt modelId="{D7FBAAE5-F41A-4131-87FF-6E8E9C6AE7BD}" type="pres">
+      <dgm:prSet presAssocID="{2CB740AC-3471-458D-8745-B8D39A38E6D9}" presName="gear2srcNode" presStyleLbl="node1" presStyleIdx="1" presStyleCnt="3"/>
+      <dgm:spPr/>
+      <dgm:t>
+        <a:bodyPr/>
+        <a:lstStyle/>
+        <a:p>
+          <a:endParaRPr lang="de-AT"/>
+        </a:p>
+      </dgm:t>
+    </dgm:pt>
+    <dgm:pt modelId="{B2688B10-B2A1-4E81-AF4C-EA28834FA7A3}" type="pres">
+      <dgm:prSet presAssocID="{2CB740AC-3471-458D-8745-B8D39A38E6D9}" presName="gear2dstNode" presStyleLbl="node1" presStyleIdx="1" presStyleCnt="3"/>
+      <dgm:spPr/>
+      <dgm:t>
+        <a:bodyPr/>
+        <a:lstStyle/>
+        <a:p>
+          <a:endParaRPr lang="de-AT"/>
+        </a:p>
+      </dgm:t>
+    </dgm:pt>
+    <dgm:pt modelId="{5BFC9E21-0D39-4B8A-9941-94251ACEE24E}" type="pres">
+      <dgm:prSet presAssocID="{32E901F3-1BEB-456C-B8C4-487C18D976CB}" presName="gear3" presStyleLbl="node1" presStyleIdx="2" presStyleCnt="3"/>
+      <dgm:spPr/>
+      <dgm:t>
+        <a:bodyPr/>
+        <a:lstStyle/>
+        <a:p>
+          <a:endParaRPr lang="de-AT"/>
+        </a:p>
+      </dgm:t>
+    </dgm:pt>
+    <dgm:pt modelId="{58AC768A-24F2-43F0-B46A-42A5118CAD13}" type="pres">
+      <dgm:prSet presAssocID="{32E901F3-1BEB-456C-B8C4-487C18D976CB}" presName="gear3tx" presStyleLbl="node1" presStyleIdx="2" presStyleCnt="3">
+        <dgm:presLayoutVars>
+          <dgm:chMax val="1"/>
+          <dgm:bulletEnabled val="1"/>
+        </dgm:presLayoutVars>
+      </dgm:prSet>
+      <dgm:spPr/>
+      <dgm:t>
+        <a:bodyPr/>
+        <a:lstStyle/>
+        <a:p>
+          <a:endParaRPr lang="de-AT"/>
+        </a:p>
+      </dgm:t>
+    </dgm:pt>
+    <dgm:pt modelId="{1F783F0E-D1CA-4218-9C18-83C77D3ED6F0}" type="pres">
+      <dgm:prSet presAssocID="{32E901F3-1BEB-456C-B8C4-487C18D976CB}" presName="gear3srcNode" presStyleLbl="node1" presStyleIdx="2" presStyleCnt="3"/>
+      <dgm:spPr/>
+      <dgm:t>
+        <a:bodyPr/>
+        <a:lstStyle/>
+        <a:p>
+          <a:endParaRPr lang="de-AT"/>
+        </a:p>
+      </dgm:t>
+    </dgm:pt>
+    <dgm:pt modelId="{BCB41EAD-3462-413F-A2F8-7AD3859FE169}" type="pres">
+      <dgm:prSet presAssocID="{32E901F3-1BEB-456C-B8C4-487C18D976CB}" presName="gear3dstNode" presStyleLbl="node1" presStyleIdx="2" presStyleCnt="3"/>
+      <dgm:spPr/>
+      <dgm:t>
+        <a:bodyPr/>
+        <a:lstStyle/>
+        <a:p>
+          <a:endParaRPr lang="de-AT"/>
+        </a:p>
+      </dgm:t>
+    </dgm:pt>
+    <dgm:pt modelId="{36B13A9C-C0DD-43C9-835B-747F0E42AFD5}" type="pres">
+      <dgm:prSet presAssocID="{B1ED64E7-35A9-4525-8B21-9750FF31A1D0}" presName="connector1" presStyleLbl="sibTrans2D1" presStyleIdx="0" presStyleCnt="3"/>
+      <dgm:spPr/>
+      <dgm:t>
+        <a:bodyPr/>
+        <a:lstStyle/>
+        <a:p>
+          <a:endParaRPr lang="de-AT"/>
+        </a:p>
+      </dgm:t>
+    </dgm:pt>
+    <dgm:pt modelId="{8DF4FEB6-6004-4054-8019-7EB64F269C27}" type="pres">
+      <dgm:prSet presAssocID="{9B4C8E5D-16BA-4987-867F-77E4241AF479}" presName="connector2" presStyleLbl="sibTrans2D1" presStyleIdx="1" presStyleCnt="3"/>
+      <dgm:spPr/>
+      <dgm:t>
+        <a:bodyPr/>
+        <a:lstStyle/>
+        <a:p>
+          <a:endParaRPr lang="de-AT"/>
+        </a:p>
+      </dgm:t>
+    </dgm:pt>
+    <dgm:pt modelId="{D536C5CD-1EB5-40DF-ADB4-31A3F3629AC9}" type="pres">
+      <dgm:prSet presAssocID="{5E8DE093-D093-4EDA-82E0-61D9391586B9}" presName="connector3" presStyleLbl="sibTrans2D1" presStyleIdx="2" presStyleCnt="3"/>
+      <dgm:spPr/>
+      <dgm:t>
+        <a:bodyPr/>
+        <a:lstStyle/>
+        <a:p>
+          <a:endParaRPr lang="de-AT"/>
+        </a:p>
+      </dgm:t>
+    </dgm:pt>
+  </dgm:ptLst>
+  <dgm:cxnLst>
+    <dgm:cxn modelId="{78FE2167-FFE0-4E49-A030-6B3175FF7EC3}" srcId="{2A5C7923-740D-404C-98AE-40297C122D20}" destId="{32E901F3-1BEB-456C-B8C4-487C18D976CB}" srcOrd="2" destOrd="0" parTransId="{08B186AB-A178-4427-84DE-147413E19705}" sibTransId="{5E8DE093-D093-4EDA-82E0-61D9391586B9}"/>
+    <dgm:cxn modelId="{88D88090-B6F0-46B1-BF31-15D624740845}" type="presOf" srcId="{1C158780-45DF-4EFA-869B-556D30D7B78F}" destId="{EDD19003-18E7-4062-B97F-1C1C99568224}" srcOrd="0" destOrd="0" presId="urn:microsoft.com/office/officeart/2005/8/layout/gear1"/>
+    <dgm:cxn modelId="{C69436A3-E4EE-4265-826F-DAAB4E519C6D}" type="presOf" srcId="{32E901F3-1BEB-456C-B8C4-487C18D976CB}" destId="{1F783F0E-D1CA-4218-9C18-83C77D3ED6F0}" srcOrd="2" destOrd="0" presId="urn:microsoft.com/office/officeart/2005/8/layout/gear1"/>
+    <dgm:cxn modelId="{AE087BF0-3E92-48AC-9D11-0072E3F2193C}" srcId="{2A5C7923-740D-404C-98AE-40297C122D20}" destId="{1C158780-45DF-4EFA-869B-556D30D7B78F}" srcOrd="0" destOrd="0" parTransId="{B4D1511F-673C-4E0C-A5B3-53DE69D8C693}" sibTransId="{B1ED64E7-35A9-4525-8B21-9750FF31A1D0}"/>
+    <dgm:cxn modelId="{948FDDF8-524E-4B23-ADEA-9DCBE5041CF6}" type="presOf" srcId="{9B4C8E5D-16BA-4987-867F-77E4241AF479}" destId="{8DF4FEB6-6004-4054-8019-7EB64F269C27}" srcOrd="0" destOrd="0" presId="urn:microsoft.com/office/officeart/2005/8/layout/gear1"/>
+    <dgm:cxn modelId="{B0C51879-082B-457C-BD80-EC3019F8FDD5}" srcId="{2A5C7923-740D-404C-98AE-40297C122D20}" destId="{2CB740AC-3471-458D-8745-B8D39A38E6D9}" srcOrd="1" destOrd="0" parTransId="{07D0CD8A-9A70-47E6-A896-A4AF4C480800}" sibTransId="{9B4C8E5D-16BA-4987-867F-77E4241AF479}"/>
+    <dgm:cxn modelId="{CEFC85EA-0103-4637-A602-495ECC901B91}" type="presOf" srcId="{1C158780-45DF-4EFA-869B-556D30D7B78F}" destId="{EC9F37FD-1CA6-4CA4-BDE1-79D0DB3C4C83}" srcOrd="1" destOrd="0" presId="urn:microsoft.com/office/officeart/2005/8/layout/gear1"/>
+    <dgm:cxn modelId="{0A9E3889-E457-49C2-A287-8733638A36E6}" type="presOf" srcId="{2CB740AC-3471-458D-8745-B8D39A38E6D9}" destId="{D7FBAAE5-F41A-4131-87FF-6E8E9C6AE7BD}" srcOrd="1" destOrd="0" presId="urn:microsoft.com/office/officeart/2005/8/layout/gear1"/>
+    <dgm:cxn modelId="{C68DFA21-3803-4688-8D76-2A3524F07587}" type="presOf" srcId="{5E8DE093-D093-4EDA-82E0-61D9391586B9}" destId="{D536C5CD-1EB5-40DF-ADB4-31A3F3629AC9}" srcOrd="0" destOrd="0" presId="urn:microsoft.com/office/officeart/2005/8/layout/gear1"/>
+    <dgm:cxn modelId="{B4F55D96-DFD5-43D8-B0CB-0B6B4263D329}" type="presOf" srcId="{32E901F3-1BEB-456C-B8C4-487C18D976CB}" destId="{BCB41EAD-3462-413F-A2F8-7AD3859FE169}" srcOrd="3" destOrd="0" presId="urn:microsoft.com/office/officeart/2005/8/layout/gear1"/>
+    <dgm:cxn modelId="{E25BD2FB-A44F-4641-A267-13F65ABD7D6D}" type="presOf" srcId="{32E901F3-1BEB-456C-B8C4-487C18D976CB}" destId="{5BFC9E21-0D39-4B8A-9941-94251ACEE24E}" srcOrd="0" destOrd="0" presId="urn:microsoft.com/office/officeart/2005/8/layout/gear1"/>
+    <dgm:cxn modelId="{878EAB92-1A08-44DB-AA90-9FA3D4344D50}" type="presOf" srcId="{2CB740AC-3471-458D-8745-B8D39A38E6D9}" destId="{B2688B10-B2A1-4E81-AF4C-EA28834FA7A3}" srcOrd="2" destOrd="0" presId="urn:microsoft.com/office/officeart/2005/8/layout/gear1"/>
+    <dgm:cxn modelId="{17402FAE-CE08-484E-BED1-83B182135F6A}" type="presOf" srcId="{1C158780-45DF-4EFA-869B-556D30D7B78F}" destId="{B2A2B16E-D8EC-4B10-A4FF-5AED34496589}" srcOrd="2" destOrd="0" presId="urn:microsoft.com/office/officeart/2005/8/layout/gear1"/>
+    <dgm:cxn modelId="{5573BD6A-37B8-48FC-B9FA-0D212EBAF931}" type="presOf" srcId="{B1ED64E7-35A9-4525-8B21-9750FF31A1D0}" destId="{36B13A9C-C0DD-43C9-835B-747F0E42AFD5}" srcOrd="0" destOrd="0" presId="urn:microsoft.com/office/officeart/2005/8/layout/gear1"/>
+    <dgm:cxn modelId="{E3BB632C-64BE-46CF-9C1F-92575EE807EE}" type="presOf" srcId="{2A5C7923-740D-404C-98AE-40297C122D20}" destId="{CBDB21D1-4746-4ACC-A578-AAC599235C91}" srcOrd="0" destOrd="0" presId="urn:microsoft.com/office/officeart/2005/8/layout/gear1"/>
+    <dgm:cxn modelId="{0C1ED4FE-A075-441B-8012-454EE665DF32}" type="presOf" srcId="{2CB740AC-3471-458D-8745-B8D39A38E6D9}" destId="{D896CE8F-CD8B-4AD1-8675-089D3CC9416C}" srcOrd="0" destOrd="0" presId="urn:microsoft.com/office/officeart/2005/8/layout/gear1"/>
+    <dgm:cxn modelId="{E9A05B98-3DD3-454B-9CB2-92001D15A50D}" type="presOf" srcId="{32E901F3-1BEB-456C-B8C4-487C18D976CB}" destId="{58AC768A-24F2-43F0-B46A-42A5118CAD13}" srcOrd="1" destOrd="0" presId="urn:microsoft.com/office/officeart/2005/8/layout/gear1"/>
+    <dgm:cxn modelId="{4E8E91E5-E36A-4D84-9DF0-1926D35885FF}" type="presParOf" srcId="{CBDB21D1-4746-4ACC-A578-AAC599235C91}" destId="{EDD19003-18E7-4062-B97F-1C1C99568224}" srcOrd="0" destOrd="0" presId="urn:microsoft.com/office/officeart/2005/8/layout/gear1"/>
+    <dgm:cxn modelId="{C431F0EE-E1F1-4970-85D0-BEAADF740B53}" type="presParOf" srcId="{CBDB21D1-4746-4ACC-A578-AAC599235C91}" destId="{EC9F37FD-1CA6-4CA4-BDE1-79D0DB3C4C83}" srcOrd="1" destOrd="0" presId="urn:microsoft.com/office/officeart/2005/8/layout/gear1"/>
+    <dgm:cxn modelId="{C06E9C87-6EB9-486F-9A11-43D0BBEA446D}" type="presParOf" srcId="{CBDB21D1-4746-4ACC-A578-AAC599235C91}" destId="{B2A2B16E-D8EC-4B10-A4FF-5AED34496589}" srcOrd="2" destOrd="0" presId="urn:microsoft.com/office/officeart/2005/8/layout/gear1"/>
+    <dgm:cxn modelId="{5AAA38B7-4961-465A-A41C-264B32AA0CDF}" type="presParOf" srcId="{CBDB21D1-4746-4ACC-A578-AAC599235C91}" destId="{D896CE8F-CD8B-4AD1-8675-089D3CC9416C}" srcOrd="3" destOrd="0" presId="urn:microsoft.com/office/officeart/2005/8/layout/gear1"/>
+    <dgm:cxn modelId="{88912A66-B130-4D6D-9602-C83D72063EBA}" type="presParOf" srcId="{CBDB21D1-4746-4ACC-A578-AAC599235C91}" destId="{D7FBAAE5-F41A-4131-87FF-6E8E9C6AE7BD}" srcOrd="4" destOrd="0" presId="urn:microsoft.com/office/officeart/2005/8/layout/gear1"/>
+    <dgm:cxn modelId="{32281C8C-8975-4BEA-991C-71363B4710DD}" type="presParOf" srcId="{CBDB21D1-4746-4ACC-A578-AAC599235C91}" destId="{B2688B10-B2A1-4E81-AF4C-EA28834FA7A3}" srcOrd="5" destOrd="0" presId="urn:microsoft.com/office/officeart/2005/8/layout/gear1"/>
+    <dgm:cxn modelId="{040514C3-B980-49C7-98B9-510C2D1682D8}" type="presParOf" srcId="{CBDB21D1-4746-4ACC-A578-AAC599235C91}" destId="{5BFC9E21-0D39-4B8A-9941-94251ACEE24E}" srcOrd="6" destOrd="0" presId="urn:microsoft.com/office/officeart/2005/8/layout/gear1"/>
+    <dgm:cxn modelId="{F282B015-5154-4538-9A01-47B5D4A8CA67}" type="presParOf" srcId="{CBDB21D1-4746-4ACC-A578-AAC599235C91}" destId="{58AC768A-24F2-43F0-B46A-42A5118CAD13}" srcOrd="7" destOrd="0" presId="urn:microsoft.com/office/officeart/2005/8/layout/gear1"/>
+    <dgm:cxn modelId="{0247CDD9-0B8D-4B66-A9C8-256137A51AB8}" type="presParOf" srcId="{CBDB21D1-4746-4ACC-A578-AAC599235C91}" destId="{1F783F0E-D1CA-4218-9C18-83C77D3ED6F0}" srcOrd="8" destOrd="0" presId="urn:microsoft.com/office/officeart/2005/8/layout/gear1"/>
+    <dgm:cxn modelId="{256C0E22-B5F7-4298-A33C-7D13222A061B}" type="presParOf" srcId="{CBDB21D1-4746-4ACC-A578-AAC599235C91}" destId="{BCB41EAD-3462-413F-A2F8-7AD3859FE169}" srcOrd="9" destOrd="0" presId="urn:microsoft.com/office/officeart/2005/8/layout/gear1"/>
+    <dgm:cxn modelId="{69AF8AFE-FFB3-46B9-A7D5-3A560668CA35}" type="presParOf" srcId="{CBDB21D1-4746-4ACC-A578-AAC599235C91}" destId="{36B13A9C-C0DD-43C9-835B-747F0E42AFD5}" srcOrd="10" destOrd="0" presId="urn:microsoft.com/office/officeart/2005/8/layout/gear1"/>
+    <dgm:cxn modelId="{A64AC6D7-60CD-49B5-A843-0FDE570565B7}" type="presParOf" srcId="{CBDB21D1-4746-4ACC-A578-AAC599235C91}" destId="{8DF4FEB6-6004-4054-8019-7EB64F269C27}" srcOrd="11" destOrd="0" presId="urn:microsoft.com/office/officeart/2005/8/layout/gear1"/>
+    <dgm:cxn modelId="{EA265068-0A3F-42CF-89B7-81448A6F58AC}" type="presParOf" srcId="{CBDB21D1-4746-4ACC-A578-AAC599235C91}" destId="{D536C5CD-1EB5-40DF-ADB4-31A3F3629AC9}" srcOrd="12" destOrd="0" presId="urn:microsoft.com/office/officeart/2005/8/layout/gear1"/>
+  </dgm:cxnLst>
+  <dgm:bg/>
+  <dgm:whole/>
+  <dgm:extLst>
+    <a:ext uri="http://schemas.microsoft.com/office/drawing/2008/diagram">
+      <dsp:dataModelExt xmlns:dsp="http://schemas.microsoft.com/office/drawing/2008/diagram" relId="rId6" minVer="http://schemas.openxmlformats.org/drawingml/2006/diagram"/>
+    </a:ext>
+  </dgm:extLst>
+</dgm:dataModel>
+</file>
+
+<file path=ppt/diagrams/drawing1.xml><?xml version="1.0" encoding="utf-8"?>
+<dsp:drawing xmlns:dgm="http://schemas.openxmlformats.org/drawingml/2006/diagram" xmlns:dsp="http://schemas.microsoft.com/office/drawing/2008/diagram" xmlns:a="http://schemas.openxmlformats.org/drawingml/2006/main">
+  <dsp:spTree>
+    <dsp:nvGrpSpPr>
+      <dsp:cNvPr id="0" name=""/>
+      <dsp:cNvGrpSpPr/>
+    </dsp:nvGrpSpPr>
+    <dsp:grpSpPr/>
+    <dsp:sp modelId="{EDD19003-18E7-4062-B97F-1C1C99568224}">
+      <dsp:nvSpPr>
+        <dsp:cNvPr id="0" name=""/>
+        <dsp:cNvSpPr/>
+      </dsp:nvSpPr>
+      <dsp:spPr>
+        <a:xfrm>
+          <a:off x="2669996" y="1824685"/>
+          <a:ext cx="2230170" cy="2230170"/>
+        </a:xfrm>
+        <a:prstGeom prst="gear9">
+          <a:avLst/>
+        </a:prstGeom>
+        <a:solidFill>
+          <a:schemeClr val="accent1">
+            <a:hueOff val="0"/>
+            <a:satOff val="0"/>
+            <a:lumOff val="0"/>
+            <a:alphaOff val="0"/>
+          </a:schemeClr>
+        </a:solidFill>
+        <a:ln w="19050" cap="flat" cmpd="sng" algn="ctr">
+          <a:solidFill>
+            <a:schemeClr val="lt1">
+              <a:hueOff val="0"/>
+              <a:satOff val="0"/>
+              <a:lumOff val="0"/>
+              <a:alphaOff val="0"/>
+            </a:schemeClr>
+          </a:solidFill>
+          <a:prstDash val="solid"/>
+        </a:ln>
+        <a:effectLst/>
+      </dsp:spPr>
+      <dsp:style>
+        <a:lnRef idx="2">
+          <a:scrgbClr r="0" g="0" b="0"/>
+        </a:lnRef>
+        <a:fillRef idx="1">
+          <a:scrgbClr r="0" g="0" b="0"/>
+        </a:fillRef>
+        <a:effectRef idx="0">
+          <a:scrgbClr r="0" g="0" b="0"/>
+        </a:effectRef>
+        <a:fontRef idx="minor">
+          <a:schemeClr val="lt1"/>
+        </a:fontRef>
+      </dsp:style>
+      <dsp:txBody>
+        <a:bodyPr spcFirstLastPara="0" vert="horz" wrap="square" lIns="35560" tIns="35560" rIns="35560" bIns="35560" numCol="1" spcCol="1270" anchor="ctr" anchorCtr="0">
+          <a:noAutofit/>
+        </a:bodyPr>
+        <a:lstStyle/>
+        <a:p>
+          <a:pPr lvl="0" algn="ctr" defTabSz="1244600">
+            <a:lnSpc>
+              <a:spcPct val="90000"/>
+            </a:lnSpc>
+            <a:spcBef>
+              <a:spcPct val="0"/>
+            </a:spcBef>
+            <a:spcAft>
+              <a:spcPct val="35000"/>
+            </a:spcAft>
+          </a:pPr>
+          <a:r>
+            <a:rPr lang="de-AT" sz="2800" kern="1200" dirty="0" err="1" smtClean="0"/>
+            <a:t>Gesture</a:t>
+          </a:r>
+          <a:endParaRPr lang="de-AT" sz="1400" kern="1200" dirty="0"/>
+        </a:p>
+      </dsp:txBody>
+      <dsp:txXfrm>
+        <a:off x="3118359" y="2347092"/>
+        <a:ext cx="1333444" cy="1146353"/>
+      </dsp:txXfrm>
+    </dsp:sp>
+    <dsp:sp modelId="{D896CE8F-CD8B-4AD1-8675-089D3CC9416C}">
+      <dsp:nvSpPr>
+        <dsp:cNvPr id="0" name=""/>
+        <dsp:cNvSpPr/>
+      </dsp:nvSpPr>
+      <dsp:spPr>
+        <a:xfrm>
+          <a:off x="1372442" y="1297553"/>
+          <a:ext cx="1621942" cy="1621942"/>
+        </a:xfrm>
+        <a:prstGeom prst="gear6">
+          <a:avLst/>
+        </a:prstGeom>
+        <a:solidFill>
+          <a:schemeClr val="accent1">
+            <a:hueOff val="0"/>
+            <a:satOff val="0"/>
+            <a:lumOff val="0"/>
+            <a:alphaOff val="0"/>
+          </a:schemeClr>
+        </a:solidFill>
+        <a:ln w="19050" cap="flat" cmpd="sng" algn="ctr">
+          <a:solidFill>
+            <a:schemeClr val="lt1">
+              <a:hueOff val="0"/>
+              <a:satOff val="0"/>
+              <a:lumOff val="0"/>
+              <a:alphaOff val="0"/>
+            </a:schemeClr>
+          </a:solidFill>
+          <a:prstDash val="solid"/>
+        </a:ln>
+        <a:effectLst/>
+      </dsp:spPr>
+      <dsp:style>
+        <a:lnRef idx="2">
+          <a:scrgbClr r="0" g="0" b="0"/>
+        </a:lnRef>
+        <a:fillRef idx="1">
+          <a:scrgbClr r="0" g="0" b="0"/>
+        </a:fillRef>
+        <a:effectRef idx="0">
+          <a:scrgbClr r="0" g="0" b="0"/>
+        </a:effectRef>
+        <a:fontRef idx="minor">
+          <a:schemeClr val="lt1"/>
+        </a:fontRef>
+      </dsp:style>
+      <dsp:txBody>
+        <a:bodyPr spcFirstLastPara="0" vert="horz" wrap="square" lIns="17780" tIns="17780" rIns="17780" bIns="17780" numCol="1" spcCol="1270" anchor="ctr" anchorCtr="0">
+          <a:noAutofit/>
+        </a:bodyPr>
+        <a:lstStyle/>
+        <a:p>
+          <a:pPr lvl="0" algn="ctr" defTabSz="622300">
+            <a:lnSpc>
+              <a:spcPct val="90000"/>
+            </a:lnSpc>
+            <a:spcBef>
+              <a:spcPct val="0"/>
+            </a:spcBef>
+            <a:spcAft>
+              <a:spcPct val="35000"/>
+            </a:spcAft>
+          </a:pPr>
+          <a:r>
+            <a:rPr lang="de-AT" sz="1400" kern="1200" dirty="0" smtClean="0"/>
+            <a:t>Transport</a:t>
+          </a:r>
+          <a:br>
+            <a:rPr lang="de-AT" sz="1400" kern="1200" dirty="0" smtClean="0"/>
+          </a:br>
+          <a:r>
+            <a:rPr lang="de-AT" sz="1400" kern="1200" dirty="0" smtClean="0"/>
+            <a:t>Bluetooth</a:t>
+          </a:r>
+          <a:endParaRPr lang="de-AT" sz="1400" kern="1200" dirty="0"/>
+        </a:p>
+      </dsp:txBody>
+      <dsp:txXfrm>
+        <a:off x="1780771" y="1708350"/>
+        <a:ext cx="805284" cy="800348"/>
+      </dsp:txXfrm>
+    </dsp:sp>
+    <dsp:sp modelId="{5BFC9E21-0D39-4B8A-9941-94251ACEE24E}">
+      <dsp:nvSpPr>
+        <dsp:cNvPr id="0" name=""/>
+        <dsp:cNvSpPr/>
+      </dsp:nvSpPr>
+      <dsp:spPr>
+        <a:xfrm rot="20700000">
+          <a:off x="2280896" y="178579"/>
+          <a:ext cx="1589172" cy="1589172"/>
+        </a:xfrm>
+        <a:prstGeom prst="gear6">
+          <a:avLst/>
+        </a:prstGeom>
+        <a:solidFill>
+          <a:schemeClr val="accent1">
+            <a:hueOff val="0"/>
+            <a:satOff val="0"/>
+            <a:lumOff val="0"/>
+            <a:alphaOff val="0"/>
+          </a:schemeClr>
+        </a:solidFill>
+        <a:ln w="19050" cap="flat" cmpd="sng" algn="ctr">
+          <a:solidFill>
+            <a:schemeClr val="lt1">
+              <a:hueOff val="0"/>
+              <a:satOff val="0"/>
+              <a:lumOff val="0"/>
+              <a:alphaOff val="0"/>
+            </a:schemeClr>
+          </a:solidFill>
+          <a:prstDash val="solid"/>
+        </a:ln>
+        <a:effectLst/>
+      </dsp:spPr>
+      <dsp:style>
+        <a:lnRef idx="2">
+          <a:scrgbClr r="0" g="0" b="0"/>
+        </a:lnRef>
+        <a:fillRef idx="1">
+          <a:scrgbClr r="0" g="0" b="0"/>
+        </a:fillRef>
+        <a:effectRef idx="0">
+          <a:scrgbClr r="0" g="0" b="0"/>
+        </a:effectRef>
+        <a:fontRef idx="minor">
+          <a:schemeClr val="lt1"/>
+        </a:fontRef>
+      </dsp:style>
+      <dsp:txBody>
+        <a:bodyPr spcFirstLastPara="0" vert="horz" wrap="square" lIns="17780" tIns="17780" rIns="17780" bIns="17780" numCol="1" spcCol="1270" anchor="ctr" anchorCtr="0">
+          <a:noAutofit/>
+        </a:bodyPr>
+        <a:lstStyle/>
+        <a:p>
+          <a:pPr lvl="0" algn="ctr" defTabSz="622300">
+            <a:lnSpc>
+              <a:spcPct val="90000"/>
+            </a:lnSpc>
+            <a:spcBef>
+              <a:spcPct val="0"/>
+            </a:spcBef>
+            <a:spcAft>
+              <a:spcPct val="35000"/>
+            </a:spcAft>
+          </a:pPr>
+          <a:r>
+            <a:rPr lang="de-AT" sz="1400" kern="1200" dirty="0" err="1" smtClean="0"/>
+            <a:t>Gesture</a:t>
+          </a:r>
+          <a:r>
+            <a:rPr lang="de-AT" sz="1400" kern="1200" dirty="0" smtClean="0"/>
+            <a:t/>
+          </a:r>
+          <a:br>
+            <a:rPr lang="de-AT" sz="1400" kern="1200" dirty="0" smtClean="0"/>
+          </a:br>
+          <a:r>
+            <a:rPr lang="de-AT" sz="1300" kern="1200" dirty="0" smtClean="0"/>
+            <a:t>Recognition</a:t>
+          </a:r>
+          <a:br>
+            <a:rPr lang="de-AT" sz="1300" kern="1200" dirty="0" smtClean="0"/>
+          </a:br>
+          <a:r>
+            <a:rPr lang="de-AT" sz="1300" kern="1200" dirty="0" smtClean="0"/>
+            <a:t>(Android)</a:t>
+          </a:r>
+          <a:endParaRPr lang="de-AT" sz="1300" kern="1200" dirty="0"/>
+        </a:p>
+      </dsp:txBody>
+      <dsp:txXfrm rot="-20700000">
+        <a:off x="2629448" y="527131"/>
+        <a:ext cx="892068" cy="892068"/>
+      </dsp:txXfrm>
+    </dsp:sp>
+    <dsp:sp modelId="{36B13A9C-C0DD-43C9-835B-747F0E42AFD5}">
+      <dsp:nvSpPr>
+        <dsp:cNvPr id="0" name=""/>
+        <dsp:cNvSpPr/>
+      </dsp:nvSpPr>
+      <dsp:spPr>
+        <a:xfrm>
+          <a:off x="2496989" y="1489021"/>
+          <a:ext cx="2854618" cy="2854618"/>
+        </a:xfrm>
+        <a:prstGeom prst="circularArrow">
+          <a:avLst>
+            <a:gd name="adj1" fmla="val 4687"/>
+            <a:gd name="adj2" fmla="val 299029"/>
+            <a:gd name="adj3" fmla="val 2512854"/>
+            <a:gd name="adj4" fmla="val 15868428"/>
+            <a:gd name="adj5" fmla="val 5469"/>
+          </a:avLst>
+        </a:prstGeom>
+        <a:solidFill>
+          <a:schemeClr val="accent1">
+            <a:tint val="60000"/>
+            <a:hueOff val="0"/>
+            <a:satOff val="0"/>
+            <a:lumOff val="0"/>
+            <a:alphaOff val="0"/>
+          </a:schemeClr>
+        </a:solidFill>
+        <a:ln>
+          <a:noFill/>
+        </a:ln>
+        <a:effectLst/>
+      </dsp:spPr>
+      <dsp:style>
+        <a:lnRef idx="0">
+          <a:scrgbClr r="0" g="0" b="0"/>
+        </a:lnRef>
+        <a:fillRef idx="1">
+          <a:scrgbClr r="0" g="0" b="0"/>
+        </a:fillRef>
+        <a:effectRef idx="0">
+          <a:scrgbClr r="0" g="0" b="0"/>
+        </a:effectRef>
+        <a:fontRef idx="minor">
+          <a:schemeClr val="lt1"/>
+        </a:fontRef>
+      </dsp:style>
+    </dsp:sp>
+    <dsp:sp modelId="{8DF4FEB6-6004-4054-8019-7EB64F269C27}">
+      <dsp:nvSpPr>
+        <dsp:cNvPr id="0" name=""/>
+        <dsp:cNvSpPr/>
+      </dsp:nvSpPr>
+      <dsp:spPr>
+        <a:xfrm>
+          <a:off x="1085199" y="939277"/>
+          <a:ext cx="2074058" cy="2074058"/>
+        </a:xfrm>
+        <a:prstGeom prst="leftCircularArrow">
+          <a:avLst>
+            <a:gd name="adj1" fmla="val 6452"/>
+            <a:gd name="adj2" fmla="val 429999"/>
+            <a:gd name="adj3" fmla="val 10489124"/>
+            <a:gd name="adj4" fmla="val 14837806"/>
+            <a:gd name="adj5" fmla="val 7527"/>
+          </a:avLst>
+        </a:prstGeom>
+        <a:solidFill>
+          <a:schemeClr val="accent1">
+            <a:tint val="60000"/>
+            <a:hueOff val="0"/>
+            <a:satOff val="0"/>
+            <a:lumOff val="0"/>
+            <a:alphaOff val="0"/>
+          </a:schemeClr>
+        </a:solidFill>
+        <a:ln>
+          <a:noFill/>
+        </a:ln>
+        <a:effectLst/>
+      </dsp:spPr>
+      <dsp:style>
+        <a:lnRef idx="0">
+          <a:scrgbClr r="0" g="0" b="0"/>
+        </a:lnRef>
+        <a:fillRef idx="1">
+          <a:scrgbClr r="0" g="0" b="0"/>
+        </a:fillRef>
+        <a:effectRef idx="0">
+          <a:scrgbClr r="0" g="0" b="0"/>
+        </a:effectRef>
+        <a:fontRef idx="minor">
+          <a:schemeClr val="lt1"/>
+        </a:fontRef>
+      </dsp:style>
+    </dsp:sp>
+    <dsp:sp modelId="{D536C5CD-1EB5-40DF-ADB4-31A3F3629AC9}">
+      <dsp:nvSpPr>
+        <dsp:cNvPr id="0" name=""/>
+        <dsp:cNvSpPr/>
+      </dsp:nvSpPr>
+      <dsp:spPr>
+        <a:xfrm>
+          <a:off x="1913304" y="-168910"/>
+          <a:ext cx="2236253" cy="2236253"/>
+        </a:xfrm>
+        <a:prstGeom prst="circularArrow">
+          <a:avLst>
+            <a:gd name="adj1" fmla="val 5984"/>
+            <a:gd name="adj2" fmla="val 394124"/>
+            <a:gd name="adj3" fmla="val 13313824"/>
+            <a:gd name="adj4" fmla="val 10508221"/>
+            <a:gd name="adj5" fmla="val 6981"/>
+          </a:avLst>
+        </a:prstGeom>
+        <a:solidFill>
+          <a:schemeClr val="accent1">
+            <a:tint val="60000"/>
+            <a:hueOff val="0"/>
+            <a:satOff val="0"/>
+            <a:lumOff val="0"/>
+            <a:alphaOff val="0"/>
+          </a:schemeClr>
+        </a:solidFill>
+        <a:ln>
+          <a:noFill/>
+        </a:ln>
+        <a:effectLst/>
+      </dsp:spPr>
+      <dsp:style>
+        <a:lnRef idx="0">
+          <a:scrgbClr r="0" g="0" b="0"/>
+        </a:lnRef>
+        <a:fillRef idx="1">
+          <a:scrgbClr r="0" g="0" b="0"/>
+        </a:fillRef>
+        <a:effectRef idx="0">
+          <a:scrgbClr r="0" g="0" b="0"/>
+        </a:effectRef>
+        <a:fontRef idx="minor">
+          <a:schemeClr val="lt1"/>
+        </a:fontRef>
+      </dsp:style>
+    </dsp:sp>
+  </dsp:spTree>
+</dsp:drawing>
+</file>
+
+<file path=ppt/diagrams/layout1.xml><?xml version="1.0" encoding="utf-8"?>
+<dgm:layoutDef xmlns:dgm="http://schemas.openxmlformats.org/drawingml/2006/diagram" xmlns:a="http://schemas.openxmlformats.org/drawingml/2006/main" uniqueId="urn:microsoft.com/office/officeart/2005/8/layout/gear1">
+  <dgm:title val=""/>
+  <dgm:desc val=""/>
+  <dgm:catLst>
+    <dgm:cat type="relationship" pri="3000"/>
+    <dgm:cat type="process" pri="28000"/>
+    <dgm:cat type="cycle" pri="14000"/>
+  </dgm:catLst>
+  <dgm:sampData useDef="1">
+    <dgm:dataModel>
+      <dgm:ptLst/>
+      <dgm:bg/>
+      <dgm:whole/>
+    </dgm:dataModel>
+  </dgm:sampData>
+  <dgm:styleData>
+    <dgm:dataModel>
+      <dgm:ptLst>
+        <dgm:pt modelId="0" type="doc"/>
+        <dgm:pt modelId="1"/>
+        <dgm:pt modelId="2"/>
+      </dgm:ptLst>
+      <dgm:cxnLst>
+        <dgm:cxn modelId="3" srcId="0" destId="1" srcOrd="0" destOrd="0"/>
+        <dgm:cxn modelId="4" srcId="0" destId="2" srcOrd="1" destOrd="0"/>
+      </dgm:cxnLst>
+      <dgm:bg/>
+      <dgm:whole/>
+    </dgm:dataModel>
+  </dgm:styleData>
+  <dgm:clrData useDef="1">
+    <dgm:dataModel>
+      <dgm:ptLst/>
+      <dgm:bg/>
+      <dgm:whole/>
+    </dgm:dataModel>
+  </dgm:clrData>
+  <dgm:layoutNode name="composite">
+    <dgm:varLst>
+      <dgm:chMax val="3"/>
+      <dgm:animLvl val="lvl"/>
+      <dgm:resizeHandles val="exact"/>
+    </dgm:varLst>
+    <dgm:alg type="composite">
+      <dgm:param type="ar" val="1"/>
+    </dgm:alg>
+    <dgm:shape xmlns:r="http://schemas.openxmlformats.org/officeDocument/2006/relationships" r:blip="">
+      <dgm:adjLst/>
+    </dgm:shape>
+    <dgm:presOf/>
+    <dgm:choose name="Name0">
+      <dgm:if name="Name1" axis="ch" ptType="node" func="cnt" op="lte" val="1">
+        <dgm:constrLst>
+          <dgm:constr type="primFontSz" for="ch" ptType="node" op="equ" val="65"/>
+          <dgm:constr type="w" for="ch" forName="gear1" refType="w" fact="0.55"/>
+          <dgm:constr type="h" for="ch" forName="gear1" refType="w" fact="0.55"/>
+          <dgm:constr type="l" for="ch" forName="gear1" refType="w" fact="0.05"/>
+          <dgm:constr type="t" for="ch" forName="gear1" refType="w" fact="0.05"/>
+          <dgm:constr type="w" for="ch" forName="gear1srcNode" val="1"/>
+          <dgm:constr type="h" for="ch" forName="gear1srcNode" val="1"/>
+          <dgm:constr type="l" for="ch" forName="gear1srcNode" refType="w" fact="0.32"/>
+          <dgm:constr type="t" for="ch" forName="gear1srcNode"/>
+          <dgm:constr type="w" for="ch" forName="gear1dstNode" val="1"/>
+          <dgm:constr type="h" for="ch" forName="gear1dstNode" val="1"/>
+          <dgm:constr type="r" for="ch" forName="gear1dstNode" refType="w" fact="0.58"/>
+          <dgm:constr type="t" for="ch" forName="gear1dstNode" refType="h" fact="0.55"/>
+          <dgm:constr type="diam" for="des" forName="connector1" refType="w" refFor="ch" refForName="gear1" op="equ" fact="1.1"/>
+          <dgm:constr type="h" for="des" forName="connector1" refType="w" refFor="ch" refForName="gear1" op="equ" fact="0.1"/>
+          <dgm:constr type="w" for="ch" forName="gear1ch" refType="w" fact="0.35"/>
+          <dgm:constr type="h" for="ch" forName="gear1ch" refType="w" refFor="ch" refForName="gear1ch" fact="0.6"/>
+          <dgm:constr type="l" for="ch" forName="gear1ch"/>
+          <dgm:constr type="b" for="ch" forName="gear1ch" refType="h" fact="0.6"/>
+        </dgm:constrLst>
+      </dgm:if>
+      <dgm:if name="Name2" axis="ch" ptType="node" func="cnt" op="equ" val="2">
+        <dgm:constrLst>
+          <dgm:constr type="primFontSz" for="ch" ptType="node" op="equ" val="65"/>
+          <dgm:constr type="w" for="ch" forName="gear1" refType="w" fact="0.55"/>
+          <dgm:constr type="h" for="ch" forName="gear1" refType="w" fact="0.55"/>
+          <dgm:constr type="l" for="ch" forName="gear1" refType="w" fact="0.45"/>
+          <dgm:constr type="t" for="ch" forName="gear1" refType="w" fact="0.25"/>
+          <dgm:constr type="w" for="ch" forName="gear1srcNode" val="1"/>
+          <dgm:constr type="h" for="ch" forName="gear1srcNode" val="1"/>
+          <dgm:constr type="l" for="ch" forName="gear1srcNode" refType="w" fact="0.72"/>
+          <dgm:constr type="t" for="ch" forName="gear1srcNode" refType="w" fact="0.2"/>
+          <dgm:constr type="w" for="ch" forName="gear1dstNode" val="1"/>
+          <dgm:constr type="h" for="ch" forName="gear1dstNode" val="1"/>
+          <dgm:constr type="r" for="ch" forName="gear1dstNode" refType="w" fact="0.98"/>
+          <dgm:constr type="t" for="ch" forName="gear1dstNode" refType="h" fact="0.75"/>
+          <dgm:constr type="diam" for="des" forName="connector1" refType="w" refFor="ch" refForName="gear1" op="equ" fact="1.1"/>
+          <dgm:constr type="h" for="des" forName="connector1" refType="w" refFor="ch" refForName="gear1" op="equ" fact="0.1"/>
+          <dgm:constr type="w" for="ch" forName="gear1ch" refType="w" fact="0.35"/>
+          <dgm:constr type="h" for="ch" forName="gear1ch" refType="w" refFor="ch" refForName="gear1ch" fact="0.6"/>
+          <dgm:constr type="l" for="ch" forName="gear1ch" refType="w" fact="0.38"/>
+          <dgm:constr type="b" for="ch" forName="gear1ch" refType="w" fact="0.8"/>
+          <dgm:constr type="w" for="ch" forName="gear2" refType="w" fact="0.4"/>
+          <dgm:constr type="h" for="ch" forName="gear2" refType="w" fact="0.4"/>
+          <dgm:constr type="l" for="ch" forName="gear2" refType="w" fact="0.13"/>
+          <dgm:constr type="t" for="ch" forName="gear2" refType="w" fact="0.12"/>
+          <dgm:constr type="w" for="ch" forName="gear2srcNode" val="1"/>
+          <dgm:constr type="h" for="ch" forName="gear2srcNode" val="1"/>
+          <dgm:constr type="l" for="ch" forName="gear2srcNode" refType="w" fact="0.23"/>
+          <dgm:constr type="t" for="ch" forName="gear2srcNode" refType="w" fact="0.08"/>
+          <dgm:constr type="w" for="ch" forName="gear2dstNode" val="1"/>
+          <dgm:constr type="h" for="ch" forName="gear2dstNode" val="1"/>
+          <dgm:constr type="l" for="ch" forName="gear2dstNode" refType="w" fact="0.1"/>
+          <dgm:constr type="t" for="ch" forName="gear2dstNode" refType="h" fact="0.33"/>
+          <dgm:constr type="diam" for="des" forName="connector2" refType="w" refFor="ch" refForName="gear2" op="equ" fact="-1.1"/>
+          <dgm:constr type="h" for="des" forName="connector2" refType="w" refFor="ch" refForName="gear1" op="equ" fact="0.1"/>
+          <dgm:constr type="w" for="ch" forName="gear2ch" refType="w" fact="0.35"/>
+          <dgm:constr type="h" for="ch" forName="gear2ch" refType="w" refFor="ch" refForName="gear2ch" fact="0.6"/>
+          <dgm:constr type="l" for="ch" forName="gear2ch" refType="w" fact="0.34"/>
+          <dgm:constr type="t" for="ch" forName="gear2ch" refType="w" fact="0.04"/>
+        </dgm:constrLst>
+      </dgm:if>
+      <dgm:else name="Name3">
+        <dgm:constrLst>
+          <dgm:constr type="primFontSz" for="ch" ptType="node" op="equ" val="65"/>
+          <dgm:constr type="w" for="ch" forName="gear1" refType="w" fact="0.55"/>
+          <dgm:constr type="h" for="ch" forName="gear1" refType="w" fact="0.55"/>
+          <dgm:constr type="l" for="ch" forName="gear1" refType="w" fact="0.45"/>
+          <dgm:constr type="t" for="ch" forName="gear1" refType="w" fact="0.45"/>
+          <dgm:constr type="w" for="ch" forName="gear1srcNode" val="1"/>
+          <dgm:constr type="h" for="ch" forName="gear1srcNode" val="1"/>
+          <dgm:constr type="l" for="ch" forName="gear1srcNode" refType="w" fact="0.72"/>
+          <dgm:constr type="t" for="ch" forName="gear1srcNode" refType="w" fact="0.4"/>
+          <dgm:constr type="w" for="ch" forName="gear1dstNode" val="1"/>
+          <dgm:constr type="h" for="ch" forName="gear1dstNode" val="1"/>
+          <dgm:constr type="r" for="ch" forName="gear1dstNode" refType="w" fact="0.98"/>
+          <dgm:constr type="t" for="ch" forName="gear1dstNode" refType="h" fact="0.95"/>
+          <dgm:constr type="diam" for="des" forName="connector1" refType="w" refFor="ch" refForName="gear1" op="equ" fact="1.15"/>
+          <dgm:constr type="h" for="des" forName="connector1" refType="w" refFor="ch" refForName="gear1" op="equ" fact="0.1"/>
+          <dgm:constr type="w" for="ch" forName="gear1ch" refType="w" fact="0.35"/>
+          <dgm:constr type="h" for="ch" forName="gear1ch" refType="w" refFor="ch" refForName="gear1ch" fact="0.6"/>
+          <dgm:constr type="l" for="ch" forName="gear1ch" refType="w" fact="0.38"/>
+          <dgm:constr type="b" for="ch" forName="gear1ch" refType="h"/>
+          <dgm:constr type="w" for="ch" forName="gear2" refType="w" fact="0.4"/>
+          <dgm:constr type="h" for="ch" forName="gear2" refType="w" fact="0.4"/>
+          <dgm:constr type="l" for="ch" forName="gear2" refType="w" fact="0.13"/>
+          <dgm:constr type="t" for="ch" forName="gear2" refType="w" fact="0.32"/>
+          <dgm:constr type="w" for="ch" forName="gear2srcNode" val="1"/>
+          <dgm:constr type="h" for="ch" forName="gear2srcNode" val="1"/>
+          <dgm:constr type="l" for="ch" forName="gear2srcNode" refType="w" fact="0.23"/>
+          <dgm:constr type="t" for="ch" forName="gear2srcNode" refType="w" fact="0.28"/>
+          <dgm:constr type="w" for="ch" forName="gear2dstNode" val="1"/>
+          <dgm:constr type="h" for="ch" forName="gear2dstNode" val="1"/>
+          <dgm:constr type="l" for="ch" forName="gear2dstNode" refType="w" fact="0.1"/>
+          <dgm:constr type="t" for="ch" forName="gear2dstNode" refType="h" fact="0.53"/>
+          <dgm:constr type="diam" for="des" forName="connector2" refType="w" refFor="ch" refForName="gear2" op="equ" fact="-1.1"/>
+          <dgm:constr type="h" for="des" forName="connector2" refType="w" refFor="ch" refForName="gear1" op="equ" fact="0.1"/>
+          <dgm:constr type="w" for="ch" forName="gear2ch" refType="w" fact="0.35"/>
+          <dgm:constr type="h" for="ch" forName="gear2ch" refType="w" refFor="ch" refForName="gear2ch" fact="0.6"/>
+          <dgm:constr type="l" for="ch" forName="gear2ch"/>
+          <dgm:constr type="t" for="ch" forName="gear2ch" refType="w" fact="0.58"/>
+          <dgm:constr type="w" for="ch" forName="gear3" refType="w" fact="0.48"/>
+          <dgm:constr type="h" for="ch" forName="gear3" refType="w" fact="0.48"/>
+          <dgm:constr type="l" for="ch" forName="gear3" refType="w" fact="0.31"/>
+          <dgm:constr type="t" for="ch" forName="gear3"/>
+          <dgm:constr type="w" for="ch" forName="gear3tx" refType="w" fact="0.22"/>
+          <dgm:constr type="h" for="ch" forName="gear3tx" refType="w" fact="0.22"/>
+          <dgm:constr type="ctrX" for="ch" forName="gear3tx" refType="ctrX" refFor="ch" refForName="gear3"/>
+          <dgm:constr type="ctrY" for="ch" forName="gear3tx" refType="ctrY" refFor="ch" refForName="gear3"/>
+          <dgm:constr type="w" for="ch" forName="gear3srcNode" val="1"/>
+          <dgm:constr type="h" for="ch" forName="gear3srcNode" val="1"/>
+          <dgm:constr type="l" for="ch" forName="gear3srcNode" refType="w" fact="0.3"/>
+          <dgm:constr type="t" for="ch" forName="gear3srcNode" refType="w" fact="0.25"/>
+          <dgm:constr type="w" for="ch" forName="gear3dstNode" val="1"/>
+          <dgm:constr type="h" for="ch" forName="gear3dstNode" val="1"/>
+          <dgm:constr type="l" for="ch" forName="gear3dstNode" refType="w" fact="0.38"/>
+          <dgm:constr type="t" for="ch" forName="gear3dstNode" refType="h" fact="0.05"/>
+          <dgm:constr type="diam" for="des" forName="connector3" refType="w" refFor="ch" refForName="gear3" op="equ"/>
+          <dgm:constr type="h" for="des" forName="connector3" refType="w" refFor="ch" refForName="gear1" op="equ" fact="0.1"/>
+          <dgm:constr type="w" for="ch" forName="gear3ch" refType="w" fact="0.35"/>
+          <dgm:constr type="h" for="ch" forName="gear3ch" refType="w" refFor="ch" refForName="gear3ch" fact="0.6"/>
+          <dgm:constr type="l" for="ch" forName="gear3ch" refType="w" fact="0.65"/>
+          <dgm:constr type="t" for="ch" forName="gear3ch" refType="h" fact="0.13"/>
+        </dgm:constrLst>
+      </dgm:else>
+    </dgm:choose>
+    <dgm:ruleLst/>
+    <dgm:forEach name="Name4" axis="ch" ptType="node" cnt="1">
+      <dgm:layoutNode name="gear1" styleLbl="node1">
+        <dgm:varLst>
+          <dgm:chMax val="1"/>
+          <dgm:bulletEnabled val="1"/>
+        </dgm:varLst>
+        <dgm:alg type="tx">
+          <dgm:param type="txAnchorVertCh" val="mid"/>
+        </dgm:alg>
+        <dgm:shape xmlns:r="http://schemas.openxmlformats.org/officeDocument/2006/relationships" type="gear9" r:blip="">
+          <dgm:adjLst/>
+        </dgm:shape>
+        <dgm:presOf axis="self"/>
+        <dgm:constrLst>
+          <dgm:constr type="tMarg" refType="primFontSz" fact="0.1"/>
+          <dgm:constr type="bMarg" refType="primFontSz" fact="0.1"/>
+          <dgm:constr type="lMarg" refType="primFontSz" fact="0.1"/>
+          <dgm:constr type="rMarg" refType="primFontSz" fact="0.1"/>
+        </dgm:constrLst>
+        <dgm:ruleLst>
+          <dgm:rule type="primFontSz" val="5" fact="NaN" max="NaN"/>
+        </dgm:ruleLst>
+      </dgm:layoutNode>
+      <dgm:layoutNode name="gear1srcNode">
+        <dgm:alg type="sp"/>
+        <dgm:shape xmlns:r="http://schemas.openxmlformats.org/officeDocument/2006/relationships" type="rect" r:blip="" hideGeom="1">
+          <dgm:adjLst/>
+        </dgm:shape>
+        <dgm:presOf axis="self"/>
+        <dgm:constrLst/>
+        <dgm:ruleLst/>
+      </dgm:layoutNode>
+      <dgm:layoutNode name="gear1dstNode">
+        <dgm:alg type="sp"/>
+        <dgm:shape xmlns:r="http://schemas.openxmlformats.org/officeDocument/2006/relationships" type="rect" r:blip="" hideGeom="1">
+          <dgm:adjLst/>
+        </dgm:shape>
+        <dgm:presOf axis="self"/>
+        <dgm:constrLst/>
+        <dgm:ruleLst/>
+      </dgm:layoutNode>
+      <dgm:choose name="Name5">
+        <dgm:if name="Name6" axis="ch" ptType="node" func="cnt" op="gte" val="1">
+          <dgm:layoutNode name="gear1ch" styleLbl="fgAcc1">
+            <dgm:varLst>
+              <dgm:chMax val="0"/>
+              <dgm:bulletEnabled val="1"/>
+            </dgm:varLst>
+            <dgm:alg type="tx">
+              <dgm:param type="stBulletLvl" val="1"/>
+            </dgm:alg>
+            <dgm:shape xmlns:r="http://schemas.openxmlformats.org/officeDocument/2006/relationships" type="roundRect" r:blip="">
+              <dgm:adjLst>
+                <dgm:adj idx="1" val="0.1"/>
+              </dgm:adjLst>
+            </dgm:shape>
+            <dgm:presOf axis="des" ptType="node"/>
+            <dgm:constrLst>
+              <dgm:constr type="tMarg" refType="primFontSz" fact="0.3"/>
+              <dgm:constr type="bMarg" refType="primFontSz" fact="0.3"/>
+              <dgm:constr type="lMarg" refType="primFontSz" fact="0.3"/>
+              <dgm:constr type="rMarg" refType="primFontSz" fact="0.3"/>
+            </dgm:constrLst>
+            <dgm:ruleLst>
+              <dgm:rule type="primFontSz" val="5" fact="NaN" max="NaN"/>
+            </dgm:ruleLst>
+          </dgm:layoutNode>
+        </dgm:if>
+        <dgm:else name="Name7"/>
+      </dgm:choose>
+    </dgm:forEach>
+    <dgm:forEach name="Name8" axis="ch" ptType="node" st="2" cnt="1">
+      <dgm:layoutNode name="gear2" styleLbl="node1">
+        <dgm:varLst>
+          <dgm:chMax val="1"/>
+          <dgm:bulletEnabled val="1"/>
+        </dgm:varLst>
+        <dgm:alg type="tx">
+          <dgm:param type="txAnchorVertCh" val="mid"/>
+        </dgm:alg>
+        <dgm:shape xmlns:r="http://schemas.openxmlformats.org/officeDocument/2006/relationships" type="gear6" r:blip="">
+          <dgm:adjLst/>
+        </dgm:shape>
+        <dgm:presOf axis="self"/>
+        <dgm:constrLst>
+          <dgm:constr type="tMarg" refType="primFontSz" fact="0.1"/>
+          <dgm:constr type="bMarg" refType="primFontSz" fact="0.1"/>
+          <dgm:constr type="lMarg" refType="primFontSz" fact="0.1"/>
+          <dgm:constr type="rMarg" refType="primFontSz" fact="0.1"/>
+        </dgm:constrLst>
+        <dgm:ruleLst>
+          <dgm:rule type="primFontSz" val="5" fact="NaN" max="NaN"/>
+        </dgm:ruleLst>
+      </dgm:layoutNode>
+      <dgm:layoutNode name="gear2srcNode">
+        <dgm:alg type="sp"/>
+        <dgm:shape xmlns:r="http://schemas.openxmlformats.org/officeDocument/2006/relationships" type="rect" r:blip="" hideGeom="1">
+          <dgm:adjLst/>
+        </dgm:shape>
+        <dgm:presOf axis="self"/>
+        <dgm:constrLst/>
+        <dgm:ruleLst/>
+      </dgm:layoutNode>
+      <dgm:layoutNode name="gear2dstNode">
+        <dgm:alg type="sp"/>
+        <dgm:shape xmlns:r="http://schemas.openxmlformats.org/officeDocument/2006/relationships" type="rect" r:blip="" hideGeom="1">
+          <dgm:adjLst/>
+        </dgm:shape>
+        <dgm:presOf axis="self"/>
+        <dgm:constrLst/>
+        <dgm:ruleLst/>
+      </dgm:layoutNode>
+      <dgm:choose name="Name9">
+        <dgm:if name="Name10" axis="ch" ptType="node" func="cnt" op="gte" val="1">
+          <dgm:layoutNode name="gear2ch" styleLbl="fgAcc1">
+            <dgm:varLst>
+              <dgm:chMax val="0"/>
+              <dgm:bulletEnabled val="1"/>
+            </dgm:varLst>
+            <dgm:alg type="tx">
+              <dgm:param type="stBulletLvl" val="1"/>
+            </dgm:alg>
+            <dgm:shape xmlns:r="http://schemas.openxmlformats.org/officeDocument/2006/relationships" type="roundRect" r:blip="">
+              <dgm:adjLst>
+                <dgm:adj idx="1" val="0.1"/>
+              </dgm:adjLst>
+            </dgm:shape>
+            <dgm:presOf axis="des" ptType="node"/>
+            <dgm:constrLst>
+              <dgm:constr type="tMarg" refType="primFontSz" fact="0.3"/>
+              <dgm:constr type="bMarg" refType="primFontSz" fact="0.3"/>
+              <dgm:constr type="lMarg" refType="primFontSz" fact="0.3"/>
+              <dgm:constr type="rMarg" refType="primFontSz" fact="0.3"/>
+            </dgm:constrLst>
+            <dgm:ruleLst>
+              <dgm:rule type="primFontSz" val="5" fact="NaN" max="NaN"/>
+            </dgm:ruleLst>
+          </dgm:layoutNode>
+        </dgm:if>
+        <dgm:else name="Name11"/>
+      </dgm:choose>
+    </dgm:forEach>
+    <dgm:forEach name="Name12" axis="ch" ptType="node" st="3" cnt="1">
+      <dgm:layoutNode name="gear3" styleLbl="node1">
+        <dgm:alg type="sp"/>
+        <dgm:shape xmlns:r="http://schemas.openxmlformats.org/officeDocument/2006/relationships" rot="-15" type="gear6" r:blip="">
+          <dgm:adjLst/>
+        </dgm:shape>
+        <dgm:presOf axis="self"/>
+        <dgm:constrLst/>
+        <dgm:ruleLst/>
+      </dgm:layoutNode>
+      <dgm:layoutNode name="gear3tx" styleLbl="node1">
+        <dgm:varLst>
+          <dgm:chMax val="1"/>
+          <dgm:bulletEnabled val="1"/>
+        </dgm:varLst>
+        <dgm:alg type="tx">
+          <dgm:param type="txAnchorVertCh" val="mid"/>
+        </dgm:alg>
+        <dgm:shape xmlns:r="http://schemas.openxmlformats.org/officeDocument/2006/relationships" type="rect" r:blip="" hideGeom="1">
+          <dgm:adjLst/>
+        </dgm:shape>
+        <dgm:presOf axis="self"/>
+        <dgm:constrLst>
+          <dgm:constr type="tMarg" refType="primFontSz" fact="0.1"/>
+          <dgm:constr type="bMarg" refType="primFontSz" fact="0.1"/>
+          <dgm:constr type="lMarg" refType="primFontSz" fact="0.1"/>
+          <dgm:constr type="rMarg" refType="primFontSz" fact="0.1"/>
+        </dgm:constrLst>
+        <dgm:ruleLst>
+          <dgm:rule type="primFontSz" val="5" fact="NaN" max="NaN"/>
+        </dgm:ruleLst>
+      </dgm:layoutNode>
+      <dgm:layoutNode name="gear3srcNode">
+        <dgm:alg type="sp"/>
+        <dgm:shape xmlns:r="http://schemas.openxmlformats.org/officeDocument/2006/relationships" type="rect" r:blip="" hideGeom="1">
+          <dgm:adjLst/>
+        </dgm:shape>
+        <dgm:presOf axis="self"/>
+        <dgm:constrLst/>
+        <dgm:ruleLst/>
+      </dgm:layoutNode>
+      <dgm:layoutNode name="gear3dstNode">
+        <dgm:alg type="sp"/>
+        <dgm:shape xmlns:r="http://schemas.openxmlformats.org/officeDocument/2006/relationships" type="rect" r:blip="" hideGeom="1">
+          <dgm:adjLst/>
+        </dgm:shape>
+        <dgm:presOf axis="self"/>
+        <dgm:constrLst/>
+        <dgm:ruleLst/>
+      </dgm:layoutNode>
+      <dgm:choose name="Name13">
+        <dgm:if name="Name14" axis="ch" ptType="node" func="cnt" op="gte" val="1">
+          <dgm:layoutNode name="gear3ch" styleLbl="fgAcc1">
+            <dgm:varLst>
+              <dgm:chMax val="0"/>
+              <dgm:bulletEnabled val="1"/>
+            </dgm:varLst>
+            <dgm:alg type="tx">
+              <dgm:param type="stBulletLvl" val="1"/>
+            </dgm:alg>
+            <dgm:shape xmlns:r="http://schemas.openxmlformats.org/officeDocument/2006/relationships" type="roundRect" r:blip="">
+              <dgm:adjLst>
+                <dgm:adj idx="1" val="0.1"/>
+              </dgm:adjLst>
+            </dgm:shape>
+            <dgm:presOf axis="des" ptType="node"/>
+            <dgm:constrLst>
+              <dgm:constr type="tMarg" refType="primFontSz" fact="0.3"/>
+              <dgm:constr type="bMarg" refType="primFontSz" fact="0.3"/>
+              <dgm:constr type="lMarg" refType="primFontSz" fact="0.3"/>
+              <dgm:constr type="rMarg" refType="primFontSz" fact="0.3"/>
+            </dgm:constrLst>
+            <dgm:ruleLst>
+              <dgm:rule type="primFontSz" val="5" fact="NaN" max="NaN"/>
+            </dgm:ruleLst>
+          </dgm:layoutNode>
+        </dgm:if>
+        <dgm:else name="Name15"/>
+      </dgm:choose>
+    </dgm:forEach>
+    <dgm:forEach name="Name16" axis="ch" ptType="sibTrans" hideLastTrans="0" cnt="1">
+      <dgm:layoutNode name="connector1" styleLbl="sibTrans2D1">
+        <dgm:alg type="conn">
+          <dgm:param type="connRout" val="curve"/>
+          <dgm:param type="srcNode" val="gear1srcNode"/>
+          <dgm:param type="dstNode" val="gear1dstNode"/>
+          <dgm:param type="begPts" val="midR"/>
+          <dgm:param type="endPts" val="tCtr"/>
+        </dgm:alg>
+        <dgm:shape xmlns:r="http://schemas.openxmlformats.org/officeDocument/2006/relationships" type="conn" r:blip="">
+          <dgm:adjLst/>
+        </dgm:shape>
+        <dgm:presOf axis="self"/>
+        <dgm:constrLst>
+          <dgm:constr type="w" val="10"/>
+          <dgm:constr type="h" val="10"/>
+          <dgm:constr type="begPad"/>
+          <dgm:constr type="endPad"/>
+        </dgm:constrLst>
+        <dgm:ruleLst/>
+      </dgm:layoutNode>
+    </dgm:forEach>
+    <dgm:forEach name="Name17" axis="ch" ptType="sibTrans" hideLastTrans="0" st="2" cnt="1">
+      <dgm:layoutNode name="connector2" styleLbl="sibTrans2D1">
+        <dgm:alg type="conn">
+          <dgm:param type="connRout" val="curve"/>
+          <dgm:param type="srcNode" val="gear2srcNode"/>
+          <dgm:param type="dstNode" val="gear2dstNode"/>
+          <dgm:param type="begPts" val="midL"/>
+          <dgm:param type="endPts" val="midL"/>
+        </dgm:alg>
+        <dgm:shape xmlns:r="http://schemas.openxmlformats.org/officeDocument/2006/relationships" type="conn" r:blip="">
+          <dgm:adjLst/>
+        </dgm:shape>
+        <dgm:presOf axis="self"/>
+        <dgm:constrLst>
+          <dgm:constr type="w" val="10"/>
+          <dgm:constr type="h" val="10"/>
+          <dgm:constr type="begPad"/>
+          <dgm:constr type="endPad"/>
+        </dgm:constrLst>
+        <dgm:ruleLst/>
+      </dgm:layoutNode>
+    </dgm:forEach>
+    <dgm:forEach name="Name18" axis="ch" ptType="sibTrans" hideLastTrans="0" st="3" cnt="1">
+      <dgm:layoutNode name="connector3" styleLbl="sibTrans2D1">
+        <dgm:alg type="conn">
+          <dgm:param type="connRout" val="curve"/>
+          <dgm:param type="srcNode" val="gear3srcNode"/>
+          <dgm:param type="dstNode" val="gear3dstNode"/>
+          <dgm:param type="begPts" val="midL"/>
+          <dgm:param type="endPts" val="midL"/>
+        </dgm:alg>
+        <dgm:shape xmlns:r="http://schemas.openxmlformats.org/officeDocument/2006/relationships" type="conn" r:blip="">
+          <dgm:adjLst/>
+        </dgm:shape>
+        <dgm:presOf axis="self"/>
+        <dgm:constrLst>
+          <dgm:constr type="w" val="10"/>
+          <dgm:constr type="h" val="10"/>
+          <dgm:constr type="begPad"/>
+          <dgm:constr type="endPad"/>
+        </dgm:constrLst>
+        <dgm:ruleLst/>
+      </dgm:layoutNode>
+    </dgm:forEach>
+  </dgm:layoutNode>
+</dgm:layoutDef>
+</file>
+
+<file path=ppt/diagrams/quickStyle1.xml><?xml version="1.0" encoding="utf-8"?>
+<dgm:styleDef xmlns:dgm="http://schemas.openxmlformats.org/drawingml/2006/diagram" xmlns:a="http://schemas.openxmlformats.org/drawingml/2006/main" uniqueId="urn:microsoft.com/office/officeart/2005/8/quickstyle/simple1">
+  <dgm:title val=""/>
+  <dgm:desc val=""/>
+  <dgm:catLst>
+    <dgm:cat type="simple" pri="10100"/>
+  </dgm:catLst>
+  <dgm:scene3d>
+    <a:camera prst="orthographicFront"/>
+    <a:lightRig rig="threePt" dir="t"/>
+  </dgm:scene3d>
+  <dgm:styleLbl name="node0">
+    <dgm:scene3d>
+      <a:camera prst="orthographicFront"/>
+      <a:lightRig rig="threePt" dir="t"/>
+    </dgm:scene3d>
+    <dgm:sp3d/>
+    <dgm:txPr/>
+    <dgm:style>
+      <a:lnRef idx="2">
+        <a:scrgbClr r="0" g="0" b="0"/>
+      </a:lnRef>
+      <a:fillRef idx="1">
+        <a:scrgbClr r="0" g="0" b="0"/>
+      </a:fillRef>
+      <a:effectRef idx="0">
+        <a:scrgbClr r="0" g="0" b="0"/>
+      </a:effectRef>
+      <a:fontRef idx="minor">
+        <a:schemeClr val="lt1"/>
+      </a:fontRef>
+    </dgm:style>
+  </dgm:styleLbl>
+  <dgm:styleLbl name="lnNode1">
+    <dgm:scene3d>
+      <a:camera prst="orthographicFront"/>
+      <a:lightRig rig="threePt" dir="t"/>
+    </dgm:scene3d>
+    <dgm:sp3d/>
+    <dgm:txPr/>
+    <dgm:style>
+      <a:lnRef idx="2">
+        <a:scrgbClr r="0" g="0" b="0"/>
+      </a:lnRef>
+      <a:fillRef idx="1">
+        <a:scrgbClr r="0" g="0" b="0"/>
+      </a:fillRef>
+      <a:effectRef idx="0">
+        <a:scrgbClr r="0" g="0" b="0"/>
+      </a:effectRef>
+      <a:fontRef idx="minor">
+        <a:schemeClr val="lt1"/>
+      </a:fontRef>
+    </dgm:style>
+  </dgm:styleLbl>
+  <dgm:styleLbl name="vennNode1">
+    <dgm:scene3d>
+      <a:camera prst="orthographicFront"/>
+      <a:lightRig rig="threePt" dir="t"/>
+    </dgm:scene3d>
+    <dgm:sp3d/>
+    <dgm:txPr/>
+    <dgm:style>
+      <a:lnRef idx="2">
+        <a:scrgbClr r="0" g="0" b="0"/>
+      </a:lnRef>
+      <a:fillRef idx="1">
+        <a:scrgbClr r="0" g="0" b="0"/>
+      </a:fillRef>
+      <a:effectRef idx="0">
+        <a:scrgbClr r="0" g="0" b="0"/>
+      </a:effectRef>
+      <a:fontRef idx="minor">
+        <a:schemeClr val="tx1"/>
+      </a:fontRef>
+    </dgm:style>
+  </dgm:styleLbl>
+  <dgm:styleLbl name="alignNode1">
+    <dgm:scene3d>
+      <a:camera prst="orthographicFront"/>
+      <a:lightRig rig="threePt" dir="t"/>
+    </dgm:scene3d>
+    <dgm:sp3d/>
+    <dgm:txPr/>
+    <dgm:style>
+      <a:lnRef idx="2">
+        <a:scrgbClr r="0" g="0" b="0"/>
+      </a:lnRef>
+      <a:fillRef idx="1">
+        <a:scrgbClr r="0" g="0" b="0"/>
+      </a:fillRef>
+      <a:effectRef idx="0">
+        <a:scrgbClr r="0" g="0" b="0"/>
+      </a:effectRef>
+      <a:fontRef idx="minor">
+        <a:schemeClr val="lt1"/>
+      </a:fontRef>
+    </dgm:style>
+  </dgm:styleLbl>
+  <dgm:styleLbl name="node1">
+    <dgm:scene3d>
+      <a:camera prst="orthographicFront"/>
+      <a:lightRig rig="threePt" dir="t"/>
+    </dgm:scene3d>
+    <dgm:sp3d/>
+    <dgm:txPr/>
+    <dgm:style>
+      <a:lnRef idx="2">
+        <a:scrgbClr r="0" g="0" b="0"/>
+      </a:lnRef>
+      <a:fillRef idx="1">
+        <a:scrgbClr r="0" g="0" b="0"/>
+      </a:fillRef>
+      <a:effectRef idx="0">
+        <a:scrgbClr r="0" g="0" b="0"/>
+      </a:effectRef>
+      <a:fontRef idx="minor">
+        <a:schemeClr val="lt1"/>
+      </a:fontRef>
+    </dgm:style>
+  </dgm:styleLbl>
+  <dgm:styleLbl name="node2">
+    <dgm:scene3d>
+      <a:camera prst="orthographicFront"/>
+      <a:lightRig rig="threePt" dir="t"/>
+    </dgm:scene3d>
+    <dgm:sp3d/>
+    <dgm:txPr/>
+    <dgm:style>
+      <a:lnRef idx="2">
+        <a:scrgbClr r="0" g="0" b="0"/>
+      </a:lnRef>
+      <a:fillRef idx="1">
+        <a:scrgbClr r="0" g="0" b="0"/>
+      </a:fillRef>
+      <a:effectRef idx="0">
+        <a:scrgbClr r="0" g="0" b="0"/>
+      </a:effectRef>
+      <a:fontRef idx="minor">
+        <a:schemeClr val="lt1"/>
+      </a:fontRef>
+    </dgm:style>
+  </dgm:styleLbl>
+  <dgm:styleLbl name="node3">
+    <dgm:scene3d>
+      <a:camera prst="orthographicFront"/>
+      <a:lightRig rig="threePt" dir="t"/>
+    </dgm:scene3d>
+    <dgm:sp3d/>
+    <dgm:txPr/>
+    <dgm:style>
+      <a:lnRef idx="2">
+        <a:scrgbClr r="0" g="0" b="0"/>
+      </a:lnRef>
+      <a:fillRef idx="1">
+        <a:scrgbClr r="0" g="0" b="0"/>
+      </a:fillRef>
+      <a:effectRef idx="0">
+        <a:scrgbClr r="0" g="0" b="0"/>
+      </a:effectRef>
+      <a:fontRef idx="minor">
+        <a:schemeClr val="lt1"/>
+      </a:fontRef>
+    </dgm:style>
+  </dgm:styleLbl>
+  <dgm:styleLbl name="node4">
+    <dgm:scene3d>
+      <a:camera prst="orthographicFront"/>
+      <a:lightRig rig="threePt" dir="t"/>
+    </dgm:scene3d>
+    <dgm:sp3d/>
+    <dgm:txPr/>
+    <dgm:style>
+      <a:lnRef idx="2">
+        <a:scrgbClr r="0" g="0" b="0"/>
+      </a:lnRef>
+      <a:fillRef idx="1">
+        <a:scrgbClr r="0" g="0" b="0"/>
+      </a:fillRef>
+      <a:effectRef idx="0">
+        <a:scrgbClr r="0" g="0" b="0"/>
+      </a:effectRef>
+      <a:fontRef idx="minor">
+        <a:schemeClr val="lt1"/>
+      </a:fontRef>
+    </dgm:style>
+  </dgm:styleLbl>
+  <dgm:styleLbl name="fgImgPlace1">
+    <dgm:scene3d>
+      <a:camera prst="orthographicFront"/>
+      <a:lightRig rig="threePt" dir="t"/>
+    </dgm:scene3d>
+    <dgm:sp3d/>
+    <dgm:txPr/>
+    <dgm:style>
+      <a:lnRef idx="2">
+        <a:scrgbClr r="0" g="0" b="0"/>
+      </a:lnRef>
+      <a:fillRef idx="1">
+        <a:scrgbClr r="0" g="0" b="0"/>
+      </a:fillRef>
+      <a:effectRef idx="0">
+        <a:scrgbClr r="0" g="0" b="0"/>
+      </a:effectRef>
+      <a:fontRef idx="minor"/>
+    </dgm:style>
+  </dgm:styleLbl>
+  <dgm:styleLbl name="alignImgPlace1">
+    <dgm:scene3d>
+      <a:camera prst="orthographicFront"/>
+      <a:lightRig rig="threePt" dir="t"/>
+    </dgm:scene3d>
+    <dgm:sp3d/>
+    <dgm:txPr/>
+    <dgm:style>
+      <a:lnRef idx="2">
+        <a:scrgbClr r="0" g="0" b="0"/>
+      </a:lnRef>
+      <a:fillRef idx="1">
+        <a:scrgbClr r="0" g="0" b="0"/>
+      </a:fillRef>
+      <a:effectRef idx="0">
+        <a:scrgbClr r="0" g="0" b="0"/>
+      </a:effectRef>
+      <a:fontRef idx="minor"/>
+    </dgm:style>
+  </dgm:styleLbl>
+  <dgm:styleLbl name="bgImgPlace1">
+    <dgm:scene3d>
+      <a:camera prst="orthographicFront"/>
+      <a:lightRig rig="threePt" dir="t"/>
+    </dgm:scene3d>
+    <dgm:sp3d/>
+    <dgm:txPr/>
+    <dgm:style>
+      <a:lnRef idx="2">
+        <a:scrgbClr r="0" g="0" b="0"/>
+      </a:lnRef>
+      <a:fillRef idx="1">
+        <a:scrgbClr r="0" g="0" b="0"/>
+      </a:fillRef>
+      <a:effectRef idx="0">
+        <a:scrgbClr r="0" g="0" b="0"/>
+      </a:effectRef>
+      <a:fontRef idx="minor"/>
+    </dgm:style>
+  </dgm:styleLbl>
+  <dgm:styleLbl name="sibTrans2D1">
+    <dgm:scene3d>
+      <a:camera prst="orthographicFront"/>
+      <a:lightRig rig="threePt" dir="t"/>
+    </dgm:scene3d>
+    <dgm:sp3d/>
+    <dgm:txPr/>
+    <dgm:style>
+      <a:lnRef idx="0">
+        <a:scrgbClr r="0" g="0" b="0"/>
+      </a:lnRef>
+      <a:fillRef idx="1">
+        <a:scrgbClr r="0" g="0" b="0"/>
+      </a:fillRef>
+      <a:effectRef idx="0">
+        <a:scrgbClr r="0" g="0" b="0"/>
+      </a:effectRef>
+      <a:fontRef idx="minor">
+        <a:schemeClr val="lt1"/>
+      </a:fontRef>
+    </dgm:style>
+  </dgm:styleLbl>
+  <dgm:styleLbl name="fgSibTrans2D1">
+    <dgm:scene3d>
+      <a:camera prst="orthographicFront"/>
+      <a:lightRig rig="threePt" dir="t"/>
+    </dgm:scene3d>
+    <dgm:sp3d/>
+    <dgm:txPr/>
+    <dgm:style>
+      <a:lnRef idx="0">
+        <a:scrgbClr r="0" g="0" b="0"/>
+      </a:lnRef>
+      <a:fillRef idx="1">
+        <a:scrgbClr r="0" g="0" b="0"/>
+      </a:fillRef>
+      <a:effectRef idx="0">
+        <a:scrgbClr r="0" g="0" b="0"/>
+      </a:effectRef>
+      <a:fontRef idx="minor">
+        <a:schemeClr val="lt1"/>
+      </a:fontRef>
+    </dgm:style>
+  </dgm:styleLbl>
+  <dgm:styleLbl name="bgSibTrans2D1">
+    <dgm:scene3d>
+      <a:camera prst="orthographicFront"/>
+      <a:lightRig rig="threePt" dir="t"/>
+    </dgm:scene3d>
+    <dgm:sp3d/>
+    <dgm:txPr/>
+    <dgm:style>
+      <a:lnRef idx="0">
+        <a:scrgbClr r="0" g="0" b="0"/>
+      </a:lnRef>
+      <a:fillRef idx="1">
+        <a:scrgbClr r="0" g="0" b="0"/>
+      </a:fillRef>
+      <a:effectRef idx="0">
+        <a:scrgbClr r="0" g="0" b="0"/>
+      </a:effectRef>
+      <a:fontRef idx="minor">
+        <a:schemeClr val="lt1"/>
+      </a:fontRef>
+    </dgm:style>
+  </dgm:styleLbl>
+  <dgm:styleLbl name="sibTrans1D1">
+    <dgm:scene3d>
+      <a:camera prst="orthographicFront"/>
+      <a:lightRig rig="threePt" dir="t"/>
+    </dgm:scene3d>
+    <dgm:sp3d/>
+    <dgm:txPr/>
+    <dgm:style>
+      <a:lnRef idx="1">
+        <a:scrgbClr r="0" g="0" b="0"/>
+      </a:lnRef>
+      <a:fillRef idx="0">
+        <a:scrgbClr r="0" g="0" b="0"/>
+      </a:fillRef>
+      <a:effectRef idx="0">
+        <a:scrgbClr r="0" g="0" b="0"/>
+      </a:effectRef>
+      <a:fontRef idx="minor"/>
+    </dgm:style>
+  </dgm:styleLbl>
+  <dgm:styleLbl name="callout">
+    <dgm:scene3d>
+      <a:camera prst="orthographicFront"/>
+      <a:lightRig rig="threePt" dir="t"/>
+    </dgm:scene3d>
+    <dgm:sp3d/>
+    <dgm:txPr/>
+    <dgm:style>
+      <a:lnRef idx="2">
+        <a:scrgbClr r="0" g="0" b="0"/>
+      </a:lnRef>
+      <a:fillRef idx="1">
+        <a:scrgbClr r="0" g="0" b="0"/>
+      </a:fillRef>
+      <a:effectRef idx="0">
+        <a:scrgbClr r="0" g="0" b="0"/>
+      </a:effectRef>
+      <a:fontRef idx="minor"/>
+    </dgm:style>
+  </dgm:styleLbl>
+  <dgm:styleLbl name="asst0">
+    <dgm:scene3d>
+      <a:camera prst="orthographicFront"/>
+      <a:lightRig rig="threePt" dir="t"/>
+    </dgm:scene3d>
+    <dgm:sp3d/>
+    <dgm:txPr/>
+    <dgm:style>
+      <a:lnRef idx="2">
+        <a:scrgbClr r="0" g="0" b="0"/>
+      </a:lnRef>
+      <a:fillRef idx="1">
+        <a:scrgbClr r="0" g="0" b="0"/>
+      </a:fillRef>
+      <a:effectRef idx="0">
+        <a:scrgbClr r="0" g="0" b="0"/>
+      </a:effectRef>
+      <a:fontRef idx="minor">
+        <a:schemeClr val="lt1"/>
+      </a:fontRef>
+    </dgm:style>
+  </dgm:styleLbl>
+  <dgm:styleLbl name="asst1">
+    <dgm:scene3d>
+      <a:camera prst="orthographicFront"/>
+      <a:lightRig rig="threePt" dir="t"/>
+    </dgm:scene3d>
+    <dgm:sp3d/>
+    <dgm:txPr/>
+    <dgm:style>
+      <a:lnRef idx="2">
+        <a:scrgbClr r="0" g="0" b="0"/>
+      </a:lnRef>
+      <a:fillRef idx="1">
+        <a:scrgbClr r="0" g="0" b="0"/>
+      </a:fillRef>
+      <a:effectRef idx="0">
+        <a:scrgbClr r="0" g="0" b="0"/>
+      </a:effectRef>
+      <a:fontRef idx="minor">
+        <a:schemeClr val="lt1"/>
+      </a:fontRef>
+    </dgm:style>
+  </dgm:styleLbl>
+  <dgm:styleLbl name="asst2">
+    <dgm:scene3d>
+      <a:camera prst="orthographicFront"/>
+      <a:lightRig rig="threePt" dir="t"/>
+    </dgm:scene3d>
+    <dgm:sp3d/>
+    <dgm:txPr/>
+    <dgm:style>
+      <a:lnRef idx="2">
+        <a:scrgbClr r="0" g="0" b="0"/>
+      </a:lnRef>
+      <a:fillRef idx="1">
+        <a:scrgbClr r="0" g="0" b="0"/>
+      </a:fillRef>
+      <a:effectRef idx="0">
+        <a:scrgbClr r="0" g="0" b="0"/>
+      </a:effectRef>
+      <a:fontRef idx="minor">
+        <a:schemeClr val="lt1"/>
+      </a:fontRef>
+    </dgm:style>
+  </dgm:styleLbl>
+  <dgm:styleLbl name="asst3">
+    <dgm:scene3d>
+      <a:camera prst="orthographicFront"/>
+      <a:lightRig rig="threePt" dir="t"/>
+    </dgm:scene3d>
+    <dgm:sp3d/>
+    <dgm:txPr/>
+    <dgm:style>
+      <a:lnRef idx="2">
+        <a:scrgbClr r="0" g="0" b="0"/>
+      </a:lnRef>
+      <a:fillRef idx="1">
+        <a:scrgbClr r="0" g="0" b="0"/>
+      </a:fillRef>
+      <a:effectRef idx="0">
+        <a:scrgbClr r="0" g="0" b="0"/>
+      </a:effectRef>
+      <a:fontRef idx="minor">
+        <a:schemeClr val="lt1"/>
+      </a:fontRef>
+    </dgm:style>
+  </dgm:styleLbl>
+  <dgm:styleLbl name="asst4">
+    <dgm:scene3d>
+      <a:camera prst="orthographicFront"/>
+      <a:lightRig rig="threePt" dir="t"/>
+    </dgm:scene3d>
+    <dgm:sp3d/>
+    <dgm:txPr/>
+    <dgm:style>
+      <a:lnRef idx="2">
+        <a:scrgbClr r="0" g="0" b="0"/>
+      </a:lnRef>
+      <a:fillRef idx="1">
+        <a:scrgbClr r="0" g="0" b="0"/>
+      </a:fillRef>
+      <a:effectRef idx="0">
+        <a:scrgbClr r="0" g="0" b="0"/>
+      </a:effectRef>
+      <a:fontRef idx="minor">
+        <a:schemeClr val="lt1"/>
+      </a:fontRef>
+    </dgm:style>
+  </dgm:styleLbl>
+  <dgm:styleLbl name="parChTrans2D1">
+    <dgm:scene3d>
+      <a:camera prst="orthographicFront"/>
+      <a:lightRig rig="threePt" dir="t"/>
+    </dgm:scene3d>
+    <dgm:sp3d/>
+    <dgm:txPr/>
+    <dgm:style>
+      <a:lnRef idx="2">
+        <a:scrgbClr r="0" g="0" b="0"/>
+      </a:lnRef>
+      <a:fillRef idx="1">
+        <a:scrgbClr r="0" g="0" b="0"/>
+      </a:fillRef>
+      <a:effectRef idx="0">
+        <a:scrgbClr r="0" g="0" b="0"/>
+      </a:effectRef>
+      <a:fontRef idx="minor">
+        <a:schemeClr val="lt1"/>
+      </a:fontRef>
+    </dgm:style>
+  </dgm:styleLbl>
+  <dgm:styleLbl name="parChTrans2D2">
+    <dgm:scene3d>
+      <a:camera prst="orthographicFront"/>
+      <a:lightRig rig="threePt" dir="t"/>
+    </dgm:scene3d>
+    <dgm:sp3d/>
+    <dgm:txPr/>
+    <dgm:style>
+      <a:lnRef idx="2">
+        <a:scrgbClr r="0" g="0" b="0"/>
+      </a:lnRef>
+      <a:fillRef idx="1">
+        <a:scrgbClr r="0" g="0" b="0"/>
+      </a:fillRef>
+      <a:effectRef idx="0">
+        <a:scrgbClr r="0" g="0" b="0"/>
+      </a:effectRef>
+      <a:fontRef idx="minor">
+        <a:schemeClr val="lt1"/>
+      </a:fontRef>
+    </dgm:style>
+  </dgm:styleLbl>
+  <dgm:styleLbl name="parChTrans2D3">
+    <dgm:scene3d>
+      <a:camera prst="orthographicFront"/>
+      <a:lightRig rig="threePt" dir="t"/>
+    </dgm:scene3d>
+    <dgm:sp3d/>
+    <dgm:txPr/>
+    <dgm:style>
+      <a:lnRef idx="2">
+        <a:scrgbClr r="0" g="0" b="0"/>
+      </a:lnRef>
+      <a:fillRef idx="1">
+        <a:scrgbClr r="0" g="0" b="0"/>
+      </a:fillRef>
+      <a:effectRef idx="0">
+        <a:scrgbClr r="0" g="0" b="0"/>
+      </a:effectRef>
+      <a:fontRef idx="minor">
+        <a:schemeClr val="lt1"/>
+      </a:fontRef>
+    </dgm:style>
+  </dgm:styleLbl>
+  <dgm:styleLbl name="parChTrans2D4">
+    <dgm:scene3d>
+      <a:camera prst="orthographicFront"/>
+      <a:lightRig rig="threePt" dir="t"/>
+    </dgm:scene3d>
+    <dgm:sp3d/>
+    <dgm:txPr/>
+    <dgm:style>
+      <a:lnRef idx="2">
+        <a:scrgbClr r="0" g="0" b="0"/>
+      </a:lnRef>
+      <a:fillRef idx="1">
+        <a:scrgbClr r="0" g="0" b="0"/>
+      </a:fillRef>
+      <a:effectRef idx="0">
+        <a:scrgbClr r="0" g="0" b="0"/>
+      </a:effectRef>
+      <a:fontRef idx="minor">
+        <a:schemeClr val="lt1"/>
+      </a:fontRef>
+    </dgm:style>
+  </dgm:styleLbl>
+  <dgm:styleLbl name="parChTrans1D1">
+    <dgm:scene3d>
+      <a:camera prst="orthographicFront"/>
+      <a:lightRig rig="threePt" dir="t"/>
+    </dgm:scene3d>
+    <dgm:sp3d/>
+    <dgm:txPr/>
+    <dgm:style>
+      <a:lnRef idx="2">
+        <a:scrgbClr r="0" g="0" b="0"/>
+      </a:lnRef>
+      <a:fillRef idx="0">
+        <a:scrgbClr r="0" g="0" b="0"/>
+      </a:fillRef>
+      <a:effectRef idx="0">
+        <a:scrgbClr r="0" g="0" b="0"/>
+      </a:effectRef>
+      <a:fontRef idx="minor"/>
+    </dgm:style>
+  </dgm:styleLbl>
+  <dgm:styleLbl name="parChTrans1D2">
+    <dgm:scene3d>
+      <a:camera prst="orthographicFront"/>
+      <a:lightRig rig="threePt" dir="t"/>
+    </dgm:scene3d>
+    <dgm:sp3d/>
+    <dgm:txPr/>
+    <dgm:style>
+      <a:lnRef idx="2">
+        <a:scrgbClr r="0" g="0" b="0"/>
+      </a:lnRef>
+      <a:fillRef idx="0">
+        <a:scrgbClr r="0" g="0" b="0"/>
+      </a:fillRef>
+      <a:effectRef idx="0">
+        <a:scrgbClr r="0" g="0" b="0"/>
+      </a:effectRef>
+      <a:fontRef idx="minor"/>
+    </dgm:style>
+  </dgm:styleLbl>
+  <dgm:styleLbl name="parChTrans1D3">
+    <dgm:scene3d>
+      <a:camera prst="orthographicFront"/>
+      <a:lightRig rig="threePt" dir="t"/>
+    </dgm:scene3d>
+    <dgm:sp3d/>
+    <dgm:txPr/>
+    <dgm:style>
+      <a:lnRef idx="2">
+        <a:scrgbClr r="0" g="0" b="0"/>
+      </a:lnRef>
+      <a:fillRef idx="0">
+        <a:scrgbClr r="0" g="0" b="0"/>
+      </a:fillRef>
+      <a:effectRef idx="0">
+        <a:scrgbClr r="0" g="0" b="0"/>
+      </a:effectRef>
+      <a:fontRef idx="minor"/>
+    </dgm:style>
+  </dgm:styleLbl>
+  <dgm:styleLbl name="parChTrans1D4">
+    <dgm:scene3d>
+      <a:camera prst="orthographicFront"/>
+      <a:lightRig rig="threePt" dir="t"/>
+    </dgm:scene3d>
+    <dgm:sp3d/>
+    <dgm:txPr/>
+    <dgm:style>
+      <a:lnRef idx="2">
+        <a:scrgbClr r="0" g="0" b="0"/>
+      </a:lnRef>
+      <a:fillRef idx="0">
+        <a:scrgbClr r="0" g="0" b="0"/>
+      </a:fillRef>
+      <a:effectRef idx="0">
+        <a:scrgbClr r="0" g="0" b="0"/>
+      </a:effectRef>
+      <a:fontRef idx="minor"/>
+    </dgm:style>
+  </dgm:styleLbl>
+  <dgm:styleLbl name="fgAcc1">
+    <dgm:scene3d>
+      <a:camera prst="orthographicFront"/>
+      <a:lightRig rig="threePt" dir="t"/>
+    </dgm:scene3d>
+    <dgm:sp3d/>
+    <dgm:txPr/>
+    <dgm:style>
+      <a:lnRef idx="2">
+        <a:scrgbClr r="0" g="0" b="0"/>
+      </a:lnRef>
+      <a:fillRef idx="1">
+        <a:scrgbClr r="0" g="0" b="0"/>
+      </a:fillRef>
+      <a:effectRef idx="0">
+        <a:scrgbClr r="0" g="0" b="0"/>
+      </a:effectRef>
+      <a:fontRef idx="minor"/>
+    </dgm:style>
+  </dgm:styleLbl>
+  <dgm:styleLbl name="conFgAcc1">
+    <dgm:scene3d>
+      <a:camera prst="orthographicFront"/>
+      <a:lightRig rig="threePt" dir="t"/>
+    </dgm:scene3d>
+    <dgm:sp3d/>
+    <dgm:txPr/>
+    <dgm:style>
+      <a:lnRef idx="2">
+        <a:scrgbClr r="0" g="0" b="0"/>
+      </a:lnRef>
+      <a:fillRef idx="1">
+        <a:scrgbClr r="0" g="0" b="0"/>
+      </a:fillRef>
+      <a:effectRef idx="0">
+        <a:scrgbClr r="0" g="0" b="0"/>
+      </a:effectRef>
+      <a:fontRef idx="minor"/>
+    </dgm:style>
+  </dgm:styleLbl>
+  <dgm:styleLbl name="alignAcc1">
+    <dgm:scene3d>
+      <a:camera prst="orthographicFront"/>
+      <a:lightRig rig="threePt" dir="t"/>
+    </dgm:scene3d>
+    <dgm:sp3d/>
+    <dgm:txPr/>
+    <dgm:style>
+      <a:lnRef idx="2">
+        <a:scrgbClr r="0" g="0" b="0"/>
+      </a:lnRef>
+      <a:fillRef idx="1">
+        <a:scrgbClr r="0" g="0" b="0"/>
+      </a:fillRef>
+      <a:effectRef idx="0">
+        <a:scrgbClr r="0" g="0" b="0"/>
+      </a:effectRef>
+      <a:fontRef idx="minor"/>
+    </dgm:style>
+  </dgm:styleLbl>
+  <dgm:styleLbl name="trAlignAcc1">
+    <dgm:scene3d>
+      <a:camera prst="orthographicFront"/>
+      <a:lightRig rig="threePt" dir="t"/>
+    </dgm:scene3d>
+    <dgm:sp3d/>
+    <dgm:txPr/>
+    <dgm:style>
+      <a:lnRef idx="1">
+        <a:scrgbClr r="0" g="0" b="0"/>
+      </a:lnRef>
+      <a:fillRef idx="1">
+        <a:scrgbClr r="0" g="0" b="0"/>
+      </a:fillRef>
+      <a:effectRef idx="0">
+        <a:scrgbClr r="0" g="0" b="0"/>
+      </a:effectRef>
+      <a:fontRef idx="minor"/>
+    </dgm:style>
+  </dgm:styleLbl>
+  <dgm:styleLbl name="bgAcc1">
+    <dgm:scene3d>
+      <a:camera prst="orthographicFront"/>
+      <a:lightRig rig="threePt" dir="t"/>
+    </dgm:scene3d>
+    <dgm:sp3d/>
+    <dgm:txPr/>
+    <dgm:style>
+      <a:lnRef idx="2">
+        <a:scrgbClr r="0" g="0" b="0"/>
+      </a:lnRef>
+      <a:fillRef idx="1">
+        <a:scrgbClr r="0" g="0" b="0"/>
+      </a:fillRef>
+      <a:effectRef idx="0">
+        <a:scrgbClr r="0" g="0" b="0"/>
+      </a:effectRef>
+      <a:fontRef idx="minor"/>
+    </dgm:style>
+  </dgm:styleLbl>
+  <dgm:styleLbl name="solidFgAcc1">
+    <dgm:scene3d>
+      <a:camera prst="orthographicFront"/>
+      <a:lightRig rig="threePt" dir="t"/>
+    </dgm:scene3d>
+    <dgm:sp3d/>
+    <dgm:txPr/>
+    <dgm:style>
+      <a:lnRef idx="2">
+        <a:scrgbClr r="0" g="0" b="0"/>
+      </a:lnRef>
+      <a:fillRef idx="1">
+        <a:scrgbClr r="0" g="0" b="0"/>
+      </a:fillRef>
+      <a:effectRef idx="0">
+        <a:scrgbClr r="0" g="0" b="0"/>
+      </a:effectRef>
+      <a:fontRef idx="minor"/>
+    </dgm:style>
+  </dgm:styleLbl>
+  <dgm:styleLbl name="solidAlignAcc1">
+    <dgm:scene3d>
+      <a:camera prst="orthographicFront"/>
+      <a:lightRig rig="threePt" dir="t"/>
+    </dgm:scene3d>
+    <dgm:sp3d/>
+    <dgm:txPr/>
+    <dgm:style>
+      <a:lnRef idx="2">
+        <a:scrgbClr r="0" g="0" b="0"/>
+      </a:lnRef>
+      <a:fillRef idx="1">
+        <a:scrgbClr r="0" g="0" b="0"/>
+      </a:fillRef>
+      <a:effectRef idx="0">
+        <a:scrgbClr r="0" g="0" b="0"/>
+      </a:effectRef>
+      <a:fontRef idx="minor"/>
+    </dgm:style>
+  </dgm:styleLbl>
+  <dgm:styleLbl name="solidBgAcc1">
+    <dgm:scene3d>
+      <a:camera prst="orthographicFront"/>
+      <a:lightRig rig="threePt" dir="t"/>
+    </dgm:scene3d>
+    <dgm:sp3d/>
+    <dgm:txPr/>
+    <dgm:style>
+      <a:lnRef idx="2">
+        <a:scrgbClr r="0" g="0" b="0"/>
+      </a:lnRef>
+      <a:fillRef idx="1">
+        <a:scrgbClr r="0" g="0" b="0"/>
+      </a:fillRef>
+      <a:effectRef idx="0">
+        <a:scrgbClr r="0" g="0" b="0"/>
+      </a:effectRef>
+      <a:fontRef idx="minor"/>
+    </dgm:style>
+  </dgm:styleLbl>
+  <dgm:styleLbl name="fgAccFollowNode1">
+    <dgm:scene3d>
+      <a:camera prst="orthographicFront"/>
+      <a:lightRig rig="threePt" dir="t"/>
+    </dgm:scene3d>
+    <dgm:sp3d/>
+    <dgm:txPr/>
+    <dgm:style>
+      <a:lnRef idx="2">
+        <a:scrgbClr r="0" g="0" b="0"/>
+      </a:lnRef>
+      <a:fillRef idx="1">
+        <a:scrgbClr r="0" g="0" b="0"/>
+      </a:fillRef>
+      <a:effectRef idx="0">
+        <a:scrgbClr r="0" g="0" b="0"/>
+      </a:effectRef>
+      <a:fontRef idx="minor"/>
+    </dgm:style>
+  </dgm:styleLbl>
+  <dgm:styleLbl name="alignAccFollowNode1">
+    <dgm:scene3d>
+      <a:camera prst="orthographicFront"/>
+      <a:lightRig rig="threePt" dir="t"/>
+    </dgm:scene3d>
+    <dgm:sp3d/>
+    <dgm:txPr/>
+    <dgm:style>
+      <a:lnRef idx="2">
+        <a:scrgbClr r="0" g="0" b="0"/>
+      </a:lnRef>
+      <a:fillRef idx="1">
+        <a:scrgbClr r="0" g="0" b="0"/>
+      </a:fillRef>
+      <a:effectRef idx="0">
+        <a:scrgbClr r="0" g="0" b="0"/>
+      </a:effectRef>
+      <a:fontRef idx="minor"/>
+    </dgm:style>
+  </dgm:styleLbl>
+  <dgm:styleLbl name="bgAccFollowNode1">
+    <dgm:scene3d>
+      <a:camera prst="orthographicFront"/>
+      <a:lightRig rig="threePt" dir="t"/>
+    </dgm:scene3d>
+    <dgm:sp3d/>
+    <dgm:txPr/>
+    <dgm:style>
+      <a:lnRef idx="2">
+        <a:scrgbClr r="0" g="0" b="0"/>
+      </a:lnRef>
+      <a:fillRef idx="1">
+        <a:scrgbClr r="0" g="0" b="0"/>
+      </a:fillRef>
+      <a:effectRef idx="0">
+        <a:scrgbClr r="0" g="0" b="0"/>
+      </a:effectRef>
+      <a:fontRef idx="minor"/>
+    </dgm:style>
+  </dgm:styleLbl>
+  <dgm:styleLbl name="fgAcc0">
+    <dgm:scene3d>
+      <a:camera prst="orthographicFront"/>
+      <a:lightRig rig="threePt" dir="t"/>
+    </dgm:scene3d>
+    <dgm:sp3d/>
+    <dgm:txPr/>
+    <dgm:style>
+      <a:lnRef idx="2">
+        <a:scrgbClr r="0" g="0" b="0"/>
+      </a:lnRef>
+      <a:fillRef idx="1">
+        <a:scrgbClr r="0" g="0" b="0"/>
+      </a:fillRef>
+      <a:effectRef idx="0">
+        <a:scrgbClr r="0" g="0" b="0"/>
+      </a:effectRef>
+      <a:fontRef idx="minor"/>
+    </dgm:style>
+  </dgm:styleLbl>
+  <dgm:styleLbl name="fgAcc2">
+    <dgm:scene3d>
+      <a:camera prst="orthographicFront"/>
+      <a:lightRig rig="threePt" dir="t"/>
+    </dgm:scene3d>
+    <dgm:sp3d/>
+    <dgm:txPr/>
+    <dgm:style>
+      <a:lnRef idx="2">
+        <a:scrgbClr r="0" g="0" b="0"/>
+      </a:lnRef>
+      <a:fillRef idx="1">
+        <a:scrgbClr r="0" g="0" b="0"/>
+      </a:fillRef>
+      <a:effectRef idx="0">
+        <a:scrgbClr r="0" g="0" b="0"/>
+      </a:effectRef>
+      <a:fontRef idx="minor"/>
+    </dgm:style>
+  </dgm:styleLbl>
+  <dgm:styleLbl name="fgAcc3">
+    <dgm:scene3d>
+      <a:camera prst="orthographicFront"/>
+      <a:lightRig rig="threePt" dir="t"/>
+    </dgm:scene3d>
+    <dgm:sp3d/>
+    <dgm:txPr/>
+    <dgm:style>
+      <a:lnRef idx="2">
+        <a:scrgbClr r="0" g="0" b="0"/>
+      </a:lnRef>
+      <a:fillRef idx="1">
+        <a:scrgbClr r="0" g="0" b="0"/>
+      </a:fillRef>
+      <a:effectRef idx="0">
+        <a:scrgbClr r="0" g="0" b="0"/>
+      </a:effectRef>
+      <a:fontRef idx="minor"/>
+    </dgm:style>
+  </dgm:styleLbl>
+  <dgm:styleLbl name="fgAcc4">
+    <dgm:scene3d>
+      <a:camera prst="orthographicFront"/>
+      <a:lightRig rig="threePt" dir="t"/>
+    </dgm:scene3d>
+    <dgm:sp3d/>
+    <dgm:txPr/>
+    <dgm:style>
+      <a:lnRef idx="2">
+        <a:scrgbClr r="0" g="0" b="0"/>
+      </a:lnRef>
+      <a:fillRef idx="1">
+        <a:scrgbClr r="0" g="0" b="0"/>
+      </a:fillRef>
+      <a:effectRef idx="0">
+        <a:scrgbClr r="0" g="0" b="0"/>
+      </a:effectRef>
+      <a:fontRef idx="minor"/>
+    </dgm:style>
+  </dgm:styleLbl>
+  <dgm:styleLbl name="bgShp">
+    <dgm:scene3d>
+      <a:camera prst="orthographicFront"/>
+      <a:lightRig rig="threePt" dir="t"/>
+    </dgm:scene3d>
+    <dgm:sp3d/>
+    <dgm:txPr/>
+    <dgm:style>
+      <a:lnRef idx="0">
+        <a:scrgbClr r="0" g="0" b="0"/>
+      </a:lnRef>
+      <a:fillRef idx="1">
+        <a:scrgbClr r="0" g="0" b="0"/>
+      </a:fillRef>
+      <a:effectRef idx="0">
+        <a:scrgbClr r="0" g="0" b="0"/>
+      </a:effectRef>
+      <a:fontRef idx="minor"/>
+    </dgm:style>
+  </dgm:styleLbl>
+  <dgm:styleLbl name="dkBgShp">
+    <dgm:scene3d>
+      <a:camera prst="orthographicFront"/>
+      <a:lightRig rig="threePt" dir="t"/>
+    </dgm:scene3d>
+    <dgm:sp3d/>
+    <dgm:txPr/>
+    <dgm:style>
+      <a:lnRef idx="0">
+        <a:scrgbClr r="0" g="0" b="0"/>
+      </a:lnRef>
+      <a:fillRef idx="1">
+        <a:scrgbClr r="0" g="0" b="0"/>
+      </a:fillRef>
+      <a:effectRef idx="0">
+        <a:scrgbClr r="0" g="0" b="0"/>
+      </a:effectRef>
+      <a:fontRef idx="minor"/>
+    </dgm:style>
+  </dgm:styleLbl>
+  <dgm:styleLbl name="trBgShp">
+    <dgm:scene3d>
+      <a:camera prst="orthographicFront"/>
+      <a:lightRig rig="threePt" dir="t"/>
+    </dgm:scene3d>
+    <dgm:sp3d/>
+    <dgm:txPr/>
+    <dgm:style>
+      <a:lnRef idx="0">
+        <a:scrgbClr r="0" g="0" b="0"/>
+      </a:lnRef>
+      <a:fillRef idx="1">
+        <a:scrgbClr r="0" g="0" b="0"/>
+      </a:fillRef>
+      <a:effectRef idx="0">
+        <a:scrgbClr r="0" g="0" b="0"/>
+      </a:effectRef>
+      <a:fontRef idx="minor"/>
+    </dgm:style>
+  </dgm:styleLbl>
+  <dgm:styleLbl name="fgShp">
+    <dgm:scene3d>
+      <a:camera prst="orthographicFront"/>
+      <a:lightRig rig="threePt" dir="t"/>
+    </dgm:scene3d>
+    <dgm:sp3d/>
+    <dgm:txPr/>
+    <dgm:style>
+      <a:lnRef idx="2">
+        <a:scrgbClr r="0" g="0" b="0"/>
+      </a:lnRef>
+      <a:fillRef idx="1">
+        <a:scrgbClr r="0" g="0" b="0"/>
+      </a:fillRef>
+      <a:effectRef idx="0">
+        <a:scrgbClr r="0" g="0" b="0"/>
+      </a:effectRef>
+      <a:fontRef idx="minor"/>
+    </dgm:style>
+  </dgm:styleLbl>
+  <dgm:styleLbl name="revTx">
+    <dgm:scene3d>
+      <a:camera prst="orthographicFront"/>
+      <a:lightRig rig="threePt" dir="t"/>
+    </dgm:scene3d>
+    <dgm:sp3d/>
+    <dgm:txPr/>
+    <dgm:style>
+      <a:lnRef idx="0">
+        <a:scrgbClr r="0" g="0" b="0"/>
+      </a:lnRef>
+      <a:fillRef idx="0">
+        <a:scrgbClr r="0" g="0" b="0"/>
+      </a:fillRef>
+      <a:effectRef idx="0">
+        <a:scrgbClr r="0" g="0" b="0"/>
+      </a:effectRef>
+      <a:fontRef idx="minor"/>
+    </dgm:style>
+  </dgm:styleLbl>
+</dgm:styleDef>
+</file>
+
 <file path=ppt/slideLayouts/slideLayout1.xml><?xml version="1.0" encoding="utf-8"?>
 <p:sldLayout xmlns:a="http://schemas.openxmlformats.org/drawingml/2006/main" xmlns:r="http://schemas.openxmlformats.org/officeDocument/2006/relationships" xmlns:p="http://schemas.openxmlformats.org/presentationml/2006/main" type="title" preserve="1">
   <p:cSld name="Titelfolie">
@@ -351,7 +3371,7 @@
           <a:p>
             <a:fld id="{DD69020F-A873-CE4F-8EB1-3F1D6F7B8CD4}" type="datetimeFigureOut">
               <a:rPr lang="de-DE" smtClean="0"/>
-              <a:t>27.05.2014</a:t>
+              <a:t>28.05.2014</a:t>
             </a:fld>
             <a:endParaRPr lang="de-DE" dirty="0"/>
           </a:p>
@@ -683,7 +3703,7 @@
           <a:p>
             <a:fld id="{DD69020F-A873-CE4F-8EB1-3F1D6F7B8CD4}" type="datetimeFigureOut">
               <a:rPr lang="de-DE" smtClean="0"/>
-              <a:t>27.05.2014</a:t>
+              <a:t>28.05.2014</a:t>
             </a:fld>
             <a:endParaRPr lang="de-DE" dirty="0"/>
           </a:p>
@@ -1015,7 +4035,7 @@
           <a:p>
             <a:fld id="{DD69020F-A873-CE4F-8EB1-3F1D6F7B8CD4}" type="datetimeFigureOut">
               <a:rPr lang="de-DE" smtClean="0"/>
-              <a:t>27.05.2014</a:t>
+              <a:t>28.05.2014</a:t>
             </a:fld>
             <a:endParaRPr lang="de-DE" dirty="0"/>
           </a:p>
@@ -1347,7 +4367,7 @@
           <a:p>
             <a:fld id="{DD69020F-A873-CE4F-8EB1-3F1D6F7B8CD4}" type="datetimeFigureOut">
               <a:rPr lang="de-DE" smtClean="0"/>
-              <a:t>27.05.2014</a:t>
+              <a:t>28.05.2014</a:t>
             </a:fld>
             <a:endParaRPr lang="de-DE" dirty="0"/>
           </a:p>
@@ -2036,7 +5056,7 @@
           <a:p>
             <a:fld id="{DD69020F-A873-CE4F-8EB1-3F1D6F7B8CD4}" type="datetimeFigureOut">
               <a:rPr lang="de-DE" smtClean="0"/>
-              <a:t>27.05.2014</a:t>
+              <a:t>28.05.2014</a:t>
             </a:fld>
             <a:endParaRPr lang="de-DE" dirty="0"/>
           </a:p>
@@ -2215,7 +5235,7 @@
           <a:p>
             <a:fld id="{DD69020F-A873-CE4F-8EB1-3F1D6F7B8CD4}" type="datetimeFigureOut">
               <a:rPr lang="de-DE" smtClean="0"/>
-              <a:t>27.05.2014</a:t>
+              <a:t>28.05.2014</a:t>
             </a:fld>
             <a:endParaRPr lang="de-DE" dirty="0"/>
           </a:p>
@@ -2389,7 +5409,7 @@
           <a:p>
             <a:fld id="{DD69020F-A873-CE4F-8EB1-3F1D6F7B8CD4}" type="datetimeFigureOut">
               <a:rPr lang="de-DE" smtClean="0"/>
-              <a:t>27.05.2014</a:t>
+              <a:t>28.05.2014</a:t>
             </a:fld>
             <a:endParaRPr lang="de-DE" dirty="0"/>
           </a:p>
@@ -2637,7 +5657,7 @@
           <a:p>
             <a:fld id="{DD69020F-A873-CE4F-8EB1-3F1D6F7B8CD4}" type="datetimeFigureOut">
               <a:rPr lang="de-DE" smtClean="0"/>
-              <a:t>27.05.2014</a:t>
+              <a:t>28.05.2014</a:t>
             </a:fld>
             <a:endParaRPr lang="de-DE" dirty="0"/>
           </a:p>
@@ -2967,7 +5987,7 @@
           <a:p>
             <a:fld id="{DD69020F-A873-CE4F-8EB1-3F1D6F7B8CD4}" type="datetimeFigureOut">
               <a:rPr lang="de-DE" smtClean="0"/>
-              <a:t>27.05.2014</a:t>
+              <a:t>28.05.2014</a:t>
             </a:fld>
             <a:endParaRPr lang="de-DE" dirty="0"/>
           </a:p>
@@ -3259,7 +6279,7 @@
           <a:p>
             <a:fld id="{DD69020F-A873-CE4F-8EB1-3F1D6F7B8CD4}" type="datetimeFigureOut">
               <a:rPr lang="de-DE" smtClean="0"/>
-              <a:t>27.05.2014</a:t>
+              <a:t>28.05.2014</a:t>
             </a:fld>
             <a:endParaRPr lang="de-DE" dirty="0"/>
           </a:p>
@@ -3695,7 +6715,7 @@
           <a:p>
             <a:fld id="{DD69020F-A873-CE4F-8EB1-3F1D6F7B8CD4}" type="datetimeFigureOut">
               <a:rPr lang="de-DE" smtClean="0"/>
-              <a:t>27.05.2014</a:t>
+              <a:t>28.05.2014</a:t>
             </a:fld>
             <a:endParaRPr lang="de-DE" dirty="0"/>
           </a:p>
@@ -3882,7 +6902,7 @@
           <a:p>
             <a:fld id="{DD69020F-A873-CE4F-8EB1-3F1D6F7B8CD4}" type="datetimeFigureOut">
               <a:rPr lang="de-DE" smtClean="0"/>
-              <a:t>27.05.2014</a:t>
+              <a:t>28.05.2014</a:t>
             </a:fld>
             <a:endParaRPr lang="de-DE" dirty="0"/>
           </a:p>
@@ -3972,7 +6992,7 @@
           <a:p>
             <a:fld id="{DD69020F-A873-CE4F-8EB1-3F1D6F7B8CD4}" type="datetimeFigureOut">
               <a:rPr lang="de-DE" smtClean="0"/>
-              <a:t>27.05.2014</a:t>
+              <a:t>28.05.2014</a:t>
             </a:fld>
             <a:endParaRPr lang="de-DE" dirty="0"/>
           </a:p>
@@ -4253,7 +7273,7 @@
           <a:p>
             <a:fld id="{DD69020F-A873-CE4F-8EB1-3F1D6F7B8CD4}" type="datetimeFigureOut">
               <a:rPr lang="de-DE" smtClean="0"/>
-              <a:t>27.05.2014</a:t>
+              <a:t>28.05.2014</a:t>
             </a:fld>
             <a:endParaRPr lang="de-DE" dirty="0"/>
           </a:p>
@@ -4468,7 +7488,7 @@
           <a:p>
             <a:fld id="{DD69020F-A873-CE4F-8EB1-3F1D6F7B8CD4}" type="datetimeFigureOut">
               <a:rPr lang="de-DE" smtClean="0"/>
-              <a:t>27.05.2014</a:t>
+              <a:t>28.05.2014</a:t>
             </a:fld>
             <a:endParaRPr lang="de-DE" dirty="0"/>
           </a:p>
@@ -8600,6 +11620,24 @@
           <a:chExt cx="0" cy="0"/>
         </a:xfrm>
       </p:grpSpPr>
+      <p:graphicFrame>
+        <p:nvGraphicFramePr>
+          <p:cNvPr id="20" name="Diagramm 19"/>
+          <p:cNvGraphicFramePr/>
+          <p:nvPr>
+            <p:extLst/>
+          </p:nvPr>
+        </p:nvGraphicFramePr>
+        <p:xfrm>
+          <a:off x="3493008" y="1892808"/>
+          <a:ext cx="5745479" cy="4054856"/>
+        </p:xfrm>
+        <a:graphic>
+          <a:graphicData uri="http://schemas.openxmlformats.org/drawingml/2006/diagram">
+            <dgm:relIds xmlns:dgm="http://schemas.openxmlformats.org/drawingml/2006/diagram" xmlns:r="http://schemas.openxmlformats.org/officeDocument/2006/relationships" r:dm="rId2" r:lo="rId3" r:qs="rId4" r:cs="rId5"/>
+          </a:graphicData>
+        </a:graphic>
+      </p:graphicFrame>
       <p:sp>
         <p:nvSpPr>
           <p:cNvPr id="2" name="Titel 1"/>
@@ -8623,6 +11661,766 @@
             <a:r>
               <a:rPr lang="de-DE" dirty="0" smtClean="0"/>
               <a:t>Control Device</a:t>
+            </a:r>
+            <a:endParaRPr lang="de-DE" dirty="0"/>
+          </a:p>
+        </p:txBody>
+      </p:sp>
+      <p:pic>
+        <p:nvPicPr>
+          <p:cNvPr id="5" name="Bild 4" descr="github_icon-150x150.png"/>
+          <p:cNvPicPr>
+            <a:picLocks noChangeAspect="1"/>
+          </p:cNvPicPr>
+          <p:nvPr/>
+        </p:nvPicPr>
+        <p:blipFill>
+          <a:blip r:embed="rId7">
+            <a:extLst>
+              <a:ext uri="{28A0092B-C50C-407E-A947-70E740481C1C}">
+                <a14:useLocalDpi xmlns:a14="http://schemas.microsoft.com/office/drawing/2010/main" val="0"/>
+              </a:ext>
+            </a:extLst>
+          </a:blip>
+          <a:stretch>
+            <a:fillRect/>
+          </a:stretch>
+        </p:blipFill>
+        <p:spPr>
+          <a:xfrm>
+            <a:off x="5573276" y="5990233"/>
+            <a:ext cx="691112" cy="691112"/>
+          </a:xfrm>
+          <a:prstGeom prst="rect">
+            <a:avLst/>
+          </a:prstGeom>
+        </p:spPr>
+      </p:pic>
+      <p:sp>
+        <p:nvSpPr>
+          <p:cNvPr id="7" name="Untertitel 2"/>
+          <p:cNvSpPr txBox="1">
+            <a:spLocks/>
+          </p:cNvSpPr>
+          <p:nvPr/>
+        </p:nvSpPr>
+        <p:spPr>
+          <a:xfrm>
+            <a:off x="6278192" y="6106222"/>
+            <a:ext cx="2751065" cy="429435"/>
+          </a:xfrm>
+          <a:prstGeom prst="rect">
+            <a:avLst/>
+          </a:prstGeom>
+        </p:spPr>
+        <p:txBody>
+          <a:bodyPr vert="horz" lIns="91440" tIns="45720" rIns="91440" bIns="45720" rtlCol="0">
+            <a:normAutofit fontScale="92500"/>
+          </a:bodyPr>
+          <a:lstStyle>
+            <a:lvl1pPr marL="0" indent="0" algn="ctr" defTabSz="914400" rtl="0" eaLnBrk="1" latinLnBrk="0" hangingPunct="1">
+              <a:spcBef>
+                <a:spcPts val="300"/>
+              </a:spcBef>
+              <a:buFontTx/>
+              <a:buNone/>
+              <a:defRPr sz="2000" kern="1200">
+                <a:solidFill>
+                  <a:schemeClr val="tx1">
+                    <a:tint val="75000"/>
+                  </a:schemeClr>
+                </a:solidFill>
+                <a:effectLst>
+                  <a:outerShdw blurRad="50800" dist="50800" dir="5400000" sx="101000" sy="101000" algn="t" rotWithShape="0">
+                    <a:prstClr val="black">
+                      <a:alpha val="40000"/>
+                    </a:prstClr>
+                  </a:outerShdw>
+                </a:effectLst>
+                <a:latin typeface="+mn-lt"/>
+                <a:ea typeface="+mn-ea"/>
+                <a:cs typeface="+mn-cs"/>
+              </a:defRPr>
+            </a:lvl1pPr>
+            <a:lvl2pPr marL="457200" indent="0" algn="ctr" defTabSz="914400" rtl="0" eaLnBrk="1" latinLnBrk="0" hangingPunct="1">
+              <a:spcBef>
+                <a:spcPts val="600"/>
+              </a:spcBef>
+              <a:buFontTx/>
+              <a:buNone/>
+              <a:defRPr sz="2000" kern="1200">
+                <a:solidFill>
+                  <a:schemeClr val="tx1">
+                    <a:tint val="75000"/>
+                  </a:schemeClr>
+                </a:solidFill>
+                <a:effectLst>
+                  <a:outerShdw blurRad="50800" dist="50800" dir="5400000" sx="101000" sy="101000" algn="t" rotWithShape="0">
+                    <a:prstClr val="black">
+                      <a:alpha val="40000"/>
+                    </a:prstClr>
+                  </a:outerShdw>
+                </a:effectLst>
+                <a:latin typeface="+mn-lt"/>
+                <a:ea typeface="+mn-ea"/>
+                <a:cs typeface="+mn-cs"/>
+              </a:defRPr>
+            </a:lvl2pPr>
+            <a:lvl3pPr marL="914400" indent="0" algn="ctr" defTabSz="914400" rtl="0" eaLnBrk="1" latinLnBrk="0" hangingPunct="1">
+              <a:spcBef>
+                <a:spcPts val="600"/>
+              </a:spcBef>
+              <a:buFontTx/>
+              <a:buNone/>
+              <a:defRPr sz="1800" kern="1200">
+                <a:solidFill>
+                  <a:schemeClr val="tx1">
+                    <a:tint val="75000"/>
+                  </a:schemeClr>
+                </a:solidFill>
+                <a:effectLst>
+                  <a:outerShdw blurRad="50800" dist="50800" dir="5400000" sx="101000" sy="101000" algn="t" rotWithShape="0">
+                    <a:prstClr val="black">
+                      <a:alpha val="40000"/>
+                    </a:prstClr>
+                  </a:outerShdw>
+                </a:effectLst>
+                <a:latin typeface="+mn-lt"/>
+                <a:ea typeface="+mn-ea"/>
+                <a:cs typeface="+mn-cs"/>
+              </a:defRPr>
+            </a:lvl3pPr>
+            <a:lvl4pPr marL="1371600" indent="0" algn="ctr" defTabSz="914400" rtl="0" eaLnBrk="1" latinLnBrk="0" hangingPunct="1">
+              <a:spcBef>
+                <a:spcPts val="600"/>
+              </a:spcBef>
+              <a:buFontTx/>
+              <a:buNone/>
+              <a:defRPr sz="1800" kern="1200">
+                <a:solidFill>
+                  <a:schemeClr val="tx1">
+                    <a:tint val="75000"/>
+                  </a:schemeClr>
+                </a:solidFill>
+                <a:effectLst>
+                  <a:outerShdw blurRad="50800" dist="50800" dir="5400000" sx="101000" sy="101000" algn="t" rotWithShape="0">
+                    <a:prstClr val="black">
+                      <a:alpha val="40000"/>
+                    </a:prstClr>
+                  </a:outerShdw>
+                </a:effectLst>
+                <a:latin typeface="+mn-lt"/>
+                <a:ea typeface="+mn-ea"/>
+                <a:cs typeface="+mn-cs"/>
+              </a:defRPr>
+            </a:lvl4pPr>
+            <a:lvl5pPr marL="1828800" indent="0" algn="ctr" defTabSz="914400" rtl="0" eaLnBrk="1" latinLnBrk="0" hangingPunct="1">
+              <a:spcBef>
+                <a:spcPts val="600"/>
+              </a:spcBef>
+              <a:buFontTx/>
+              <a:buNone/>
+              <a:defRPr sz="1800" kern="1200">
+                <a:solidFill>
+                  <a:schemeClr val="tx1">
+                    <a:tint val="75000"/>
+                  </a:schemeClr>
+                </a:solidFill>
+                <a:effectLst>
+                  <a:outerShdw blurRad="50800" dist="50800" dir="5400000" sx="101000" sy="101000" algn="t" rotWithShape="0">
+                    <a:prstClr val="black">
+                      <a:alpha val="40000"/>
+                    </a:prstClr>
+                  </a:outerShdw>
+                </a:effectLst>
+                <a:latin typeface="+mn-lt"/>
+                <a:ea typeface="+mn-ea"/>
+                <a:cs typeface="+mn-cs"/>
+              </a:defRPr>
+            </a:lvl5pPr>
+            <a:lvl6pPr marL="2286000" indent="0" algn="ctr" defTabSz="914400" rtl="0" eaLnBrk="1" latinLnBrk="0" hangingPunct="1">
+              <a:spcBef>
+                <a:spcPct val="20000"/>
+              </a:spcBef>
+              <a:buFontTx/>
+              <a:buNone/>
+              <a:defRPr lang="en-US" sz="1800" kern="1200">
+                <a:solidFill>
+                  <a:schemeClr val="tx1">
+                    <a:tint val="75000"/>
+                  </a:schemeClr>
+                </a:solidFill>
+                <a:effectLst>
+                  <a:outerShdw blurRad="50800" dist="50800" dir="5400000" sx="101000" sy="101000" algn="t" rotWithShape="0">
+                    <a:prstClr val="black">
+                      <a:alpha val="40000"/>
+                    </a:prstClr>
+                  </a:outerShdw>
+                </a:effectLst>
+                <a:latin typeface="+mn-lt"/>
+                <a:ea typeface="+mn-ea"/>
+                <a:cs typeface="+mn-cs"/>
+              </a:defRPr>
+            </a:lvl6pPr>
+            <a:lvl7pPr marL="2743200" indent="0" algn="ctr" defTabSz="914400" rtl="0" eaLnBrk="1" latinLnBrk="0" hangingPunct="1">
+              <a:spcBef>
+                <a:spcPct val="20000"/>
+              </a:spcBef>
+              <a:buFontTx/>
+              <a:buNone/>
+              <a:defRPr lang="en-US" sz="1800" kern="1200">
+                <a:solidFill>
+                  <a:schemeClr val="tx1">
+                    <a:tint val="75000"/>
+                  </a:schemeClr>
+                </a:solidFill>
+                <a:effectLst>
+                  <a:outerShdw blurRad="50800" dist="50800" dir="5400000" sx="101000" sy="101000" algn="t" rotWithShape="0">
+                    <a:prstClr val="black">
+                      <a:alpha val="40000"/>
+                    </a:prstClr>
+                  </a:outerShdw>
+                </a:effectLst>
+                <a:latin typeface="+mn-lt"/>
+                <a:ea typeface="+mn-ea"/>
+                <a:cs typeface="+mn-cs"/>
+              </a:defRPr>
+            </a:lvl7pPr>
+            <a:lvl8pPr marL="3200400" indent="0" algn="ctr" defTabSz="914400" rtl="0" eaLnBrk="1" latinLnBrk="0" hangingPunct="1">
+              <a:spcBef>
+                <a:spcPct val="20000"/>
+              </a:spcBef>
+              <a:buFontTx/>
+              <a:buNone/>
+              <a:defRPr lang="en-US" sz="1800" kern="1200">
+                <a:solidFill>
+                  <a:schemeClr val="tx1">
+                    <a:tint val="75000"/>
+                  </a:schemeClr>
+                </a:solidFill>
+                <a:effectLst>
+                  <a:outerShdw blurRad="50800" dist="50800" dir="5400000" sx="101000" sy="101000" algn="t" rotWithShape="0">
+                    <a:prstClr val="black">
+                      <a:alpha val="40000"/>
+                    </a:prstClr>
+                  </a:outerShdw>
+                </a:effectLst>
+                <a:latin typeface="+mn-lt"/>
+                <a:ea typeface="+mn-ea"/>
+                <a:cs typeface="+mn-cs"/>
+              </a:defRPr>
+            </a:lvl8pPr>
+            <a:lvl9pPr marL="3657600" indent="0" algn="ctr" defTabSz="914400" rtl="0" eaLnBrk="1" latinLnBrk="0" hangingPunct="1">
+              <a:spcBef>
+                <a:spcPct val="20000"/>
+              </a:spcBef>
+              <a:buFontTx/>
+              <a:buNone/>
+              <a:defRPr lang="en-US" sz="1800" kern="1200">
+                <a:solidFill>
+                  <a:schemeClr val="tx1">
+                    <a:tint val="75000"/>
+                  </a:schemeClr>
+                </a:solidFill>
+                <a:effectLst>
+                  <a:outerShdw blurRad="50800" dist="50800" dir="5400000" sx="101000" sy="101000" algn="t" rotWithShape="0">
+                    <a:prstClr val="black">
+                      <a:alpha val="40000"/>
+                    </a:prstClr>
+                  </a:outerShdw>
+                </a:effectLst>
+                <a:latin typeface="+mn-lt"/>
+                <a:ea typeface="+mn-ea"/>
+                <a:cs typeface="+mn-cs"/>
+              </a:defRPr>
+            </a:lvl9pPr>
+          </a:lstStyle>
+          <a:p>
+            <a:r>
+              <a:rPr lang="fi-FI" dirty="0" smtClean="0"/>
+              <a:t>github.com</a:t>
+            </a:r>
+            <a:r>
+              <a:rPr lang="fi-FI" dirty="0"/>
+              <a:t>/rknoll/presit</a:t>
+            </a:r>
+            <a:endParaRPr lang="de-DE" dirty="0"/>
+          </a:p>
+        </p:txBody>
+      </p:sp>
+      <p:grpSp>
+        <p:nvGrpSpPr>
+          <p:cNvPr id="21" name="Gruppieren 20"/>
+          <p:cNvGrpSpPr/>
+          <p:nvPr/>
+        </p:nvGrpSpPr>
+        <p:grpSpPr>
+          <a:xfrm>
+            <a:off x="736004" y="1380744"/>
+            <a:ext cx="5399620" cy="4371745"/>
+            <a:chOff x="946316" y="1618488"/>
+            <a:chExt cx="5399620" cy="4371745"/>
+          </a:xfrm>
+        </p:grpSpPr>
+        <p:sp>
+          <p:nvSpPr>
+            <p:cNvPr id="6" name="Abgerundetes Rechteck 5"/>
+            <p:cNvSpPr/>
+            <p:nvPr/>
+          </p:nvSpPr>
+          <p:spPr>
+            <a:xfrm>
+              <a:off x="946316" y="1719072"/>
+              <a:ext cx="3154680" cy="4271161"/>
+            </a:xfrm>
+            <a:prstGeom prst="roundRect">
+              <a:avLst/>
+            </a:prstGeom>
+          </p:spPr>
+          <p:style>
+            <a:lnRef idx="3">
+              <a:schemeClr val="lt1"/>
+            </a:lnRef>
+            <a:fillRef idx="1">
+              <a:schemeClr val="accent6"/>
+            </a:fillRef>
+            <a:effectRef idx="1">
+              <a:schemeClr val="accent6"/>
+            </a:effectRef>
+            <a:fontRef idx="minor">
+              <a:schemeClr val="lt1"/>
+            </a:fontRef>
+          </p:style>
+          <p:txBody>
+            <a:bodyPr rtlCol="0" anchor="ctr"/>
+            <a:lstStyle/>
+            <a:p>
+              <a:pPr algn="ctr"/>
+              <a:r>
+                <a:rPr lang="de-AT" sz="2400" dirty="0" smtClean="0"/>
+                <a:t>STM32F4Discovery</a:t>
+              </a:r>
+              <a:endParaRPr lang="de-AT" sz="2400" dirty="0"/>
+            </a:p>
+          </p:txBody>
+        </p:sp>
+        <p:sp>
+          <p:nvSpPr>
+            <p:cNvPr id="8" name="Abgerundetes Rechteck 7"/>
+            <p:cNvSpPr/>
+            <p:nvPr/>
+          </p:nvSpPr>
+          <p:spPr>
+            <a:xfrm>
+              <a:off x="1586484" y="4672584"/>
+              <a:ext cx="1883664" cy="868680"/>
+            </a:xfrm>
+            <a:prstGeom prst="roundRect">
+              <a:avLst/>
+            </a:prstGeom>
+          </p:spPr>
+          <p:style>
+            <a:lnRef idx="3">
+              <a:schemeClr val="lt1"/>
+            </a:lnRef>
+            <a:fillRef idx="1">
+              <a:schemeClr val="accent4"/>
+            </a:fillRef>
+            <a:effectRef idx="1">
+              <a:schemeClr val="accent4"/>
+            </a:effectRef>
+            <a:fontRef idx="minor">
+              <a:schemeClr val="lt1"/>
+            </a:fontRef>
+          </p:style>
+          <p:txBody>
+            <a:bodyPr rtlCol="0" anchor="ctr"/>
+            <a:lstStyle/>
+            <a:p>
+              <a:pPr algn="ctr"/>
+              <a:r>
+                <a:rPr lang="de-AT" dirty="0" smtClean="0"/>
+                <a:t>MEMS-Sensor</a:t>
+              </a:r>
+              <a:endParaRPr lang="de-AT" dirty="0"/>
+            </a:p>
+          </p:txBody>
+        </p:sp>
+        <p:cxnSp>
+          <p:nvCxnSpPr>
+            <p:cNvPr id="10" name="Gerade Verbindung mit Pfeil 9"/>
+            <p:cNvCxnSpPr/>
+            <p:nvPr/>
+          </p:nvCxnSpPr>
+          <p:spPr>
+            <a:xfrm flipH="1">
+              <a:off x="2528316" y="4233672"/>
+              <a:ext cx="5803" cy="694944"/>
+            </a:xfrm>
+            <a:prstGeom prst="straightConnector1">
+              <a:avLst/>
+            </a:prstGeom>
+            <a:ln>
+              <a:headEnd type="triangle"/>
+              <a:tailEnd type="triangle"/>
+            </a:ln>
+          </p:spPr>
+          <p:style>
+            <a:lnRef idx="3">
+              <a:schemeClr val="dk1"/>
+            </a:lnRef>
+            <a:fillRef idx="0">
+              <a:schemeClr val="dk1"/>
+            </a:fillRef>
+            <a:effectRef idx="2">
+              <a:schemeClr val="dk1"/>
+            </a:effectRef>
+            <a:fontRef idx="minor">
+              <a:schemeClr val="tx1"/>
+            </a:fontRef>
+          </p:style>
+        </p:cxnSp>
+        <p:sp>
+          <p:nvSpPr>
+            <p:cNvPr id="12" name="Abgerundetes Rechteck 11"/>
+            <p:cNvSpPr/>
+            <p:nvPr/>
+          </p:nvSpPr>
+          <p:spPr>
+            <a:xfrm>
+              <a:off x="3831336" y="2596896"/>
+              <a:ext cx="283464" cy="384048"/>
+            </a:xfrm>
+            <a:prstGeom prst="roundRect">
+              <a:avLst/>
+            </a:prstGeom>
+          </p:spPr>
+          <p:style>
+            <a:lnRef idx="1">
+              <a:schemeClr val="dk1"/>
+            </a:lnRef>
+            <a:fillRef idx="3">
+              <a:schemeClr val="dk1"/>
+            </a:fillRef>
+            <a:effectRef idx="2">
+              <a:schemeClr val="dk1"/>
+            </a:effectRef>
+            <a:fontRef idx="minor">
+              <a:schemeClr val="lt1"/>
+            </a:fontRef>
+          </p:style>
+          <p:txBody>
+            <a:bodyPr rtlCol="0" anchor="ctr"/>
+            <a:lstStyle/>
+            <a:p>
+              <a:pPr algn="ctr"/>
+              <a:endParaRPr lang="de-AT"/>
+            </a:p>
+          </p:txBody>
+        </p:sp>
+        <p:sp>
+          <p:nvSpPr>
+            <p:cNvPr id="13" name="Textfeld 12"/>
+            <p:cNvSpPr txBox="1"/>
+            <p:nvPr/>
+          </p:nvSpPr>
+          <p:spPr>
+            <a:xfrm rot="16200000">
+              <a:off x="3322408" y="2635031"/>
+              <a:ext cx="691792" cy="307777"/>
+            </a:xfrm>
+            <a:prstGeom prst="rect">
+              <a:avLst/>
+            </a:prstGeom>
+            <a:noFill/>
+          </p:spPr>
+          <p:txBody>
+            <a:bodyPr wrap="none" rtlCol="0">
+              <a:spAutoFit/>
+            </a:bodyPr>
+            <a:lstStyle/>
+            <a:p>
+              <a:r>
+                <a:rPr lang="de-AT" sz="1400" dirty="0" smtClean="0">
+                  <a:solidFill>
+                    <a:schemeClr val="bg1"/>
+                  </a:solidFill>
+                </a:rPr>
+                <a:t>UART</a:t>
+              </a:r>
+              <a:endParaRPr lang="de-AT" sz="1400" dirty="0">
+                <a:solidFill>
+                  <a:schemeClr val="bg1"/>
+                </a:solidFill>
+              </a:endParaRPr>
+            </a:p>
+          </p:txBody>
+        </p:sp>
+        <p:sp>
+          <p:nvSpPr>
+            <p:cNvPr id="14" name="Textfeld 13"/>
+            <p:cNvSpPr txBox="1"/>
+            <p:nvPr/>
+          </p:nvSpPr>
+          <p:spPr>
+            <a:xfrm>
+              <a:off x="2534119" y="4361688"/>
+              <a:ext cx="500458" cy="338554"/>
+            </a:xfrm>
+            <a:prstGeom prst="rect">
+              <a:avLst/>
+            </a:prstGeom>
+            <a:noFill/>
+          </p:spPr>
+          <p:txBody>
+            <a:bodyPr wrap="none" rtlCol="0">
+              <a:spAutoFit/>
+            </a:bodyPr>
+            <a:lstStyle/>
+            <a:p>
+              <a:r>
+                <a:rPr lang="de-AT" sz="1600" dirty="0" smtClean="0">
+                  <a:solidFill>
+                    <a:schemeClr val="bg1"/>
+                  </a:solidFill>
+                </a:rPr>
+                <a:t>SPI</a:t>
+              </a:r>
+              <a:endParaRPr lang="de-AT" sz="1600" dirty="0">
+                <a:solidFill>
+                  <a:schemeClr val="bg1"/>
+                </a:solidFill>
+              </a:endParaRPr>
+            </a:p>
+          </p:txBody>
+        </p:sp>
+        <p:sp>
+          <p:nvSpPr>
+            <p:cNvPr id="16" name="Abgerundetes Rechteck 15"/>
+            <p:cNvSpPr/>
+            <p:nvPr/>
+          </p:nvSpPr>
+          <p:spPr>
+            <a:xfrm>
+              <a:off x="4984228" y="1618488"/>
+              <a:ext cx="1361708" cy="548640"/>
+            </a:xfrm>
+            <a:prstGeom prst="roundRect">
+              <a:avLst/>
+            </a:prstGeom>
+          </p:spPr>
+          <p:style>
+            <a:lnRef idx="1">
+              <a:schemeClr val="accent1"/>
+            </a:lnRef>
+            <a:fillRef idx="3">
+              <a:schemeClr val="accent1"/>
+            </a:fillRef>
+            <a:effectRef idx="2">
+              <a:schemeClr val="accent1"/>
+            </a:effectRef>
+            <a:fontRef idx="minor">
+              <a:schemeClr val="lt1"/>
+            </a:fontRef>
+          </p:style>
+          <p:txBody>
+            <a:bodyPr rtlCol="0" anchor="ctr"/>
+            <a:lstStyle/>
+            <a:p>
+              <a:pPr algn="ctr"/>
+              <a:r>
+                <a:rPr lang="de-AT" dirty="0" smtClean="0"/>
+                <a:t>Bluetooth</a:t>
+              </a:r>
+              <a:endParaRPr lang="de-AT" dirty="0"/>
+            </a:p>
+          </p:txBody>
+        </p:sp>
+        <p:cxnSp>
+          <p:nvCxnSpPr>
+            <p:cNvPr id="18" name="Gekrümmte Verbindung 17"/>
+            <p:cNvCxnSpPr>
+              <a:stCxn id="12" idx="3"/>
+              <a:endCxn id="16" idx="1"/>
+            </p:cNvCxnSpPr>
+            <p:nvPr/>
+          </p:nvCxnSpPr>
+          <p:spPr>
+            <a:xfrm flipV="1">
+              <a:off x="4114800" y="1892808"/>
+              <a:ext cx="869428" cy="896112"/>
+            </a:xfrm>
+            <a:prstGeom prst="curvedConnector3">
+              <a:avLst/>
+            </a:prstGeom>
+            <a:ln>
+              <a:headEnd type="triangle"/>
+              <a:tailEnd type="triangle"/>
+            </a:ln>
+          </p:spPr>
+          <p:style>
+            <a:lnRef idx="3">
+              <a:schemeClr val="accent1"/>
+            </a:lnRef>
+            <a:fillRef idx="0">
+              <a:schemeClr val="accent1"/>
+            </a:fillRef>
+            <a:effectRef idx="2">
+              <a:schemeClr val="accent1"/>
+            </a:effectRef>
+            <a:fontRef idx="minor">
+              <a:schemeClr val="tx1"/>
+            </a:fontRef>
+          </p:style>
+        </p:cxnSp>
+      </p:grpSp>
+      <p:sp>
+        <p:nvSpPr>
+          <p:cNvPr id="22" name="Wolke 21"/>
+          <p:cNvSpPr/>
+          <p:nvPr/>
+        </p:nvSpPr>
+        <p:spPr>
+          <a:xfrm>
+            <a:off x="7455063" y="778130"/>
+            <a:ext cx="1574193" cy="1097280"/>
+          </a:xfrm>
+          <a:prstGeom prst="cloud">
+            <a:avLst/>
+          </a:prstGeom>
+          <a:ln w="15875"/>
+        </p:spPr>
+        <p:style>
+          <a:lnRef idx="3">
+            <a:schemeClr val="lt1"/>
+          </a:lnRef>
+          <a:fillRef idx="1">
+            <a:schemeClr val="accent1"/>
+          </a:fillRef>
+          <a:effectRef idx="1">
+            <a:schemeClr val="accent1"/>
+          </a:effectRef>
+          <a:fontRef idx="minor">
+            <a:schemeClr val="lt1"/>
+          </a:fontRef>
+        </p:style>
+        <p:txBody>
+          <a:bodyPr rtlCol="0" anchor="ctr"/>
+          <a:lstStyle/>
+          <a:p>
+            <a:pPr algn="ctr"/>
+            <a:r>
+              <a:rPr lang="de-AT" dirty="0" smtClean="0"/>
+              <a:t>Internet</a:t>
+            </a:r>
+            <a:endParaRPr lang="de-AT" dirty="0"/>
+          </a:p>
+        </p:txBody>
+      </p:sp>
+      <p:sp>
+        <p:nvSpPr>
+          <p:cNvPr id="23" name="Eingekerbter Pfeil nach rechts 22"/>
+          <p:cNvSpPr/>
+          <p:nvPr/>
+        </p:nvSpPr>
+        <p:spPr>
+          <a:xfrm rot="19349303">
+            <a:off x="6810961" y="1735529"/>
+            <a:ext cx="631132" cy="289403"/>
+          </a:xfrm>
+          <a:prstGeom prst="notchedRightArrow">
+            <a:avLst/>
+          </a:prstGeom>
+          <a:solidFill>
+            <a:srgbClr val="ABC3E3"/>
+          </a:solidFill>
+          <a:ln>
+            <a:noFill/>
+          </a:ln>
+        </p:spPr>
+        <p:style>
+          <a:lnRef idx="3">
+            <a:schemeClr val="lt1"/>
+          </a:lnRef>
+          <a:fillRef idx="1">
+            <a:schemeClr val="accent1"/>
+          </a:fillRef>
+          <a:effectRef idx="1">
+            <a:schemeClr val="accent1"/>
+          </a:effectRef>
+          <a:fontRef idx="minor">
+            <a:schemeClr val="lt1"/>
+          </a:fontRef>
+        </p:style>
+        <p:txBody>
+          <a:bodyPr rtlCol="0" anchor="ctr"/>
+          <a:lstStyle/>
+          <a:p>
+            <a:pPr algn="ctr"/>
+            <a:endParaRPr lang="de-AT"/>
+          </a:p>
+        </p:txBody>
+      </p:sp>
+    </p:spTree>
+    <p:extLst>
+      <p:ext uri="{BB962C8B-B14F-4D97-AF65-F5344CB8AC3E}">
+        <p14:creationId xmlns:p14="http://schemas.microsoft.com/office/powerpoint/2010/main" val="2712576934"/>
+      </p:ext>
+    </p:extLst>
+  </p:cSld>
+  <p:clrMapOvr>
+    <a:masterClrMapping/>
+  </p:clrMapOvr>
+  <p:timing>
+    <p:tnLst>
+      <p:par>
+        <p:cTn id="1" dur="indefinite" restart="never" nodeType="tmRoot"/>
+      </p:par>
+    </p:tnLst>
+  </p:timing>
+</p:sld>
+</file>
+
+<file path=ppt/slides/slide7.xml><?xml version="1.0" encoding="utf-8"?>
+<p:sld xmlns:a="http://schemas.openxmlformats.org/drawingml/2006/main" xmlns:r="http://schemas.openxmlformats.org/officeDocument/2006/relationships" xmlns:p="http://schemas.openxmlformats.org/presentationml/2006/main">
+  <p:cSld>
+    <p:spTree>
+      <p:nvGrpSpPr>
+        <p:cNvPr id="1" name=""/>
+        <p:cNvGrpSpPr/>
+        <p:nvPr/>
+      </p:nvGrpSpPr>
+      <p:grpSpPr>
+        <a:xfrm>
+          <a:off x="0" y="0"/>
+          <a:ext cx="0" cy="0"/>
+          <a:chOff x="0" y="0"/>
+          <a:chExt cx="0" cy="0"/>
+        </a:xfrm>
+      </p:grpSpPr>
+      <p:sp>
+        <p:nvSpPr>
+          <p:cNvPr id="2" name="Titel 1"/>
+          <p:cNvSpPr>
+            <a:spLocks noGrp="1"/>
+          </p:cNvSpPr>
+          <p:nvPr>
+            <p:ph type="ctrTitle"/>
+          </p:nvPr>
+        </p:nvSpPr>
+        <p:spPr>
+          <a:xfrm>
+            <a:off x="685800" y="294388"/>
+            <a:ext cx="7772400" cy="978408"/>
+          </a:xfrm>
+        </p:spPr>
+        <p:txBody>
+          <a:bodyPr/>
+          <a:lstStyle/>
+          <a:p>
+            <a:r>
+              <a:rPr lang="de-DE" dirty="0" smtClean="0"/>
+              <a:t>Gesture Recognition</a:t>
             </a:r>
             <a:endParaRPr lang="de-DE" dirty="0"/>
           </a:p>
@@ -8910,81 +12708,55 @@
           </a:p>
         </p:txBody>
       </p:sp>
-    </p:spTree>
-    <p:extLst>
-      <p:ext uri="{BB962C8B-B14F-4D97-AF65-F5344CB8AC3E}">
-        <p14:creationId xmlns:p14="http://schemas.microsoft.com/office/powerpoint/2010/main" val="386642039"/>
-      </p:ext>
-    </p:extLst>
-  </p:cSld>
-  <p:clrMapOvr>
-    <a:masterClrMapping/>
-  </p:clrMapOvr>
-  <p:timing>
-    <p:tnLst>
-      <p:par>
-        <p:cTn id="1" dur="indefinite" restart="never" nodeType="tmRoot"/>
-      </p:par>
-    </p:tnLst>
-  </p:timing>
-</p:sld>
-</file>
-
-<file path=ppt/slides/slide7.xml><?xml version="1.0" encoding="utf-8"?>
-<p:sld xmlns:a="http://schemas.openxmlformats.org/drawingml/2006/main" xmlns:r="http://schemas.openxmlformats.org/officeDocument/2006/relationships" xmlns:p="http://schemas.openxmlformats.org/presentationml/2006/main">
-  <p:cSld>
-    <p:spTree>
-      <p:nvGrpSpPr>
-        <p:cNvPr id="1" name=""/>
-        <p:cNvGrpSpPr/>
-        <p:nvPr/>
-      </p:nvGrpSpPr>
-      <p:grpSpPr>
-        <a:xfrm>
-          <a:off x="0" y="0"/>
-          <a:ext cx="0" cy="0"/>
-          <a:chOff x="0" y="0"/>
-          <a:chExt cx="0" cy="0"/>
-        </a:xfrm>
-      </p:grpSpPr>
       <p:sp>
         <p:nvSpPr>
-          <p:cNvPr id="2" name="Titel 1"/>
-          <p:cNvSpPr>
-            <a:spLocks noGrp="1"/>
-          </p:cNvSpPr>
-          <p:nvPr>
-            <p:ph type="ctrTitle"/>
-          </p:nvPr>
+          <p:cNvPr id="3" name="Textfeld 2"/>
+          <p:cNvSpPr txBox="1"/>
+          <p:nvPr/>
         </p:nvSpPr>
         <p:spPr>
           <a:xfrm>
-            <a:off x="685800" y="294388"/>
-            <a:ext cx="7772400" cy="978408"/>
+            <a:off x="594360" y="1276588"/>
+            <a:ext cx="7973568" cy="523220"/>
           </a:xfrm>
+          <a:prstGeom prst="rect">
+            <a:avLst/>
+          </a:prstGeom>
+          <a:noFill/>
         </p:spPr>
         <p:txBody>
-          <a:bodyPr/>
+          <a:bodyPr wrap="square" rtlCol="0">
+            <a:spAutoFit/>
+          </a:bodyPr>
           <a:lstStyle/>
           <a:p>
-            <a:r>
-              <a:rPr lang="de-DE" dirty="0" smtClean="0"/>
-              <a:t>Gesture Recognition</a:t>
-            </a:r>
-            <a:endParaRPr lang="de-DE" dirty="0"/>
+            <a:pPr algn="ctr"/>
+            <a:r>
+              <a:rPr lang="de-AT" sz="2800" dirty="0" err="1" smtClean="0"/>
+              <a:t>Algorithm</a:t>
+            </a:r>
+            <a:r>
+              <a:rPr lang="de-AT" sz="2800" dirty="0" smtClean="0"/>
+              <a:t>: Dynamic Time </a:t>
+            </a:r>
+            <a:r>
+              <a:rPr lang="de-AT" sz="2800" dirty="0" err="1" smtClean="0"/>
+              <a:t>Warping</a:t>
+            </a:r>
+            <a:endParaRPr lang="de-AT" sz="2800" dirty="0"/>
           </a:p>
         </p:txBody>
       </p:sp>
       <p:pic>
         <p:nvPicPr>
-          <p:cNvPr id="5" name="Bild 4" descr="github_icon-150x150.png"/>
+          <p:cNvPr id="4" name="Grafik 3"/>
           <p:cNvPicPr>
             <a:picLocks noChangeAspect="1"/>
           </p:cNvPicPr>
           <p:nvPr/>
         </p:nvPicPr>
         <p:blipFill>
-          <a:blip r:embed="rId2">
+          <a:blip r:embed="rId3">
             <a:extLst>
               <a:ext uri="{28A0092B-C50C-407E-A947-70E740481C1C}">
                 <a14:useLocalDpi xmlns:a14="http://schemas.microsoft.com/office/drawing/2010/main" val="0"/>
@@ -8997,8 +12769,8 @@
         </p:blipFill>
         <p:spPr>
           <a:xfrm>
-            <a:off x="5573276" y="5990233"/>
-            <a:ext cx="691112" cy="691112"/>
+            <a:off x="721273" y="1891805"/>
+            <a:ext cx="3622127" cy="4443984"/>
           </a:xfrm>
           <a:prstGeom prst="rect">
             <a:avLst/>
@@ -9007,260 +12779,223 @@
       </p:pic>
       <p:sp>
         <p:nvSpPr>
-          <p:cNvPr id="7" name="Untertitel 2"/>
-          <p:cNvSpPr txBox="1">
-            <a:spLocks/>
-          </p:cNvSpPr>
+          <p:cNvPr id="6" name="Textfeld 5"/>
+          <p:cNvSpPr txBox="1"/>
           <p:nvPr/>
         </p:nvSpPr>
         <p:spPr>
           <a:xfrm>
-            <a:off x="6278192" y="6106222"/>
-            <a:ext cx="2751065" cy="429435"/>
+            <a:off x="4462272" y="1892808"/>
+            <a:ext cx="4325112" cy="3000821"/>
           </a:xfrm>
           <a:prstGeom prst="rect">
             <a:avLst/>
           </a:prstGeom>
+          <a:noFill/>
         </p:spPr>
         <p:txBody>
-          <a:bodyPr vert="horz" lIns="91440" tIns="45720" rIns="91440" bIns="45720" rtlCol="0">
-            <a:normAutofit fontScale="92500"/>
+          <a:bodyPr wrap="square" rtlCol="0">
+            <a:spAutoFit/>
           </a:bodyPr>
-          <a:lstStyle>
-            <a:lvl1pPr marL="0" indent="0" algn="ctr" defTabSz="914400" rtl="0" eaLnBrk="1" latinLnBrk="0" hangingPunct="1">
-              <a:spcBef>
-                <a:spcPts val="300"/>
-              </a:spcBef>
+          <a:lstStyle/>
+          <a:p>
+            <a:r>
+              <a:rPr lang="de-AT" sz="2100" i="1" dirty="0" smtClean="0"/>
+              <a:t>Problems:</a:t>
+            </a:r>
+            <a:endParaRPr lang="de-AT" sz="2100" dirty="0"/>
+          </a:p>
+          <a:p>
+            <a:pPr marL="285750" indent="-285750">
               <a:buFontTx/>
-              <a:buNone/>
-              <a:defRPr sz="2000" kern="1200">
-                <a:solidFill>
-                  <a:schemeClr val="tx1">
-                    <a:tint val="75000"/>
-                  </a:schemeClr>
-                </a:solidFill>
-                <a:effectLst>
-                  <a:outerShdw blurRad="50800" dist="50800" dir="5400000" sx="101000" sy="101000" algn="t" rotWithShape="0">
-                    <a:prstClr val="black">
-                      <a:alpha val="40000"/>
-                    </a:prstClr>
-                  </a:outerShdw>
-                </a:effectLst>
-                <a:latin typeface="+mn-lt"/>
-                <a:ea typeface="+mn-ea"/>
-                <a:cs typeface="+mn-cs"/>
-              </a:defRPr>
-            </a:lvl1pPr>
-            <a:lvl2pPr marL="457200" indent="0" algn="ctr" defTabSz="914400" rtl="0" eaLnBrk="1" latinLnBrk="0" hangingPunct="1">
-              <a:spcBef>
-                <a:spcPts val="600"/>
-              </a:spcBef>
+              <a:buChar char="-"/>
+            </a:pPr>
+            <a:r>
+              <a:rPr lang="de-AT" sz="2100" dirty="0" smtClean="0"/>
+              <a:t>Signals </a:t>
+            </a:r>
+            <a:r>
+              <a:rPr lang="de-AT" sz="2100" dirty="0" err="1"/>
+              <a:t>are</a:t>
+            </a:r>
+            <a:r>
+              <a:rPr lang="de-AT" sz="2100" dirty="0"/>
+              <a:t> time </a:t>
+            </a:r>
+            <a:r>
+              <a:rPr lang="en-US" sz="2100" dirty="0"/>
+              <a:t>shifted</a:t>
+            </a:r>
+            <a:r>
+              <a:rPr lang="de-AT" sz="2100" dirty="0"/>
+              <a:t> </a:t>
+            </a:r>
+            <a:r>
+              <a:rPr lang="de-AT" sz="2100" dirty="0" err="1"/>
+              <a:t>and</a:t>
+            </a:r>
+            <a:r>
+              <a:rPr lang="de-AT" sz="2100" dirty="0"/>
+              <a:t> </a:t>
+            </a:r>
+            <a:r>
+              <a:rPr lang="de-AT" sz="2100" dirty="0" err="1"/>
+              <a:t>data</a:t>
+            </a:r>
+            <a:r>
+              <a:rPr lang="de-AT" sz="2100" dirty="0"/>
+              <a:t> </a:t>
+            </a:r>
+            <a:r>
+              <a:rPr lang="de-AT" sz="2100" dirty="0" err="1"/>
+              <a:t>points</a:t>
+            </a:r>
+            <a:r>
+              <a:rPr lang="de-AT" sz="2100" dirty="0"/>
+              <a:t> </a:t>
+            </a:r>
+            <a:r>
+              <a:rPr lang="de-AT" sz="2100" dirty="0" err="1"/>
+              <a:t>are</a:t>
+            </a:r>
+            <a:r>
+              <a:rPr lang="de-AT" sz="2100" dirty="0"/>
+              <a:t> </a:t>
+            </a:r>
+            <a:r>
+              <a:rPr lang="de-AT" sz="2100" dirty="0" err="1"/>
+              <a:t>measured</a:t>
+            </a:r>
+            <a:r>
+              <a:rPr lang="de-AT" sz="2100" dirty="0"/>
+              <a:t> </a:t>
+            </a:r>
+            <a:r>
+              <a:rPr lang="de-AT" sz="2100" dirty="0" err="1" smtClean="0"/>
+              <a:t>continuously</a:t>
+            </a:r>
+            <a:endParaRPr lang="de-AT" sz="2100" dirty="0" smtClean="0"/>
+          </a:p>
+          <a:p>
+            <a:pPr marL="285750" indent="-285750">
               <a:buFontTx/>
-              <a:buNone/>
-              <a:defRPr sz="2000" kern="1200">
-                <a:solidFill>
-                  <a:schemeClr val="tx1">
-                    <a:tint val="75000"/>
-                  </a:schemeClr>
-                </a:solidFill>
-                <a:effectLst>
-                  <a:outerShdw blurRad="50800" dist="50800" dir="5400000" sx="101000" sy="101000" algn="t" rotWithShape="0">
-                    <a:prstClr val="black">
-                      <a:alpha val="40000"/>
-                    </a:prstClr>
-                  </a:outerShdw>
-                </a:effectLst>
-                <a:latin typeface="+mn-lt"/>
-                <a:ea typeface="+mn-ea"/>
-                <a:cs typeface="+mn-cs"/>
-              </a:defRPr>
-            </a:lvl2pPr>
-            <a:lvl3pPr marL="914400" indent="0" algn="ctr" defTabSz="914400" rtl="0" eaLnBrk="1" latinLnBrk="0" hangingPunct="1">
-              <a:spcBef>
-                <a:spcPts val="600"/>
-              </a:spcBef>
+              <a:buChar char="-"/>
+            </a:pPr>
+            <a:r>
+              <a:rPr lang="de-AT" sz="2100" dirty="0" smtClean="0"/>
+              <a:t>Signals </a:t>
+            </a:r>
+            <a:r>
+              <a:rPr lang="de-AT" sz="2100" dirty="0" err="1" smtClean="0"/>
+              <a:t>have</a:t>
+            </a:r>
+            <a:r>
+              <a:rPr lang="de-AT" sz="2100" dirty="0" smtClean="0"/>
+              <a:t> different </a:t>
+            </a:r>
+            <a:r>
+              <a:rPr lang="de-AT" sz="2100" dirty="0" err="1" smtClean="0"/>
+              <a:t>amplitudes</a:t>
+            </a:r>
+            <a:endParaRPr lang="de-AT" sz="2100" dirty="0"/>
+          </a:p>
+          <a:p>
+            <a:endParaRPr lang="de-AT" sz="2100" i="1" dirty="0" smtClean="0"/>
+          </a:p>
+          <a:p>
+            <a:r>
+              <a:rPr lang="de-AT" sz="2100" i="1" dirty="0" smtClean="0"/>
+              <a:t>Goal:</a:t>
+            </a:r>
+          </a:p>
+          <a:p>
+            <a:pPr marL="285750" indent="-285750">
               <a:buFontTx/>
-              <a:buNone/>
-              <a:defRPr sz="1800" kern="1200">
-                <a:solidFill>
-                  <a:schemeClr val="tx1">
-                    <a:tint val="75000"/>
-                  </a:schemeClr>
-                </a:solidFill>
-                <a:effectLst>
-                  <a:outerShdw blurRad="50800" dist="50800" dir="5400000" sx="101000" sy="101000" algn="t" rotWithShape="0">
-                    <a:prstClr val="black">
-                      <a:alpha val="40000"/>
-                    </a:prstClr>
-                  </a:outerShdw>
-                </a:effectLst>
-                <a:latin typeface="+mn-lt"/>
-                <a:ea typeface="+mn-ea"/>
-                <a:cs typeface="+mn-cs"/>
-              </a:defRPr>
-            </a:lvl3pPr>
-            <a:lvl4pPr marL="1371600" indent="0" algn="ctr" defTabSz="914400" rtl="0" eaLnBrk="1" latinLnBrk="0" hangingPunct="1">
-              <a:spcBef>
-                <a:spcPts val="600"/>
-              </a:spcBef>
+              <a:buChar char="-"/>
+            </a:pPr>
+            <a:r>
+              <a:rPr lang="de-AT" sz="2100" dirty="0" smtClean="0"/>
+              <a:t>Find </a:t>
+            </a:r>
+            <a:r>
+              <a:rPr lang="de-AT" sz="2100" dirty="0" err="1" smtClean="0"/>
+              <a:t>matching</a:t>
+            </a:r>
+            <a:r>
+              <a:rPr lang="de-AT" sz="2100" dirty="0" smtClean="0"/>
+              <a:t> </a:t>
+            </a:r>
+            <a:r>
+              <a:rPr lang="de-AT" sz="2100" dirty="0" err="1" smtClean="0"/>
+              <a:t>pattern</a:t>
+            </a:r>
+            <a:r>
+              <a:rPr lang="de-AT" sz="2100" dirty="0" smtClean="0"/>
+              <a:t> </a:t>
+            </a:r>
+            <a:r>
+              <a:rPr lang="de-AT" sz="2100" dirty="0" err="1" smtClean="0"/>
+              <a:t>within</a:t>
+            </a:r>
+            <a:r>
+              <a:rPr lang="de-AT" sz="2100" dirty="0" smtClean="0"/>
+              <a:t> a </a:t>
+            </a:r>
+            <a:r>
+              <a:rPr lang="de-AT" sz="2100" dirty="0" err="1" smtClean="0"/>
+              <a:t>continuous</a:t>
+            </a:r>
+            <a:r>
+              <a:rPr lang="de-AT" sz="2100" dirty="0" smtClean="0"/>
+              <a:t> </a:t>
+            </a:r>
+            <a:r>
+              <a:rPr lang="de-AT" sz="2100" dirty="0" err="1" smtClean="0"/>
+              <a:t>data</a:t>
+            </a:r>
+            <a:r>
+              <a:rPr lang="de-AT" sz="2100" dirty="0" smtClean="0"/>
+              <a:t> </a:t>
+            </a:r>
+            <a:r>
+              <a:rPr lang="de-AT" sz="2100" dirty="0" err="1" smtClean="0"/>
+              <a:t>stream</a:t>
+            </a:r>
+            <a:endParaRPr lang="de-AT" sz="2100" dirty="0" smtClean="0"/>
+          </a:p>
+          <a:p>
+            <a:pPr marL="285750" indent="-285750">
               <a:buFontTx/>
-              <a:buNone/>
-              <a:defRPr sz="1800" kern="1200">
-                <a:solidFill>
-                  <a:schemeClr val="tx1">
-                    <a:tint val="75000"/>
-                  </a:schemeClr>
-                </a:solidFill>
-                <a:effectLst>
-                  <a:outerShdw blurRad="50800" dist="50800" dir="5400000" sx="101000" sy="101000" algn="t" rotWithShape="0">
-                    <a:prstClr val="black">
-                      <a:alpha val="40000"/>
-                    </a:prstClr>
-                  </a:outerShdw>
-                </a:effectLst>
-                <a:latin typeface="+mn-lt"/>
-                <a:ea typeface="+mn-ea"/>
-                <a:cs typeface="+mn-cs"/>
-              </a:defRPr>
-            </a:lvl4pPr>
-            <a:lvl5pPr marL="1828800" indent="0" algn="ctr" defTabSz="914400" rtl="0" eaLnBrk="1" latinLnBrk="0" hangingPunct="1">
-              <a:spcBef>
-                <a:spcPts val="600"/>
-              </a:spcBef>
-              <a:buFontTx/>
-              <a:buNone/>
-              <a:defRPr sz="1800" kern="1200">
-                <a:solidFill>
-                  <a:schemeClr val="tx1">
-                    <a:tint val="75000"/>
-                  </a:schemeClr>
-                </a:solidFill>
-                <a:effectLst>
-                  <a:outerShdw blurRad="50800" dist="50800" dir="5400000" sx="101000" sy="101000" algn="t" rotWithShape="0">
-                    <a:prstClr val="black">
-                      <a:alpha val="40000"/>
-                    </a:prstClr>
-                  </a:outerShdw>
-                </a:effectLst>
-                <a:latin typeface="+mn-lt"/>
-                <a:ea typeface="+mn-ea"/>
-                <a:cs typeface="+mn-cs"/>
-              </a:defRPr>
-            </a:lvl5pPr>
-            <a:lvl6pPr marL="2286000" indent="0" algn="ctr" defTabSz="914400" rtl="0" eaLnBrk="1" latinLnBrk="0" hangingPunct="1">
-              <a:spcBef>
-                <a:spcPct val="20000"/>
-              </a:spcBef>
-              <a:buFontTx/>
-              <a:buNone/>
-              <a:defRPr lang="en-US" sz="1800" kern="1200">
-                <a:solidFill>
-                  <a:schemeClr val="tx1">
-                    <a:tint val="75000"/>
-                  </a:schemeClr>
-                </a:solidFill>
-                <a:effectLst>
-                  <a:outerShdw blurRad="50800" dist="50800" dir="5400000" sx="101000" sy="101000" algn="t" rotWithShape="0">
-                    <a:prstClr val="black">
-                      <a:alpha val="40000"/>
-                    </a:prstClr>
-                  </a:outerShdw>
-                </a:effectLst>
-                <a:latin typeface="+mn-lt"/>
-                <a:ea typeface="+mn-ea"/>
-                <a:cs typeface="+mn-cs"/>
-              </a:defRPr>
-            </a:lvl6pPr>
-            <a:lvl7pPr marL="2743200" indent="0" algn="ctr" defTabSz="914400" rtl="0" eaLnBrk="1" latinLnBrk="0" hangingPunct="1">
-              <a:spcBef>
-                <a:spcPct val="20000"/>
-              </a:spcBef>
-              <a:buFontTx/>
-              <a:buNone/>
-              <a:defRPr lang="en-US" sz="1800" kern="1200">
-                <a:solidFill>
-                  <a:schemeClr val="tx1">
-                    <a:tint val="75000"/>
-                  </a:schemeClr>
-                </a:solidFill>
-                <a:effectLst>
-                  <a:outerShdw blurRad="50800" dist="50800" dir="5400000" sx="101000" sy="101000" algn="t" rotWithShape="0">
-                    <a:prstClr val="black">
-                      <a:alpha val="40000"/>
-                    </a:prstClr>
-                  </a:outerShdw>
-                </a:effectLst>
-                <a:latin typeface="+mn-lt"/>
-                <a:ea typeface="+mn-ea"/>
-                <a:cs typeface="+mn-cs"/>
-              </a:defRPr>
-            </a:lvl7pPr>
-            <a:lvl8pPr marL="3200400" indent="0" algn="ctr" defTabSz="914400" rtl="0" eaLnBrk="1" latinLnBrk="0" hangingPunct="1">
-              <a:spcBef>
-                <a:spcPct val="20000"/>
-              </a:spcBef>
-              <a:buFontTx/>
-              <a:buNone/>
-              <a:defRPr lang="en-US" sz="1800" kern="1200">
-                <a:solidFill>
-                  <a:schemeClr val="tx1">
-                    <a:tint val="75000"/>
-                  </a:schemeClr>
-                </a:solidFill>
-                <a:effectLst>
-                  <a:outerShdw blurRad="50800" dist="50800" dir="5400000" sx="101000" sy="101000" algn="t" rotWithShape="0">
-                    <a:prstClr val="black">
-                      <a:alpha val="40000"/>
-                    </a:prstClr>
-                  </a:outerShdw>
-                </a:effectLst>
-                <a:latin typeface="+mn-lt"/>
-                <a:ea typeface="+mn-ea"/>
-                <a:cs typeface="+mn-cs"/>
-              </a:defRPr>
-            </a:lvl8pPr>
-            <a:lvl9pPr marL="3657600" indent="0" algn="ctr" defTabSz="914400" rtl="0" eaLnBrk="1" latinLnBrk="0" hangingPunct="1">
-              <a:spcBef>
-                <a:spcPct val="20000"/>
-              </a:spcBef>
-              <a:buFontTx/>
-              <a:buNone/>
-              <a:defRPr lang="en-US" sz="1800" kern="1200">
-                <a:solidFill>
-                  <a:schemeClr val="tx1">
-                    <a:tint val="75000"/>
-                  </a:schemeClr>
-                </a:solidFill>
-                <a:effectLst>
-                  <a:outerShdw blurRad="50800" dist="50800" dir="5400000" sx="101000" sy="101000" algn="t" rotWithShape="0">
-                    <a:prstClr val="black">
-                      <a:alpha val="40000"/>
-                    </a:prstClr>
-                  </a:outerShdw>
-                </a:effectLst>
-                <a:latin typeface="+mn-lt"/>
-                <a:ea typeface="+mn-ea"/>
-                <a:cs typeface="+mn-cs"/>
-              </a:defRPr>
-            </a:lvl9pPr>
-          </a:lstStyle>
-          <a:p>
-            <a:r>
-              <a:rPr lang="fi-FI" dirty="0" smtClean="0"/>
-              <a:t>github.com</a:t>
-            </a:r>
-            <a:r>
-              <a:rPr lang="fi-FI" dirty="0"/>
-              <a:t>/rknoll/presit</a:t>
-            </a:r>
-            <a:endParaRPr lang="de-DE" dirty="0"/>
+              <a:buChar char="-"/>
+            </a:pPr>
+            <a:r>
+              <a:rPr lang="de-AT" sz="2100" dirty="0" err="1" smtClean="0"/>
+              <a:t>Define</a:t>
+            </a:r>
+            <a:r>
+              <a:rPr lang="de-AT" sz="2100" dirty="0" smtClean="0"/>
+              <a:t> a </a:t>
+            </a:r>
+            <a:r>
+              <a:rPr lang="de-AT" sz="2100" dirty="0" err="1" smtClean="0"/>
+              <a:t>cost</a:t>
+            </a:r>
+            <a:r>
+              <a:rPr lang="de-AT" sz="2100" dirty="0" smtClean="0"/>
+              <a:t> </a:t>
+            </a:r>
+            <a:r>
+              <a:rPr lang="de-AT" sz="2100" dirty="0" err="1" smtClean="0"/>
+              <a:t>threshold</a:t>
+            </a:r>
+            <a:endParaRPr lang="de-AT" sz="2100" dirty="0" smtClean="0"/>
           </a:p>
         </p:txBody>
       </p:sp>
     </p:spTree>
     <p:extLst>
       <p:ext uri="{BB962C8B-B14F-4D97-AF65-F5344CB8AC3E}">
-        <p14:creationId xmlns:p14="http://schemas.microsoft.com/office/powerpoint/2010/main" val="3382586586"/>
+        <p14:creationId xmlns:p14="http://schemas.microsoft.com/office/powerpoint/2010/main" val="380012088"/>
       </p:ext>
     </p:extLst>
   </p:cSld>

</xml_diff>